<commit_message>
Finished structure plot and flow plot
</commit_message>
<xml_diff>
--- a/docs/Manuscript/Figures/iMedBotStructure.pptx
+++ b/docs/Manuscript/Figures/iMedBotStructure.pptx
@@ -5,12 +5,14 @@
     <p:sldMasterId id="2147483659" r:id="rId1"/>
   </p:sldMasterIdLst>
   <p:notesMasterIdLst>
-    <p:notesMasterId r:id="rId3"/>
+    <p:notesMasterId r:id="rId5"/>
   </p:notesMasterIdLst>
   <p:sldIdLst>
     <p:sldId id="1367" r:id="rId2"/>
+    <p:sldId id="1368" r:id="rId3"/>
+    <p:sldId id="1369" r:id="rId4"/>
   </p:sldIdLst>
-  <p:sldSz cx="9144000" cy="5143500" type="screen16x9"/>
+  <p:sldSz cx="9906000" cy="6858000" type="A4"/>
   <p:notesSz cx="6858000" cy="9144000"/>
   <p:defaultTextStyle>
     <a:defPPr marR="0" lvl="0" algn="l" rtl="0">
@@ -38,7 +40,7 @@
         <a:srgbClr val="000000"/>
       </a:buClr>
       <a:buFont typeface="Arial"/>
-      <a:defRPr sz="1400" b="0" i="0" u="none" strike="noStrike" cap="none">
+      <a:defRPr sz="1643" b="0" i="0" u="none" strike="noStrike" cap="none">
         <a:solidFill>
           <a:srgbClr val="000000"/>
         </a:solidFill>
@@ -62,7 +64,7 @@
         <a:srgbClr val="000000"/>
       </a:buClr>
       <a:buFont typeface="Arial"/>
-      <a:defRPr sz="1400" b="0" i="0" u="none" strike="noStrike" cap="none">
+      <a:defRPr sz="1643" b="0" i="0" u="none" strike="noStrike" cap="none">
         <a:solidFill>
           <a:srgbClr val="000000"/>
         </a:solidFill>
@@ -86,7 +88,7 @@
         <a:srgbClr val="000000"/>
       </a:buClr>
       <a:buFont typeface="Arial"/>
-      <a:defRPr sz="1400" b="0" i="0" u="none" strike="noStrike" cap="none">
+      <a:defRPr sz="1643" b="0" i="0" u="none" strike="noStrike" cap="none">
         <a:solidFill>
           <a:srgbClr val="000000"/>
         </a:solidFill>
@@ -110,7 +112,7 @@
         <a:srgbClr val="000000"/>
       </a:buClr>
       <a:buFont typeface="Arial"/>
-      <a:defRPr sz="1400" b="0" i="0" u="none" strike="noStrike" cap="none">
+      <a:defRPr sz="1643" b="0" i="0" u="none" strike="noStrike" cap="none">
         <a:solidFill>
           <a:srgbClr val="000000"/>
         </a:solidFill>
@@ -134,7 +136,7 @@
         <a:srgbClr val="000000"/>
       </a:buClr>
       <a:buFont typeface="Arial"/>
-      <a:defRPr sz="1400" b="0" i="0" u="none" strike="noStrike" cap="none">
+      <a:defRPr sz="1643" b="0" i="0" u="none" strike="noStrike" cap="none">
         <a:solidFill>
           <a:srgbClr val="000000"/>
         </a:solidFill>
@@ -158,7 +160,7 @@
         <a:srgbClr val="000000"/>
       </a:buClr>
       <a:buFont typeface="Arial"/>
-      <a:defRPr sz="1400" b="0" i="0" u="none" strike="noStrike" cap="none">
+      <a:defRPr sz="1643" b="0" i="0" u="none" strike="noStrike" cap="none">
         <a:solidFill>
           <a:srgbClr val="000000"/>
         </a:solidFill>
@@ -182,7 +184,7 @@
         <a:srgbClr val="000000"/>
       </a:buClr>
       <a:buFont typeface="Arial"/>
-      <a:defRPr sz="1400" b="0" i="0" u="none" strike="noStrike" cap="none">
+      <a:defRPr sz="1643" b="0" i="0" u="none" strike="noStrike" cap="none">
         <a:solidFill>
           <a:srgbClr val="000000"/>
         </a:solidFill>
@@ -206,7 +208,7 @@
         <a:srgbClr val="000000"/>
       </a:buClr>
       <a:buFont typeface="Arial"/>
-      <a:defRPr sz="1400" b="0" i="0" u="none" strike="noStrike" cap="none">
+      <a:defRPr sz="1643" b="0" i="0" u="none" strike="noStrike" cap="none">
         <a:solidFill>
           <a:srgbClr val="000000"/>
         </a:solidFill>
@@ -230,7 +232,7 @@
         <a:srgbClr val="000000"/>
       </a:buClr>
       <a:buFont typeface="Arial"/>
-      <a:defRPr sz="1400" b="0" i="0" u="none" strike="noStrike" cap="none">
+      <a:defRPr sz="1643" b="0" i="0" u="none" strike="noStrike" cap="none">
         <a:solidFill>
           <a:srgbClr val="000000"/>
         </a:solidFill>
@@ -244,12 +246,12 @@
   <p:extLst>
     <p:ext uri="{EFAFB233-063F-42B5-8137-9DF3F51BA10A}">
       <p15:sldGuideLst xmlns:p15="http://schemas.microsoft.com/office/powerpoint/2012/main">
-        <p15:guide id="1" orient="horz" pos="1620">
+        <p15:guide id="1" orient="horz" pos="2160" userDrawn="1">
           <p15:clr>
             <a:srgbClr val="A4A3A4"/>
           </p15:clr>
         </p15:guide>
-        <p15:guide id="2" pos="2880">
+        <p15:guide id="2" pos="3120" userDrawn="1">
           <p15:clr>
             <a:srgbClr val="A4A3A4"/>
           </p15:clr>
@@ -294,8 +296,8 @@
         </p:nvSpPr>
         <p:spPr>
           <a:xfrm>
-            <a:off x="381300" y="685800"/>
-            <a:ext cx="6096075" cy="3429000"/>
+            <a:off x="952500" y="685800"/>
+            <a:ext cx="4953000" cy="3429000"/>
           </a:xfrm>
           <a:custGeom>
             <a:avLst/>
@@ -495,7 +497,7 @@
         <a:srgbClr val="000000"/>
       </a:buClr>
       <a:buFont typeface="Arial"/>
-      <a:defRPr sz="1400" b="0" i="0" u="none" strike="noStrike" cap="none">
+      <a:defRPr sz="1643" b="0" i="0" u="none" strike="noStrike" cap="none">
         <a:solidFill>
           <a:srgbClr val="000000"/>
         </a:solidFill>
@@ -519,7 +521,7 @@
         <a:srgbClr val="000000"/>
       </a:buClr>
       <a:buFont typeface="Arial"/>
-      <a:defRPr sz="1400" b="0" i="0" u="none" strike="noStrike" cap="none">
+      <a:defRPr sz="1643" b="0" i="0" u="none" strike="noStrike" cap="none">
         <a:solidFill>
           <a:srgbClr val="000000"/>
         </a:solidFill>
@@ -543,7 +545,7 @@
         <a:srgbClr val="000000"/>
       </a:buClr>
       <a:buFont typeface="Arial"/>
-      <a:defRPr sz="1400" b="0" i="0" u="none" strike="noStrike" cap="none">
+      <a:defRPr sz="1643" b="0" i="0" u="none" strike="noStrike" cap="none">
         <a:solidFill>
           <a:srgbClr val="000000"/>
         </a:solidFill>
@@ -567,7 +569,7 @@
         <a:srgbClr val="000000"/>
       </a:buClr>
       <a:buFont typeface="Arial"/>
-      <a:defRPr sz="1400" b="0" i="0" u="none" strike="noStrike" cap="none">
+      <a:defRPr sz="1643" b="0" i="0" u="none" strike="noStrike" cap="none">
         <a:solidFill>
           <a:srgbClr val="000000"/>
         </a:solidFill>
@@ -591,7 +593,7 @@
         <a:srgbClr val="000000"/>
       </a:buClr>
       <a:buFont typeface="Arial"/>
-      <a:defRPr sz="1400" b="0" i="0" u="none" strike="noStrike" cap="none">
+      <a:defRPr sz="1643" b="0" i="0" u="none" strike="noStrike" cap="none">
         <a:solidFill>
           <a:srgbClr val="000000"/>
         </a:solidFill>
@@ -615,7 +617,7 @@
         <a:srgbClr val="000000"/>
       </a:buClr>
       <a:buFont typeface="Arial"/>
-      <a:defRPr sz="1400" b="0" i="0" u="none" strike="noStrike" cap="none">
+      <a:defRPr sz="1643" b="0" i="0" u="none" strike="noStrike" cap="none">
         <a:solidFill>
           <a:srgbClr val="000000"/>
         </a:solidFill>
@@ -639,7 +641,7 @@
         <a:srgbClr val="000000"/>
       </a:buClr>
       <a:buFont typeface="Arial"/>
-      <a:defRPr sz="1400" b="0" i="0" u="none" strike="noStrike" cap="none">
+      <a:defRPr sz="1643" b="0" i="0" u="none" strike="noStrike" cap="none">
         <a:solidFill>
           <a:srgbClr val="000000"/>
         </a:solidFill>
@@ -663,7 +665,7 @@
         <a:srgbClr val="000000"/>
       </a:buClr>
       <a:buFont typeface="Arial"/>
-      <a:defRPr sz="1400" b="0" i="0" u="none" strike="noStrike" cap="none">
+      <a:defRPr sz="1643" b="0" i="0" u="none" strike="noStrike" cap="none">
         <a:solidFill>
           <a:srgbClr val="000000"/>
         </a:solidFill>
@@ -687,7 +689,7 @@
         <a:srgbClr val="000000"/>
       </a:buClr>
       <a:buFont typeface="Arial"/>
-      <a:defRPr sz="1400" b="0" i="0" u="none" strike="noStrike" cap="none">
+      <a:defRPr sz="1643" b="0" i="0" u="none" strike="noStrike" cap="none">
         <a:solidFill>
           <a:srgbClr val="000000"/>
         </a:solidFill>
@@ -730,8 +732,8 @@
         </p:nvSpPr>
         <p:spPr>
           <a:xfrm>
-            <a:off x="311700" y="445025"/>
-            <a:ext cx="8520600" cy="572700"/>
+            <a:off x="337675" y="593367"/>
+            <a:ext cx="9230650" cy="763600"/>
           </a:xfrm>
           <a:prstGeom prst="rect">
             <a:avLst/>
@@ -859,8 +861,8 @@
         </p:nvSpPr>
         <p:spPr>
           <a:xfrm>
-            <a:off x="311700" y="1152475"/>
-            <a:ext cx="8520600" cy="3416400"/>
+            <a:off x="337675" y="1536633"/>
+            <a:ext cx="9230650" cy="4555200"/>
           </a:xfrm>
           <a:prstGeom prst="rect">
             <a:avLst/>
@@ -988,8 +990,8 @@
         </p:nvSpPr>
         <p:spPr>
           <a:xfrm>
-            <a:off x="8472458" y="4663217"/>
-            <a:ext cx="548700" cy="393600"/>
+            <a:off x="9178496" y="6217623"/>
+            <a:ext cx="594425" cy="524800"/>
           </a:xfrm>
           <a:prstGeom prst="rect">
             <a:avLst/>
@@ -1038,20 +1040,12 @@
             </a:lvl9pPr>
           </a:lstStyle>
           <a:p>
-            <a:pPr marL="0" lvl="0" indent="0" algn="r" rtl="0">
-              <a:spcBef>
-                <a:spcPts val="0"/>
-              </a:spcBef>
-              <a:spcAft>
-                <a:spcPts val="0"/>
-              </a:spcAft>
-              <a:buNone/>
-            </a:pPr>
             <a:fld id="{00000000-1234-1234-1234-123412341234}" type="slidenum">
-              <a:rPr lang="en"/>
+              <a:rPr lang="en" smtClean="0"/>
+              <a:pPr/>
               <a:t>‹#›</a:t>
             </a:fld>
-            <a:endParaRPr/>
+            <a:endParaRPr lang="en"/>
           </a:p>
         </p:txBody>
       </p:sp>
@@ -1188,7 +1182,7 @@
           <a:p>
             <a:fld id="{D2CA1F8B-7CEF-3E43-B4EE-83E029EB6154}" type="datetimeFigureOut">
               <a:rPr lang="en-US" smtClean="0"/>
-              <a:t>8/30/22</a:t>
+              <a:t>8/31/2022</a:t>
             </a:fld>
             <a:endParaRPr lang="en-US"/>
           </a:p>
@@ -1290,8 +1284,8 @@
         </p:nvSpPr>
         <p:spPr>
           <a:xfrm>
-            <a:off x="311700" y="445025"/>
-            <a:ext cx="8520600" cy="572700"/>
+            <a:off x="337675" y="593367"/>
+            <a:ext cx="9230650" cy="763600"/>
           </a:xfrm>
           <a:prstGeom prst="rect">
             <a:avLst/>
@@ -1419,8 +1413,8 @@
         </p:nvSpPr>
         <p:spPr>
           <a:xfrm>
-            <a:off x="311700" y="1152475"/>
-            <a:ext cx="3999900" cy="3416400"/>
+            <a:off x="337675" y="1536633"/>
+            <a:ext cx="4333225" cy="4555200"/>
           </a:xfrm>
           <a:prstGeom prst="rect">
             <a:avLst/>
@@ -1548,8 +1542,8 @@
         </p:nvSpPr>
         <p:spPr>
           <a:xfrm>
-            <a:off x="4832400" y="1152475"/>
-            <a:ext cx="3999900" cy="3416400"/>
+            <a:off x="5235100" y="1536633"/>
+            <a:ext cx="4333225" cy="4555200"/>
           </a:xfrm>
           <a:prstGeom prst="rect">
             <a:avLst/>
@@ -1677,8 +1671,8 @@
         </p:nvSpPr>
         <p:spPr>
           <a:xfrm>
-            <a:off x="8472458" y="4663217"/>
-            <a:ext cx="548700" cy="393600"/>
+            <a:off x="9178496" y="6217623"/>
+            <a:ext cx="594425" cy="524800"/>
           </a:xfrm>
           <a:prstGeom prst="rect">
             <a:avLst/>
@@ -1727,20 +1721,12 @@
             </a:lvl9pPr>
           </a:lstStyle>
           <a:p>
-            <a:pPr marL="0" lvl="0" indent="0" algn="r" rtl="0">
-              <a:spcBef>
-                <a:spcPts val="0"/>
-              </a:spcBef>
-              <a:spcAft>
-                <a:spcPts val="0"/>
-              </a:spcAft>
-              <a:buNone/>
-            </a:pPr>
             <a:fld id="{00000000-1234-1234-1234-123412341234}" type="slidenum">
-              <a:rPr lang="en"/>
+              <a:rPr lang="en" smtClean="0"/>
+              <a:pPr/>
               <a:t>‹#›</a:t>
             </a:fld>
-            <a:endParaRPr/>
+            <a:endParaRPr lang="en"/>
           </a:p>
         </p:txBody>
       </p:sp>
@@ -1781,8 +1767,8 @@
         </p:nvSpPr>
         <p:spPr>
           <a:xfrm>
-            <a:off x="311700" y="445025"/>
-            <a:ext cx="8520600" cy="572700"/>
+            <a:off x="337675" y="593367"/>
+            <a:ext cx="9230650" cy="763600"/>
           </a:xfrm>
           <a:prstGeom prst="rect">
             <a:avLst/>
@@ -1910,8 +1896,8 @@
         </p:nvSpPr>
         <p:spPr>
           <a:xfrm>
-            <a:off x="8472458" y="4663217"/>
-            <a:ext cx="548700" cy="393600"/>
+            <a:off x="9178496" y="6217623"/>
+            <a:ext cx="594425" cy="524800"/>
           </a:xfrm>
           <a:prstGeom prst="rect">
             <a:avLst/>
@@ -1960,20 +1946,12 @@
             </a:lvl9pPr>
           </a:lstStyle>
           <a:p>
-            <a:pPr marL="0" lvl="0" indent="0" algn="r" rtl="0">
-              <a:spcBef>
-                <a:spcPts val="0"/>
-              </a:spcBef>
-              <a:spcAft>
-                <a:spcPts val="0"/>
-              </a:spcAft>
-              <a:buNone/>
-            </a:pPr>
             <a:fld id="{00000000-1234-1234-1234-123412341234}" type="slidenum">
-              <a:rPr lang="en"/>
+              <a:rPr lang="en" smtClean="0"/>
+              <a:pPr/>
               <a:t>‹#›</a:t>
             </a:fld>
-            <a:endParaRPr/>
+            <a:endParaRPr lang="en"/>
           </a:p>
         </p:txBody>
       </p:sp>
@@ -2014,8 +1992,8 @@
         </p:nvSpPr>
         <p:spPr>
           <a:xfrm>
-            <a:off x="311700" y="555600"/>
-            <a:ext cx="2808000" cy="755700"/>
+            <a:off x="337675" y="740800"/>
+            <a:ext cx="3042000" cy="1007600"/>
           </a:xfrm>
           <a:prstGeom prst="rect">
             <a:avLst/>
@@ -2143,8 +2121,8 @@
         </p:nvSpPr>
         <p:spPr>
           <a:xfrm>
-            <a:off x="311700" y="1389600"/>
-            <a:ext cx="2808000" cy="3179400"/>
+            <a:off x="337675" y="1852800"/>
+            <a:ext cx="3042000" cy="4239200"/>
           </a:xfrm>
           <a:prstGeom prst="rect">
             <a:avLst/>
@@ -2272,8 +2250,8 @@
         </p:nvSpPr>
         <p:spPr>
           <a:xfrm>
-            <a:off x="8472458" y="4663217"/>
-            <a:ext cx="548700" cy="393600"/>
+            <a:off x="9178496" y="6217623"/>
+            <a:ext cx="594425" cy="524800"/>
           </a:xfrm>
           <a:prstGeom prst="rect">
             <a:avLst/>
@@ -2322,20 +2300,12 @@
             </a:lvl9pPr>
           </a:lstStyle>
           <a:p>
-            <a:pPr marL="0" lvl="0" indent="0" algn="r" rtl="0">
-              <a:spcBef>
-                <a:spcPts val="0"/>
-              </a:spcBef>
-              <a:spcAft>
-                <a:spcPts val="0"/>
-              </a:spcAft>
-              <a:buNone/>
-            </a:pPr>
             <a:fld id="{00000000-1234-1234-1234-123412341234}" type="slidenum">
-              <a:rPr lang="en"/>
+              <a:rPr lang="en" smtClean="0"/>
+              <a:pPr/>
               <a:t>‹#›</a:t>
             </a:fld>
-            <a:endParaRPr/>
+            <a:endParaRPr lang="en"/>
           </a:p>
         </p:txBody>
       </p:sp>
@@ -2376,8 +2346,8 @@
         </p:nvSpPr>
         <p:spPr>
           <a:xfrm>
-            <a:off x="490250" y="450150"/>
-            <a:ext cx="6367800" cy="4090800"/>
+            <a:off x="531104" y="600200"/>
+            <a:ext cx="6898450" cy="5454400"/>
           </a:xfrm>
           <a:prstGeom prst="rect">
             <a:avLst/>
@@ -2505,8 +2475,8 @@
         </p:nvSpPr>
         <p:spPr>
           <a:xfrm>
-            <a:off x="8472458" y="4663217"/>
-            <a:ext cx="548700" cy="393600"/>
+            <a:off x="9178496" y="6217623"/>
+            <a:ext cx="594425" cy="524800"/>
           </a:xfrm>
           <a:prstGeom prst="rect">
             <a:avLst/>
@@ -2555,20 +2525,12 @@
             </a:lvl9pPr>
           </a:lstStyle>
           <a:p>
-            <a:pPr marL="0" lvl="0" indent="0" algn="r" rtl="0">
-              <a:spcBef>
-                <a:spcPts val="0"/>
-              </a:spcBef>
-              <a:spcAft>
-                <a:spcPts val="0"/>
-              </a:spcAft>
-              <a:buNone/>
-            </a:pPr>
             <a:fld id="{00000000-1234-1234-1234-123412341234}" type="slidenum">
-              <a:rPr lang="en"/>
+              <a:rPr lang="en" smtClean="0"/>
+              <a:pPr/>
               <a:t>‹#›</a:t>
             </a:fld>
-            <a:endParaRPr/>
+            <a:endParaRPr lang="en"/>
           </a:p>
         </p:txBody>
       </p:sp>
@@ -2605,8 +2567,8 @@
         </p:nvSpPr>
         <p:spPr>
           <a:xfrm>
-            <a:off x="4572000" y="-125"/>
-            <a:ext cx="4572000" cy="5143500"/>
+            <a:off x="4953000" y="-167"/>
+            <a:ext cx="4953000" cy="6858000"/>
           </a:xfrm>
           <a:prstGeom prst="rect">
             <a:avLst/>
@@ -2633,7 +2595,7 @@
               </a:spcAft>
               <a:buNone/>
             </a:pPr>
-            <a:endParaRPr/>
+            <a:endParaRPr sz="1400"/>
           </a:p>
         </p:txBody>
       </p:sp>
@@ -2649,8 +2611,8 @@
         </p:nvSpPr>
         <p:spPr>
           <a:xfrm>
-            <a:off x="265500" y="1233175"/>
-            <a:ext cx="4045200" cy="1482300"/>
+            <a:off x="287625" y="1644233"/>
+            <a:ext cx="4382300" cy="1976400"/>
           </a:xfrm>
           <a:prstGeom prst="rect">
             <a:avLst/>
@@ -2778,8 +2740,8 @@
         </p:nvSpPr>
         <p:spPr>
           <a:xfrm>
-            <a:off x="265500" y="2803075"/>
-            <a:ext cx="4045200" cy="1235100"/>
+            <a:off x="287625" y="3737433"/>
+            <a:ext cx="4382300" cy="1646800"/>
           </a:xfrm>
           <a:prstGeom prst="rect">
             <a:avLst/>
@@ -2934,8 +2896,8 @@
         </p:nvSpPr>
         <p:spPr>
           <a:xfrm>
-            <a:off x="4939500" y="724075"/>
-            <a:ext cx="3837000" cy="3695100"/>
+            <a:off x="5351125" y="965433"/>
+            <a:ext cx="4156750" cy="4926800"/>
           </a:xfrm>
           <a:prstGeom prst="rect">
             <a:avLst/>
@@ -3063,8 +3025,8 @@
         </p:nvSpPr>
         <p:spPr>
           <a:xfrm>
-            <a:off x="8472458" y="4663217"/>
-            <a:ext cx="548700" cy="393600"/>
+            <a:off x="9178496" y="6217623"/>
+            <a:ext cx="594425" cy="524800"/>
           </a:xfrm>
           <a:prstGeom prst="rect">
             <a:avLst/>
@@ -3113,20 +3075,12 @@
             </a:lvl9pPr>
           </a:lstStyle>
           <a:p>
-            <a:pPr marL="0" lvl="0" indent="0" algn="r" rtl="0">
-              <a:spcBef>
-                <a:spcPts val="0"/>
-              </a:spcBef>
-              <a:spcAft>
-                <a:spcPts val="0"/>
-              </a:spcAft>
-              <a:buNone/>
-            </a:pPr>
             <a:fld id="{00000000-1234-1234-1234-123412341234}" type="slidenum">
-              <a:rPr lang="en"/>
+              <a:rPr lang="en" smtClean="0"/>
+              <a:pPr/>
               <a:t>‹#›</a:t>
             </a:fld>
-            <a:endParaRPr/>
+            <a:endParaRPr lang="en"/>
           </a:p>
         </p:txBody>
       </p:sp>
@@ -3167,8 +3121,8 @@
         </p:nvSpPr>
         <p:spPr>
           <a:xfrm>
-            <a:off x="311700" y="4230575"/>
-            <a:ext cx="5998800" cy="605100"/>
+            <a:off x="337675" y="5640767"/>
+            <a:ext cx="6498700" cy="806800"/>
           </a:xfrm>
           <a:prstGeom prst="rect">
             <a:avLst/>
@@ -3211,8 +3165,8 @@
         </p:nvSpPr>
         <p:spPr>
           <a:xfrm>
-            <a:off x="8472458" y="4663217"/>
-            <a:ext cx="548700" cy="393600"/>
+            <a:off x="9178496" y="6217623"/>
+            <a:ext cx="594425" cy="524800"/>
           </a:xfrm>
           <a:prstGeom prst="rect">
             <a:avLst/>
@@ -3261,20 +3215,12 @@
             </a:lvl9pPr>
           </a:lstStyle>
           <a:p>
-            <a:pPr marL="0" lvl="0" indent="0" algn="r" rtl="0">
-              <a:spcBef>
-                <a:spcPts val="0"/>
-              </a:spcBef>
-              <a:spcAft>
-                <a:spcPts val="0"/>
-              </a:spcAft>
-              <a:buNone/>
-            </a:pPr>
             <a:fld id="{00000000-1234-1234-1234-123412341234}" type="slidenum">
-              <a:rPr lang="en"/>
+              <a:rPr lang="en" smtClean="0"/>
+              <a:pPr/>
               <a:t>‹#›</a:t>
             </a:fld>
-            <a:endParaRPr/>
+            <a:endParaRPr lang="en"/>
           </a:p>
         </p:txBody>
       </p:sp>
@@ -3315,8 +3261,8 @@
         </p:nvSpPr>
         <p:spPr>
           <a:xfrm>
-            <a:off x="311700" y="1106125"/>
-            <a:ext cx="8520600" cy="1963500"/>
+            <a:off x="337675" y="1474833"/>
+            <a:ext cx="9230650" cy="2618000"/>
           </a:xfrm>
           <a:prstGeom prst="rect">
             <a:avLst/>
@@ -3446,8 +3392,8 @@
         </p:nvSpPr>
         <p:spPr>
           <a:xfrm>
-            <a:off x="311700" y="3152225"/>
-            <a:ext cx="8520600" cy="1300800"/>
+            <a:off x="337675" y="4202967"/>
+            <a:ext cx="9230650" cy="1734400"/>
           </a:xfrm>
           <a:prstGeom prst="rect">
             <a:avLst/>
@@ -3575,8 +3521,8 @@
         </p:nvSpPr>
         <p:spPr>
           <a:xfrm>
-            <a:off x="8472458" y="4663217"/>
-            <a:ext cx="548700" cy="393600"/>
+            <a:off x="9178496" y="6217623"/>
+            <a:ext cx="594425" cy="524800"/>
           </a:xfrm>
           <a:prstGeom prst="rect">
             <a:avLst/>
@@ -3625,20 +3571,12 @@
             </a:lvl9pPr>
           </a:lstStyle>
           <a:p>
-            <a:pPr marL="0" lvl="0" indent="0" algn="r" rtl="0">
-              <a:spcBef>
-                <a:spcPts val="0"/>
-              </a:spcBef>
-              <a:spcAft>
-                <a:spcPts val="0"/>
-              </a:spcAft>
-              <a:buNone/>
-            </a:pPr>
             <a:fld id="{00000000-1234-1234-1234-123412341234}" type="slidenum">
-              <a:rPr lang="en"/>
+              <a:rPr lang="en" smtClean="0"/>
+              <a:pPr/>
               <a:t>‹#›</a:t>
             </a:fld>
-            <a:endParaRPr/>
+            <a:endParaRPr lang="en"/>
           </a:p>
         </p:txBody>
       </p:sp>
@@ -3679,8 +3617,8 @@
         </p:nvSpPr>
         <p:spPr>
           <a:xfrm>
-            <a:off x="8472458" y="4663217"/>
-            <a:ext cx="548700" cy="393600"/>
+            <a:off x="9178496" y="6217623"/>
+            <a:ext cx="594425" cy="524800"/>
           </a:xfrm>
           <a:prstGeom prst="rect">
             <a:avLst/>
@@ -3729,20 +3667,12 @@
             </a:lvl9pPr>
           </a:lstStyle>
           <a:p>
-            <a:pPr marL="0" lvl="0" indent="0" algn="r" rtl="0">
-              <a:spcBef>
-                <a:spcPts val="0"/>
-              </a:spcBef>
-              <a:spcAft>
-                <a:spcPts val="0"/>
-              </a:spcAft>
-              <a:buNone/>
-            </a:pPr>
             <a:fld id="{00000000-1234-1234-1234-123412341234}" type="slidenum">
-              <a:rPr lang="en"/>
+              <a:rPr lang="en" smtClean="0"/>
+              <a:pPr/>
               <a:t>‹#›</a:t>
             </a:fld>
-            <a:endParaRPr/>
+            <a:endParaRPr lang="en"/>
           </a:p>
         </p:txBody>
       </p:sp>
@@ -3791,8 +3721,8 @@
         </p:nvSpPr>
         <p:spPr>
           <a:xfrm>
-            <a:off x="311700" y="445025"/>
-            <a:ext cx="8520600" cy="572700"/>
+            <a:off x="337675" y="593367"/>
+            <a:ext cx="9230650" cy="763600"/>
           </a:xfrm>
           <a:prstGeom prst="rect">
             <a:avLst/>
@@ -3987,8 +3917,8 @@
         </p:nvSpPr>
         <p:spPr>
           <a:xfrm>
-            <a:off x="311700" y="1152475"/>
-            <a:ext cx="8520600" cy="3416400"/>
+            <a:off x="337675" y="1536633"/>
+            <a:ext cx="9230650" cy="4555200"/>
           </a:xfrm>
           <a:prstGeom prst="rect">
             <a:avLst/>
@@ -4210,8 +4140,8 @@
         </p:nvSpPr>
         <p:spPr>
           <a:xfrm>
-            <a:off x="8472458" y="4663217"/>
-            <a:ext cx="548700" cy="393600"/>
+            <a:off x="9178496" y="6217623"/>
+            <a:ext cx="594425" cy="524800"/>
           </a:xfrm>
           <a:prstGeom prst="rect">
             <a:avLst/>
@@ -4300,20 +4230,12 @@
             </a:lvl9pPr>
           </a:lstStyle>
           <a:p>
-            <a:pPr marL="0" lvl="0" indent="0" algn="r" rtl="0">
-              <a:spcBef>
-                <a:spcPts val="0"/>
-              </a:spcBef>
-              <a:spcAft>
-                <a:spcPts val="0"/>
-              </a:spcAft>
-              <a:buNone/>
-            </a:pPr>
             <a:fld id="{00000000-1234-1234-1234-123412341234}" type="slidenum">
-              <a:rPr lang="en"/>
+              <a:rPr lang="en" smtClean="0"/>
+              <a:pPr/>
               <a:t>‹#›</a:t>
             </a:fld>
-            <a:endParaRPr/>
+            <a:endParaRPr lang="en"/>
           </a:p>
         </p:txBody>
       </p:sp>
@@ -5060,7 +4982,7 @@
         </p:nvSpPr>
         <p:spPr>
           <a:xfrm>
-            <a:off x="242303" y="-14075"/>
+            <a:off x="623303" y="843175"/>
             <a:ext cx="8520600" cy="572700"/>
           </a:xfrm>
         </p:spPr>
@@ -5122,7 +5044,7 @@
         </p:nvSpPr>
         <p:spPr>
           <a:xfrm>
-            <a:off x="3472831" y="673439"/>
+            <a:off x="3853832" y="1530690"/>
             <a:ext cx="1619285" cy="417175"/>
           </a:xfrm>
           <a:prstGeom prst="rect">
@@ -5178,7 +5100,7 @@
         </p:nvCxnSpPr>
         <p:spPr>
           <a:xfrm>
-            <a:off x="2549630" y="3538344"/>
+            <a:off x="2930630" y="4395596"/>
             <a:ext cx="0" cy="271983"/>
           </a:xfrm>
           <a:prstGeom prst="straightConnector1">
@@ -5217,7 +5139,7 @@
         </p:nvGrpSpPr>
         <p:grpSpPr>
           <a:xfrm>
-            <a:off x="498829" y="1527150"/>
+            <a:off x="879829" y="2384401"/>
             <a:ext cx="2362534" cy="3015095"/>
             <a:chOff x="2922503" y="1994560"/>
             <a:chExt cx="2897394" cy="2729260"/>
@@ -5386,7 +5308,7 @@
         </p:nvGrpSpPr>
         <p:grpSpPr>
           <a:xfrm>
-            <a:off x="3371716" y="1357369"/>
+            <a:off x="3752718" y="2214619"/>
             <a:ext cx="1898723" cy="2971908"/>
             <a:chOff x="2922503" y="1994560"/>
             <a:chExt cx="2897394" cy="2729260"/>
@@ -5555,7 +5477,7 @@
         </p:nvSpPr>
         <p:spPr>
           <a:xfrm>
-            <a:off x="5766447" y="1321120"/>
+            <a:off x="6147447" y="2178372"/>
             <a:ext cx="2522102" cy="3008157"/>
           </a:xfrm>
           <a:prstGeom prst="rect">
@@ -5601,7 +5523,7 @@
         </p:nvSpPr>
         <p:spPr>
           <a:xfrm>
-            <a:off x="6073149" y="1513563"/>
+            <a:off x="6454149" y="2370813"/>
             <a:ext cx="1863246" cy="1007840"/>
           </a:xfrm>
           <a:prstGeom prst="diamond">
@@ -5660,7 +5582,7 @@
         </p:nvSpPr>
         <p:spPr>
           <a:xfrm>
-            <a:off x="6057009" y="2665022"/>
+            <a:off x="6438010" y="3522274"/>
             <a:ext cx="1931969" cy="1084155"/>
           </a:xfrm>
           <a:prstGeom prst="diamond">
@@ -5722,7 +5644,7 @@
         </p:nvCxnSpPr>
         <p:spPr>
           <a:xfrm flipV="1">
-            <a:off x="4741464" y="2055912"/>
+            <a:off x="5122465" y="2913164"/>
             <a:ext cx="1315545" cy="33531"/>
           </a:xfrm>
           <a:prstGeom prst="straightConnector1">
@@ -5765,7 +5687,7 @@
         </p:nvCxnSpPr>
         <p:spPr>
           <a:xfrm flipV="1">
-            <a:off x="2203172" y="2089443"/>
+            <a:off x="2584172" y="2946693"/>
             <a:ext cx="1622084" cy="180420"/>
           </a:xfrm>
           <a:prstGeom prst="straightConnector1">
@@ -5804,8 +5726,8 @@
         </p:nvSpPr>
         <p:spPr>
           <a:xfrm>
-            <a:off x="6858000" y="3939421"/>
-            <a:ext cx="617220" cy="307777"/>
+            <a:off x="7239000" y="4796672"/>
+            <a:ext cx="617220" cy="345159"/>
           </a:xfrm>
           <a:prstGeom prst="rect">
             <a:avLst/>
@@ -5839,8 +5761,8 @@
         </p:nvSpPr>
         <p:spPr>
           <a:xfrm>
-            <a:off x="4111024" y="4021500"/>
-            <a:ext cx="617220" cy="307777"/>
+            <a:off x="4492024" y="4878752"/>
+            <a:ext cx="617220" cy="345159"/>
           </a:xfrm>
           <a:prstGeom prst="rect">
             <a:avLst/>
@@ -5874,8 +5796,8 @@
         </p:nvSpPr>
         <p:spPr>
           <a:xfrm>
-            <a:off x="1360170" y="4045723"/>
-            <a:ext cx="617220" cy="307777"/>
+            <a:off x="1741170" y="4902974"/>
+            <a:ext cx="617220" cy="345159"/>
           </a:xfrm>
           <a:prstGeom prst="rect">
             <a:avLst/>
@@ -5909,8 +5831,8 @@
         </p:nvSpPr>
         <p:spPr>
           <a:xfrm>
-            <a:off x="1321893" y="4608374"/>
-            <a:ext cx="617220" cy="523220"/>
+            <a:off x="1702893" y="5465624"/>
+            <a:ext cx="617220" cy="850810"/>
           </a:xfrm>
           <a:prstGeom prst="rect">
             <a:avLst/>
@@ -5944,8 +5866,8 @@
         </p:nvSpPr>
         <p:spPr>
           <a:xfrm>
-            <a:off x="4050418" y="4327188"/>
-            <a:ext cx="617220" cy="523220"/>
+            <a:off x="4431418" y="5184438"/>
+            <a:ext cx="617220" cy="850810"/>
           </a:xfrm>
           <a:prstGeom prst="rect">
             <a:avLst/>
@@ -5979,8 +5901,8 @@
         </p:nvSpPr>
         <p:spPr>
           <a:xfrm>
-            <a:off x="6714383" y="4499406"/>
-            <a:ext cx="1107724" cy="307777"/>
+            <a:off x="7095383" y="5356657"/>
+            <a:ext cx="1107724" cy="345159"/>
           </a:xfrm>
           <a:prstGeom prst="rect">
             <a:avLst/>
@@ -6004,6 +5926,2805 @@
     <p:extLst>
       <p:ext uri="{BB962C8B-B14F-4D97-AF65-F5344CB8AC3E}">
         <p14:creationId xmlns:p14="http://schemas.microsoft.com/office/powerpoint/2010/main" val="566296359"/>
+      </p:ext>
+    </p:extLst>
+  </p:cSld>
+  <p:clrMapOvr>
+    <a:masterClrMapping/>
+  </p:clrMapOvr>
+</p:sld>
+</file>
+
+<file path=ppt/slides/slide2.xml><?xml version="1.0" encoding="utf-8"?>
+<p:sld xmlns:a="http://schemas.openxmlformats.org/drawingml/2006/main" xmlns:r="http://schemas.openxmlformats.org/officeDocument/2006/relationships" xmlns:p="http://schemas.openxmlformats.org/presentationml/2006/main">
+  <p:cSld>
+    <p:spTree>
+      <p:nvGrpSpPr>
+        <p:cNvPr id="1" name=""/>
+        <p:cNvGrpSpPr/>
+        <p:nvPr/>
+      </p:nvGrpSpPr>
+      <p:grpSpPr>
+        <a:xfrm>
+          <a:off x="0" y="0"/>
+          <a:ext cx="0" cy="0"/>
+          <a:chOff x="0" y="0"/>
+          <a:chExt cx="0" cy="0"/>
+        </a:xfrm>
+      </p:grpSpPr>
+      <p:sp>
+        <p:nvSpPr>
+          <p:cNvPr id="4" name="Rectangle 3">
+            <a:extLst>
+              <a:ext uri="{FF2B5EF4-FFF2-40B4-BE49-F238E27FC236}">
+                <a16:creationId xmlns:a16="http://schemas.microsoft.com/office/drawing/2014/main" id="{E2F87E50-0490-4E44-828B-C9AE39D91839}"/>
+              </a:ext>
+            </a:extLst>
+          </p:cNvPr>
+          <p:cNvSpPr/>
+          <p:nvPr/>
+        </p:nvSpPr>
+        <p:spPr>
+          <a:xfrm>
+            <a:off x="528918" y="998444"/>
+            <a:ext cx="8693524" cy="4861112"/>
+          </a:xfrm>
+          <a:prstGeom prst="rect">
+            <a:avLst/>
+          </a:prstGeom>
+          <a:ln>
+            <a:solidFill>
+              <a:schemeClr val="tx1"/>
+            </a:solidFill>
+          </a:ln>
+        </p:spPr>
+        <p:style>
+          <a:lnRef idx="2">
+            <a:schemeClr val="accent1"/>
+          </a:lnRef>
+          <a:fillRef idx="1">
+            <a:schemeClr val="lt1"/>
+          </a:fillRef>
+          <a:effectRef idx="0">
+            <a:schemeClr val="accent1"/>
+          </a:effectRef>
+          <a:fontRef idx="minor">
+            <a:schemeClr val="dk1"/>
+          </a:fontRef>
+        </p:style>
+        <p:txBody>
+          <a:bodyPr rtlCol="0" anchor="ctr"/>
+          <a:lstStyle/>
+          <a:p>
+            <a:pPr algn="ctr"/>
+            <a:endParaRPr lang="en-US"/>
+          </a:p>
+        </p:txBody>
+      </p:sp>
+      <p:sp>
+        <p:nvSpPr>
+          <p:cNvPr id="5" name="Rectangle 4">
+            <a:extLst>
+              <a:ext uri="{FF2B5EF4-FFF2-40B4-BE49-F238E27FC236}">
+                <a16:creationId xmlns:a16="http://schemas.microsoft.com/office/drawing/2014/main" id="{E8FD70E8-5199-4454-82E4-98C7361D7F04}"/>
+              </a:ext>
+            </a:extLst>
+          </p:cNvPr>
+          <p:cNvSpPr/>
+          <p:nvPr/>
+        </p:nvSpPr>
+        <p:spPr>
+          <a:xfrm>
+            <a:off x="1365531" y="3085358"/>
+            <a:ext cx="876300" cy="469900"/>
+          </a:xfrm>
+          <a:prstGeom prst="rect">
+            <a:avLst/>
+          </a:prstGeom>
+          <a:solidFill>
+            <a:schemeClr val="accent5"/>
+          </a:solidFill>
+          <a:ln>
+            <a:solidFill>
+              <a:schemeClr val="tx1"/>
+            </a:solidFill>
+          </a:ln>
+          <a:effectLst>
+            <a:innerShdw blurRad="63500" dist="50800" dir="5400000">
+              <a:prstClr val="black">
+                <a:alpha val="50000"/>
+              </a:prstClr>
+            </a:innerShdw>
+          </a:effectLst>
+        </p:spPr>
+        <p:style>
+          <a:lnRef idx="2">
+            <a:schemeClr val="accent1">
+              <a:shade val="50000"/>
+            </a:schemeClr>
+          </a:lnRef>
+          <a:fillRef idx="1">
+            <a:schemeClr val="accent1"/>
+          </a:fillRef>
+          <a:effectRef idx="0">
+            <a:schemeClr val="accent1"/>
+          </a:effectRef>
+          <a:fontRef idx="minor">
+            <a:schemeClr val="lt1"/>
+          </a:fontRef>
+        </p:style>
+        <p:txBody>
+          <a:bodyPr rtlCol="0" anchor="ctr"/>
+          <a:lstStyle/>
+          <a:p>
+            <a:pPr algn="ctr"/>
+            <a:r>
+              <a:rPr lang="en-US" dirty="0"/>
+              <a:t>Client</a:t>
+            </a:r>
+          </a:p>
+        </p:txBody>
+      </p:sp>
+      <p:cxnSp>
+        <p:nvCxnSpPr>
+          <p:cNvPr id="7" name="Straight Arrow Connector 6">
+            <a:extLst>
+              <a:ext uri="{FF2B5EF4-FFF2-40B4-BE49-F238E27FC236}">
+                <a16:creationId xmlns:a16="http://schemas.microsoft.com/office/drawing/2014/main" id="{0ECCB4E3-62B7-4416-8780-610CC5C028C5}"/>
+              </a:ext>
+            </a:extLst>
+          </p:cNvPr>
+          <p:cNvCxnSpPr>
+            <a:cxnSpLocks/>
+            <a:stCxn id="5" idx="3"/>
+            <a:endCxn id="9" idx="1"/>
+          </p:cNvCxnSpPr>
+          <p:nvPr/>
+        </p:nvCxnSpPr>
+        <p:spPr>
+          <a:xfrm flipV="1">
+            <a:off x="2241831" y="3320290"/>
+            <a:ext cx="332160" cy="18"/>
+          </a:xfrm>
+          <a:prstGeom prst="straightConnector1">
+            <a:avLst/>
+          </a:prstGeom>
+          <a:ln w="28575">
+            <a:solidFill>
+              <a:schemeClr val="accent3"/>
+            </a:solidFill>
+            <a:tailEnd type="triangle"/>
+          </a:ln>
+        </p:spPr>
+        <p:style>
+          <a:lnRef idx="1">
+            <a:schemeClr val="accent1"/>
+          </a:lnRef>
+          <a:fillRef idx="0">
+            <a:schemeClr val="accent1"/>
+          </a:fillRef>
+          <a:effectRef idx="0">
+            <a:schemeClr val="accent1"/>
+          </a:effectRef>
+          <a:fontRef idx="minor">
+            <a:schemeClr val="tx1"/>
+          </a:fontRef>
+        </p:style>
+      </p:cxnSp>
+      <p:sp>
+        <p:nvSpPr>
+          <p:cNvPr id="9" name="Rectangle 8">
+            <a:extLst>
+              <a:ext uri="{FF2B5EF4-FFF2-40B4-BE49-F238E27FC236}">
+                <a16:creationId xmlns:a16="http://schemas.microsoft.com/office/drawing/2014/main" id="{7313618B-AD65-407A-B001-BB64B6CF12E3}"/>
+              </a:ext>
+            </a:extLst>
+          </p:cNvPr>
+          <p:cNvSpPr/>
+          <p:nvPr/>
+        </p:nvSpPr>
+        <p:spPr>
+          <a:xfrm>
+            <a:off x="2573992" y="2990090"/>
+            <a:ext cx="1403348" cy="660400"/>
+          </a:xfrm>
+          <a:prstGeom prst="rect">
+            <a:avLst/>
+          </a:prstGeom>
+          <a:solidFill>
+            <a:schemeClr val="accent6">
+              <a:lumMod val="50000"/>
+            </a:schemeClr>
+          </a:solidFill>
+          <a:ln>
+            <a:solidFill>
+              <a:schemeClr val="tx1"/>
+            </a:solidFill>
+          </a:ln>
+          <a:effectLst>
+            <a:innerShdw blurRad="63500" dist="50800" dir="5400000">
+              <a:prstClr val="black">
+                <a:alpha val="50000"/>
+              </a:prstClr>
+            </a:innerShdw>
+          </a:effectLst>
+        </p:spPr>
+        <p:style>
+          <a:lnRef idx="2">
+            <a:schemeClr val="accent1">
+              <a:shade val="50000"/>
+            </a:schemeClr>
+          </a:lnRef>
+          <a:fillRef idx="1">
+            <a:schemeClr val="accent1"/>
+          </a:fillRef>
+          <a:effectRef idx="0">
+            <a:schemeClr val="accent1"/>
+          </a:effectRef>
+          <a:fontRef idx="minor">
+            <a:schemeClr val="lt1"/>
+          </a:fontRef>
+        </p:style>
+        <p:txBody>
+          <a:bodyPr rtlCol="0" anchor="ctr"/>
+          <a:lstStyle/>
+          <a:p>
+            <a:pPr algn="ctr"/>
+            <a:r>
+              <a:rPr lang="en-US" dirty="0"/>
+              <a:t>Load Balancer</a:t>
+            </a:r>
+          </a:p>
+          <a:p>
+            <a:pPr algn="ctr"/>
+            <a:r>
+              <a:rPr lang="en-US" dirty="0"/>
+              <a:t>(AWS ELB)</a:t>
+            </a:r>
+          </a:p>
+        </p:txBody>
+      </p:sp>
+      <p:cxnSp>
+        <p:nvCxnSpPr>
+          <p:cNvPr id="11" name="Straight Arrow Connector 10">
+            <a:extLst>
+              <a:ext uri="{FF2B5EF4-FFF2-40B4-BE49-F238E27FC236}">
+                <a16:creationId xmlns:a16="http://schemas.microsoft.com/office/drawing/2014/main" id="{D1E34953-6D74-438E-B678-857C921FE545}"/>
+              </a:ext>
+            </a:extLst>
+          </p:cNvPr>
+          <p:cNvCxnSpPr>
+            <a:cxnSpLocks/>
+            <a:stCxn id="5" idx="0"/>
+            <a:endCxn id="12" idx="2"/>
+          </p:cNvCxnSpPr>
+          <p:nvPr/>
+        </p:nvCxnSpPr>
+        <p:spPr>
+          <a:xfrm flipV="1">
+            <a:off x="1803681" y="2665316"/>
+            <a:ext cx="0" cy="420043"/>
+          </a:xfrm>
+          <a:prstGeom prst="straightConnector1">
+            <a:avLst/>
+          </a:prstGeom>
+          <a:ln w="28575">
+            <a:solidFill>
+              <a:schemeClr val="accent3"/>
+            </a:solidFill>
+            <a:tailEnd type="triangle"/>
+          </a:ln>
+        </p:spPr>
+        <p:style>
+          <a:lnRef idx="1">
+            <a:schemeClr val="accent1"/>
+          </a:lnRef>
+          <a:fillRef idx="0">
+            <a:schemeClr val="accent1"/>
+          </a:fillRef>
+          <a:effectRef idx="0">
+            <a:schemeClr val="accent1"/>
+          </a:effectRef>
+          <a:fontRef idx="minor">
+            <a:schemeClr val="tx1"/>
+          </a:fontRef>
+        </p:style>
+      </p:cxnSp>
+      <p:sp>
+        <p:nvSpPr>
+          <p:cNvPr id="12" name="Rectangle 11">
+            <a:extLst>
+              <a:ext uri="{FF2B5EF4-FFF2-40B4-BE49-F238E27FC236}">
+                <a16:creationId xmlns:a16="http://schemas.microsoft.com/office/drawing/2014/main" id="{8CE8E64C-DFA3-4422-8658-A39F2E06FB6F}"/>
+              </a:ext>
+            </a:extLst>
+          </p:cNvPr>
+          <p:cNvSpPr/>
+          <p:nvPr/>
+        </p:nvSpPr>
+        <p:spPr>
+          <a:xfrm>
+            <a:off x="1102010" y="2195423"/>
+            <a:ext cx="1403343" cy="469893"/>
+          </a:xfrm>
+          <a:prstGeom prst="rect">
+            <a:avLst/>
+          </a:prstGeom>
+          <a:solidFill>
+            <a:schemeClr val="accent4">
+              <a:lumMod val="60000"/>
+              <a:lumOff val="40000"/>
+            </a:schemeClr>
+          </a:solidFill>
+          <a:ln>
+            <a:solidFill>
+              <a:schemeClr val="tx1"/>
+            </a:solidFill>
+          </a:ln>
+          <a:effectLst>
+            <a:innerShdw blurRad="63500" dist="50800" dir="5400000">
+              <a:prstClr val="black">
+                <a:alpha val="50000"/>
+              </a:prstClr>
+            </a:innerShdw>
+          </a:effectLst>
+        </p:spPr>
+        <p:style>
+          <a:lnRef idx="2">
+            <a:schemeClr val="accent1">
+              <a:shade val="50000"/>
+            </a:schemeClr>
+          </a:lnRef>
+          <a:fillRef idx="1">
+            <a:schemeClr val="accent1"/>
+          </a:fillRef>
+          <a:effectRef idx="0">
+            <a:schemeClr val="accent1"/>
+          </a:effectRef>
+          <a:fontRef idx="minor">
+            <a:schemeClr val="lt1"/>
+          </a:fontRef>
+        </p:style>
+        <p:txBody>
+          <a:bodyPr rtlCol="0" anchor="ctr"/>
+          <a:lstStyle/>
+          <a:p>
+            <a:pPr algn="ctr"/>
+            <a:r>
+              <a:rPr lang="en-US" dirty="0"/>
+              <a:t>DNS</a:t>
+            </a:r>
+          </a:p>
+          <a:p>
+            <a:pPr algn="ctr"/>
+            <a:r>
+              <a:rPr lang="en-US" dirty="0"/>
+              <a:t>(AWS route53)</a:t>
+            </a:r>
+          </a:p>
+        </p:txBody>
+      </p:sp>
+      <p:cxnSp>
+        <p:nvCxnSpPr>
+          <p:cNvPr id="14" name="Straight Arrow Connector 13">
+            <a:extLst>
+              <a:ext uri="{FF2B5EF4-FFF2-40B4-BE49-F238E27FC236}">
+                <a16:creationId xmlns:a16="http://schemas.microsoft.com/office/drawing/2014/main" id="{31830326-FAB2-4129-8F39-1CAE7ED44A9F}"/>
+              </a:ext>
+            </a:extLst>
+          </p:cNvPr>
+          <p:cNvCxnSpPr>
+            <a:cxnSpLocks/>
+            <a:stCxn id="9" idx="3"/>
+            <a:endCxn id="16" idx="1"/>
+          </p:cNvCxnSpPr>
+          <p:nvPr/>
+        </p:nvCxnSpPr>
+        <p:spPr>
+          <a:xfrm>
+            <a:off x="3977339" y="3320290"/>
+            <a:ext cx="395776" cy="0"/>
+          </a:xfrm>
+          <a:prstGeom prst="straightConnector1">
+            <a:avLst/>
+          </a:prstGeom>
+          <a:ln w="28575">
+            <a:solidFill>
+              <a:schemeClr val="accent3"/>
+            </a:solidFill>
+            <a:tailEnd type="triangle"/>
+          </a:ln>
+        </p:spPr>
+        <p:style>
+          <a:lnRef idx="1">
+            <a:schemeClr val="accent1"/>
+          </a:lnRef>
+          <a:fillRef idx="0">
+            <a:schemeClr val="accent1"/>
+          </a:fillRef>
+          <a:effectRef idx="0">
+            <a:schemeClr val="accent1"/>
+          </a:effectRef>
+          <a:fontRef idx="minor">
+            <a:schemeClr val="tx1"/>
+          </a:fontRef>
+        </p:style>
+      </p:cxnSp>
+      <p:sp>
+        <p:nvSpPr>
+          <p:cNvPr id="16" name="Rectangle 15">
+            <a:extLst>
+              <a:ext uri="{FF2B5EF4-FFF2-40B4-BE49-F238E27FC236}">
+                <a16:creationId xmlns:a16="http://schemas.microsoft.com/office/drawing/2014/main" id="{856A4B2A-615B-4C27-B534-3640346628ED}"/>
+              </a:ext>
+            </a:extLst>
+          </p:cNvPr>
+          <p:cNvSpPr/>
+          <p:nvPr/>
+        </p:nvSpPr>
+        <p:spPr>
+          <a:xfrm>
+            <a:off x="4373117" y="2990090"/>
+            <a:ext cx="1353091" cy="660400"/>
+          </a:xfrm>
+          <a:prstGeom prst="rect">
+            <a:avLst/>
+          </a:prstGeom>
+          <a:solidFill>
+            <a:schemeClr val="accent4">
+              <a:lumMod val="50000"/>
+            </a:schemeClr>
+          </a:solidFill>
+          <a:ln>
+            <a:solidFill>
+              <a:schemeClr val="tx1"/>
+            </a:solidFill>
+          </a:ln>
+          <a:effectLst>
+            <a:innerShdw blurRad="63500" dist="50800" dir="5400000">
+              <a:prstClr val="black">
+                <a:alpha val="50000"/>
+              </a:prstClr>
+            </a:innerShdw>
+          </a:effectLst>
+        </p:spPr>
+        <p:style>
+          <a:lnRef idx="2">
+            <a:schemeClr val="accent1">
+              <a:shade val="50000"/>
+            </a:schemeClr>
+          </a:lnRef>
+          <a:fillRef idx="1">
+            <a:schemeClr val="accent1"/>
+          </a:fillRef>
+          <a:effectRef idx="0">
+            <a:schemeClr val="accent1"/>
+          </a:effectRef>
+          <a:fontRef idx="minor">
+            <a:schemeClr val="lt1"/>
+          </a:fontRef>
+        </p:style>
+        <p:txBody>
+          <a:bodyPr rtlCol="0" anchor="ctr"/>
+          <a:lstStyle/>
+          <a:p>
+            <a:pPr algn="ctr"/>
+            <a:r>
+              <a:rPr lang="en-US" dirty="0"/>
+              <a:t>Web Server</a:t>
+            </a:r>
+          </a:p>
+          <a:p>
+            <a:pPr algn="ctr"/>
+            <a:r>
+              <a:rPr lang="en-US" dirty="0"/>
+              <a:t>(AWS EC2)</a:t>
+            </a:r>
+          </a:p>
+        </p:txBody>
+      </p:sp>
+      <p:cxnSp>
+        <p:nvCxnSpPr>
+          <p:cNvPr id="21" name="Straight Arrow Connector 20">
+            <a:extLst>
+              <a:ext uri="{FF2B5EF4-FFF2-40B4-BE49-F238E27FC236}">
+                <a16:creationId xmlns:a16="http://schemas.microsoft.com/office/drawing/2014/main" id="{408C694A-22CA-416A-8746-403B0456A852}"/>
+              </a:ext>
+            </a:extLst>
+          </p:cNvPr>
+          <p:cNvCxnSpPr>
+            <a:cxnSpLocks/>
+            <a:stCxn id="16" idx="3"/>
+            <a:endCxn id="22" idx="1"/>
+          </p:cNvCxnSpPr>
+          <p:nvPr/>
+        </p:nvCxnSpPr>
+        <p:spPr>
+          <a:xfrm flipV="1">
+            <a:off x="5726208" y="2666615"/>
+            <a:ext cx="958103" cy="653677"/>
+          </a:xfrm>
+          <a:prstGeom prst="straightConnector1">
+            <a:avLst/>
+          </a:prstGeom>
+          <a:ln w="28575">
+            <a:solidFill>
+              <a:schemeClr val="accent3"/>
+            </a:solidFill>
+            <a:tailEnd type="triangle"/>
+          </a:ln>
+        </p:spPr>
+        <p:style>
+          <a:lnRef idx="1">
+            <a:schemeClr val="accent1"/>
+          </a:lnRef>
+          <a:fillRef idx="0">
+            <a:schemeClr val="accent1"/>
+          </a:fillRef>
+          <a:effectRef idx="0">
+            <a:schemeClr val="accent1"/>
+          </a:effectRef>
+          <a:fontRef idx="minor">
+            <a:schemeClr val="tx1"/>
+          </a:fontRef>
+        </p:style>
+      </p:cxnSp>
+      <p:sp>
+        <p:nvSpPr>
+          <p:cNvPr id="22" name="Rectangle 21">
+            <a:extLst>
+              <a:ext uri="{FF2B5EF4-FFF2-40B4-BE49-F238E27FC236}">
+                <a16:creationId xmlns:a16="http://schemas.microsoft.com/office/drawing/2014/main" id="{5F792741-851A-4D50-A142-5A46EA2598C7}"/>
+              </a:ext>
+            </a:extLst>
+          </p:cNvPr>
+          <p:cNvSpPr/>
+          <p:nvPr/>
+        </p:nvSpPr>
+        <p:spPr>
+          <a:xfrm>
+            <a:off x="6684309" y="2343136"/>
+            <a:ext cx="1295400" cy="646954"/>
+          </a:xfrm>
+          <a:prstGeom prst="rect">
+            <a:avLst/>
+          </a:prstGeom>
+          <a:ln>
+            <a:solidFill>
+              <a:schemeClr val="tx1"/>
+            </a:solidFill>
+          </a:ln>
+          <a:effectLst>
+            <a:innerShdw blurRad="63500" dist="50800" dir="5400000">
+              <a:prstClr val="black">
+                <a:alpha val="50000"/>
+              </a:prstClr>
+            </a:innerShdw>
+          </a:effectLst>
+        </p:spPr>
+        <p:style>
+          <a:lnRef idx="2">
+            <a:schemeClr val="accent1">
+              <a:shade val="50000"/>
+            </a:schemeClr>
+          </a:lnRef>
+          <a:fillRef idx="1">
+            <a:schemeClr val="accent1"/>
+          </a:fillRef>
+          <a:effectRef idx="0">
+            <a:schemeClr val="accent1"/>
+          </a:effectRef>
+          <a:fontRef idx="minor">
+            <a:schemeClr val="lt1"/>
+          </a:fontRef>
+        </p:style>
+        <p:txBody>
+          <a:bodyPr rtlCol="0" anchor="ctr"/>
+          <a:lstStyle/>
+          <a:p>
+            <a:pPr algn="ctr"/>
+            <a:r>
+              <a:rPr lang="en-US" dirty="0"/>
+              <a:t>Model Training Service</a:t>
+            </a:r>
+          </a:p>
+        </p:txBody>
+      </p:sp>
+      <p:cxnSp>
+        <p:nvCxnSpPr>
+          <p:cNvPr id="26" name="Straight Arrow Connector 25">
+            <a:extLst>
+              <a:ext uri="{FF2B5EF4-FFF2-40B4-BE49-F238E27FC236}">
+                <a16:creationId xmlns:a16="http://schemas.microsoft.com/office/drawing/2014/main" id="{F3E2987F-FEF3-40E6-9F29-467550C8F144}"/>
+              </a:ext>
+            </a:extLst>
+          </p:cNvPr>
+          <p:cNvCxnSpPr>
+            <a:cxnSpLocks/>
+            <a:stCxn id="16" idx="3"/>
+            <a:endCxn id="27" idx="1"/>
+          </p:cNvCxnSpPr>
+          <p:nvPr/>
+        </p:nvCxnSpPr>
+        <p:spPr>
+          <a:xfrm>
+            <a:off x="5726207" y="3320290"/>
+            <a:ext cx="963122" cy="615956"/>
+          </a:xfrm>
+          <a:prstGeom prst="straightConnector1">
+            <a:avLst/>
+          </a:prstGeom>
+          <a:ln w="28575">
+            <a:solidFill>
+              <a:schemeClr val="accent3"/>
+            </a:solidFill>
+            <a:tailEnd type="triangle"/>
+          </a:ln>
+        </p:spPr>
+        <p:style>
+          <a:lnRef idx="1">
+            <a:schemeClr val="accent1"/>
+          </a:lnRef>
+          <a:fillRef idx="0">
+            <a:schemeClr val="accent1"/>
+          </a:fillRef>
+          <a:effectRef idx="0">
+            <a:schemeClr val="accent1"/>
+          </a:effectRef>
+          <a:fontRef idx="minor">
+            <a:schemeClr val="tx1"/>
+          </a:fontRef>
+        </p:style>
+      </p:cxnSp>
+      <p:sp>
+        <p:nvSpPr>
+          <p:cNvPr id="27" name="Rectangle 26">
+            <a:extLst>
+              <a:ext uri="{FF2B5EF4-FFF2-40B4-BE49-F238E27FC236}">
+                <a16:creationId xmlns:a16="http://schemas.microsoft.com/office/drawing/2014/main" id="{85693808-014C-41E5-9055-701F75E98E44}"/>
+              </a:ext>
+            </a:extLst>
+          </p:cNvPr>
+          <p:cNvSpPr/>
+          <p:nvPr/>
+        </p:nvSpPr>
+        <p:spPr>
+          <a:xfrm>
+            <a:off x="6689329" y="3612769"/>
+            <a:ext cx="1285361" cy="646954"/>
+          </a:xfrm>
+          <a:prstGeom prst="rect">
+            <a:avLst/>
+          </a:prstGeom>
+          <a:ln>
+            <a:solidFill>
+              <a:schemeClr val="tx1"/>
+            </a:solidFill>
+          </a:ln>
+          <a:effectLst>
+            <a:innerShdw blurRad="63500" dist="50800" dir="5400000">
+              <a:prstClr val="black">
+                <a:alpha val="50000"/>
+              </a:prstClr>
+            </a:innerShdw>
+          </a:effectLst>
+        </p:spPr>
+        <p:style>
+          <a:lnRef idx="2">
+            <a:schemeClr val="accent1">
+              <a:shade val="50000"/>
+            </a:schemeClr>
+          </a:lnRef>
+          <a:fillRef idx="1">
+            <a:schemeClr val="accent1"/>
+          </a:fillRef>
+          <a:effectRef idx="0">
+            <a:schemeClr val="accent1"/>
+          </a:effectRef>
+          <a:fontRef idx="minor">
+            <a:schemeClr val="lt1"/>
+          </a:fontRef>
+        </p:style>
+        <p:txBody>
+          <a:bodyPr rtlCol="0" anchor="ctr"/>
+          <a:lstStyle/>
+          <a:p>
+            <a:pPr algn="ctr"/>
+            <a:r>
+              <a:rPr lang="en-US" dirty="0"/>
+              <a:t>Model Prediction Service</a:t>
+            </a:r>
+          </a:p>
+        </p:txBody>
+      </p:sp>
+      <p:cxnSp>
+        <p:nvCxnSpPr>
+          <p:cNvPr id="31" name="Straight Arrow Connector 30">
+            <a:extLst>
+              <a:ext uri="{FF2B5EF4-FFF2-40B4-BE49-F238E27FC236}">
+                <a16:creationId xmlns:a16="http://schemas.microsoft.com/office/drawing/2014/main" id="{411A3AAB-D39B-4748-95C9-30318685561D}"/>
+              </a:ext>
+            </a:extLst>
+          </p:cNvPr>
+          <p:cNvCxnSpPr>
+            <a:cxnSpLocks/>
+            <a:stCxn id="32" idx="1"/>
+            <a:endCxn id="27" idx="2"/>
+          </p:cNvCxnSpPr>
+          <p:nvPr/>
+        </p:nvCxnSpPr>
+        <p:spPr>
+          <a:xfrm flipV="1">
+            <a:off x="7332007" y="4259723"/>
+            <a:ext cx="2" cy="407474"/>
+          </a:xfrm>
+          <a:prstGeom prst="straightConnector1">
+            <a:avLst/>
+          </a:prstGeom>
+          <a:ln w="28575">
+            <a:solidFill>
+              <a:schemeClr val="accent3"/>
+            </a:solidFill>
+            <a:tailEnd type="triangle"/>
+          </a:ln>
+        </p:spPr>
+        <p:style>
+          <a:lnRef idx="1">
+            <a:schemeClr val="accent1"/>
+          </a:lnRef>
+          <a:fillRef idx="0">
+            <a:schemeClr val="accent1"/>
+          </a:fillRef>
+          <a:effectRef idx="0">
+            <a:schemeClr val="accent1"/>
+          </a:effectRef>
+          <a:fontRef idx="minor">
+            <a:schemeClr val="tx1"/>
+          </a:fontRef>
+        </p:style>
+      </p:cxnSp>
+      <p:sp>
+        <p:nvSpPr>
+          <p:cNvPr id="32" name="Cylinder 31">
+            <a:extLst>
+              <a:ext uri="{FF2B5EF4-FFF2-40B4-BE49-F238E27FC236}">
+                <a16:creationId xmlns:a16="http://schemas.microsoft.com/office/drawing/2014/main" id="{50CC1A1E-251E-4F75-BBA3-74AD5332086F}"/>
+              </a:ext>
+            </a:extLst>
+          </p:cNvPr>
+          <p:cNvSpPr/>
+          <p:nvPr/>
+        </p:nvSpPr>
+        <p:spPr>
+          <a:xfrm>
+            <a:off x="6197313" y="4667197"/>
+            <a:ext cx="2269389" cy="607370"/>
+          </a:xfrm>
+          <a:prstGeom prst="can">
+            <a:avLst/>
+          </a:prstGeom>
+          <a:solidFill>
+            <a:schemeClr val="accent5">
+              <a:lumMod val="50000"/>
+            </a:schemeClr>
+          </a:solidFill>
+          <a:ln>
+            <a:solidFill>
+              <a:schemeClr val="tx1"/>
+            </a:solidFill>
+          </a:ln>
+          <a:effectLst>
+            <a:innerShdw blurRad="63500" dist="50800" dir="5400000">
+              <a:prstClr val="black">
+                <a:alpha val="50000"/>
+              </a:prstClr>
+            </a:innerShdw>
+          </a:effectLst>
+        </p:spPr>
+        <p:style>
+          <a:lnRef idx="2">
+            <a:schemeClr val="accent1">
+              <a:shade val="50000"/>
+            </a:schemeClr>
+          </a:lnRef>
+          <a:fillRef idx="1">
+            <a:schemeClr val="accent1"/>
+          </a:fillRef>
+          <a:effectRef idx="0">
+            <a:schemeClr val="accent1"/>
+          </a:effectRef>
+          <a:fontRef idx="minor">
+            <a:schemeClr val="lt1"/>
+          </a:fontRef>
+        </p:style>
+        <p:txBody>
+          <a:bodyPr rtlCol="0" anchor="ctr"/>
+          <a:lstStyle/>
+          <a:p>
+            <a:pPr algn="ctr"/>
+            <a:r>
+              <a:rPr lang="en-US" dirty="0"/>
+              <a:t>Serialized Model Object (AWS S3)</a:t>
+            </a:r>
+          </a:p>
+        </p:txBody>
+      </p:sp>
+      <p:cxnSp>
+        <p:nvCxnSpPr>
+          <p:cNvPr id="65" name="Straight Arrow Connector 64">
+            <a:extLst>
+              <a:ext uri="{FF2B5EF4-FFF2-40B4-BE49-F238E27FC236}">
+                <a16:creationId xmlns:a16="http://schemas.microsoft.com/office/drawing/2014/main" id="{54EE9AC4-A741-44D9-A2C5-DB26068292F6}"/>
+              </a:ext>
+            </a:extLst>
+          </p:cNvPr>
+          <p:cNvCxnSpPr>
+            <a:cxnSpLocks/>
+            <a:stCxn id="75" idx="3"/>
+          </p:cNvCxnSpPr>
+          <p:nvPr/>
+        </p:nvCxnSpPr>
+        <p:spPr>
+          <a:xfrm>
+            <a:off x="7332007" y="1944602"/>
+            <a:ext cx="0" cy="414227"/>
+          </a:xfrm>
+          <a:prstGeom prst="straightConnector1">
+            <a:avLst/>
+          </a:prstGeom>
+          <a:ln w="28575">
+            <a:solidFill>
+              <a:schemeClr val="accent3"/>
+            </a:solidFill>
+            <a:tailEnd type="triangle"/>
+          </a:ln>
+        </p:spPr>
+        <p:style>
+          <a:lnRef idx="1">
+            <a:schemeClr val="accent1"/>
+          </a:lnRef>
+          <a:fillRef idx="0">
+            <a:schemeClr val="accent1"/>
+          </a:fillRef>
+          <a:effectRef idx="0">
+            <a:schemeClr val="accent1"/>
+          </a:effectRef>
+          <a:fontRef idx="minor">
+            <a:schemeClr val="tx1"/>
+          </a:fontRef>
+        </p:style>
+      </p:cxnSp>
+      <p:sp>
+        <p:nvSpPr>
+          <p:cNvPr id="75" name="Cylinder 74">
+            <a:extLst>
+              <a:ext uri="{FF2B5EF4-FFF2-40B4-BE49-F238E27FC236}">
+                <a16:creationId xmlns:a16="http://schemas.microsoft.com/office/drawing/2014/main" id="{B8BD0C83-B9A0-4779-9A38-2CEC4D574977}"/>
+              </a:ext>
+            </a:extLst>
+          </p:cNvPr>
+          <p:cNvSpPr/>
+          <p:nvPr/>
+        </p:nvSpPr>
+        <p:spPr>
+          <a:xfrm>
+            <a:off x="6197314" y="1337231"/>
+            <a:ext cx="2269388" cy="607371"/>
+          </a:xfrm>
+          <a:prstGeom prst="can">
+            <a:avLst/>
+          </a:prstGeom>
+          <a:solidFill>
+            <a:schemeClr val="accent5">
+              <a:lumMod val="50000"/>
+            </a:schemeClr>
+          </a:solidFill>
+          <a:ln>
+            <a:solidFill>
+              <a:schemeClr val="tx1"/>
+            </a:solidFill>
+          </a:ln>
+          <a:effectLst>
+            <a:innerShdw blurRad="63500" dist="50800" dir="5400000">
+              <a:prstClr val="black">
+                <a:alpha val="50000"/>
+              </a:prstClr>
+            </a:innerShdw>
+          </a:effectLst>
+        </p:spPr>
+        <p:style>
+          <a:lnRef idx="2">
+            <a:schemeClr val="accent1">
+              <a:shade val="50000"/>
+            </a:schemeClr>
+          </a:lnRef>
+          <a:fillRef idx="1">
+            <a:schemeClr val="accent1"/>
+          </a:fillRef>
+          <a:effectRef idx="0">
+            <a:schemeClr val="accent1"/>
+          </a:effectRef>
+          <a:fontRef idx="minor">
+            <a:schemeClr val="lt1"/>
+          </a:fontRef>
+        </p:style>
+        <p:txBody>
+          <a:bodyPr rtlCol="0" anchor="ctr"/>
+          <a:lstStyle/>
+          <a:p>
+            <a:pPr algn="ctr"/>
+            <a:r>
+              <a:rPr lang="en-US" dirty="0" err="1"/>
+              <a:t>KerasClassifier</a:t>
+            </a:r>
+            <a:r>
+              <a:rPr lang="en-US" dirty="0"/>
+              <a:t> Module</a:t>
+            </a:r>
+          </a:p>
+          <a:p>
+            <a:pPr algn="ctr"/>
+            <a:r>
+              <a:rPr lang="en-US" dirty="0"/>
+              <a:t>(AWS S3)</a:t>
+            </a:r>
+          </a:p>
+        </p:txBody>
+      </p:sp>
+      <p:sp>
+        <p:nvSpPr>
+          <p:cNvPr id="78" name="TextBox 77">
+            <a:extLst>
+              <a:ext uri="{FF2B5EF4-FFF2-40B4-BE49-F238E27FC236}">
+                <a16:creationId xmlns:a16="http://schemas.microsoft.com/office/drawing/2014/main" id="{E1E3310B-4AF5-4C8B-9A32-622319C48F47}"/>
+              </a:ext>
+            </a:extLst>
+          </p:cNvPr>
+          <p:cNvSpPr txBox="1"/>
+          <p:nvPr/>
+        </p:nvSpPr>
+        <p:spPr>
+          <a:xfrm>
+            <a:off x="1506072" y="1210627"/>
+            <a:ext cx="3369609" cy="345159"/>
+          </a:xfrm>
+          <a:prstGeom prst="rect">
+            <a:avLst/>
+          </a:prstGeom>
+          <a:noFill/>
+        </p:spPr>
+        <p:txBody>
+          <a:bodyPr wrap="square" rtlCol="0">
+            <a:spAutoFit/>
+          </a:bodyPr>
+          <a:lstStyle/>
+          <a:p>
+            <a:r>
+              <a:rPr lang="en-US" dirty="0">
+                <a:latin typeface="Times New Roman" panose="02020603050405020304" pitchFamily="18" charset="0"/>
+                <a:cs typeface="Times New Roman" panose="02020603050405020304" pitchFamily="18" charset="0"/>
+              </a:rPr>
+              <a:t>The System Structure of </a:t>
+            </a:r>
+            <a:r>
+              <a:rPr lang="en-US" dirty="0" err="1">
+                <a:latin typeface="Times New Roman" panose="02020603050405020304" pitchFamily="18" charset="0"/>
+                <a:cs typeface="Times New Roman" panose="02020603050405020304" pitchFamily="18" charset="0"/>
+              </a:rPr>
+              <a:t>iMedBot</a:t>
+            </a:r>
+            <a:endParaRPr lang="en-US" dirty="0"/>
+          </a:p>
+        </p:txBody>
+      </p:sp>
+    </p:spTree>
+    <p:extLst>
+      <p:ext uri="{BB962C8B-B14F-4D97-AF65-F5344CB8AC3E}">
+        <p14:creationId xmlns:p14="http://schemas.microsoft.com/office/powerpoint/2010/main" val="251345874"/>
+      </p:ext>
+    </p:extLst>
+  </p:cSld>
+  <p:clrMapOvr>
+    <a:masterClrMapping/>
+  </p:clrMapOvr>
+</p:sld>
+</file>
+
+<file path=ppt/slides/slide3.xml><?xml version="1.0" encoding="utf-8"?>
+<p:sld xmlns:a="http://schemas.openxmlformats.org/drawingml/2006/main" xmlns:r="http://schemas.openxmlformats.org/officeDocument/2006/relationships" xmlns:p="http://schemas.openxmlformats.org/presentationml/2006/main">
+  <p:cSld>
+    <p:spTree>
+      <p:nvGrpSpPr>
+        <p:cNvPr id="1" name=""/>
+        <p:cNvGrpSpPr/>
+        <p:nvPr/>
+      </p:nvGrpSpPr>
+      <p:grpSpPr>
+        <a:xfrm>
+          <a:off x="0" y="0"/>
+          <a:ext cx="0" cy="0"/>
+          <a:chOff x="0" y="0"/>
+          <a:chExt cx="0" cy="0"/>
+        </a:xfrm>
+      </p:grpSpPr>
+      <p:grpSp>
+        <p:nvGrpSpPr>
+          <p:cNvPr id="284" name="Group 283">
+            <a:extLst>
+              <a:ext uri="{FF2B5EF4-FFF2-40B4-BE49-F238E27FC236}">
+                <a16:creationId xmlns:a16="http://schemas.microsoft.com/office/drawing/2014/main" id="{55D2D2BB-5735-4402-AD26-9366BA5FD27D}"/>
+              </a:ext>
+            </a:extLst>
+          </p:cNvPr>
+          <p:cNvGrpSpPr/>
+          <p:nvPr/>
+        </p:nvGrpSpPr>
+        <p:grpSpPr>
+          <a:xfrm>
+            <a:off x="470410" y="218650"/>
+            <a:ext cx="8965180" cy="6420700"/>
+            <a:chOff x="257655" y="0"/>
+            <a:chExt cx="8965180" cy="6420700"/>
+          </a:xfrm>
+        </p:grpSpPr>
+        <p:cxnSp>
+          <p:nvCxnSpPr>
+            <p:cNvPr id="6" name="Straight Arrow Connector 5">
+              <a:extLst>
+                <a:ext uri="{FF2B5EF4-FFF2-40B4-BE49-F238E27FC236}">
+                  <a16:creationId xmlns:a16="http://schemas.microsoft.com/office/drawing/2014/main" id="{800F52BD-3688-4339-9027-825D2BCF3808}"/>
+                </a:ext>
+              </a:extLst>
+            </p:cNvPr>
+            <p:cNvCxnSpPr>
+              <a:cxnSpLocks/>
+              <a:stCxn id="30" idx="2"/>
+              <a:endCxn id="7" idx="0"/>
+            </p:cNvCxnSpPr>
+            <p:nvPr/>
+          </p:nvCxnSpPr>
+          <p:spPr>
+            <a:xfrm flipH="1">
+              <a:off x="1906165" y="424446"/>
+              <a:ext cx="1994639" cy="360135"/>
+            </a:xfrm>
+            <a:prstGeom prst="straightConnector1">
+              <a:avLst/>
+            </a:prstGeom>
+            <a:ln>
+              <a:tailEnd type="triangle"/>
+            </a:ln>
+          </p:spPr>
+          <p:style>
+            <a:lnRef idx="1">
+              <a:schemeClr val="accent1"/>
+            </a:lnRef>
+            <a:fillRef idx="0">
+              <a:schemeClr val="accent1"/>
+            </a:fillRef>
+            <a:effectRef idx="0">
+              <a:schemeClr val="accent1"/>
+            </a:effectRef>
+            <a:fontRef idx="minor">
+              <a:schemeClr val="tx1"/>
+            </a:fontRef>
+          </p:style>
+        </p:cxnSp>
+        <p:sp>
+          <p:nvSpPr>
+            <p:cNvPr id="7" name="Diamond 6">
+              <a:extLst>
+                <a:ext uri="{FF2B5EF4-FFF2-40B4-BE49-F238E27FC236}">
+                  <a16:creationId xmlns:a16="http://schemas.microsoft.com/office/drawing/2014/main" id="{C4FC6F9F-42FC-4DB1-9102-BC4D9E65CE5D}"/>
+                </a:ext>
+              </a:extLst>
+            </p:cNvPr>
+            <p:cNvSpPr/>
+            <p:nvPr/>
+          </p:nvSpPr>
+          <p:spPr>
+            <a:xfrm>
+              <a:off x="783335" y="784581"/>
+              <a:ext cx="2245660" cy="616823"/>
+            </a:xfrm>
+            <a:prstGeom prst="diamond">
+              <a:avLst/>
+            </a:prstGeom>
+            <a:solidFill>
+              <a:srgbClr val="7030A0"/>
+            </a:solidFill>
+          </p:spPr>
+          <p:style>
+            <a:lnRef idx="2">
+              <a:schemeClr val="accent1">
+                <a:shade val="50000"/>
+              </a:schemeClr>
+            </a:lnRef>
+            <a:fillRef idx="1">
+              <a:schemeClr val="accent1"/>
+            </a:fillRef>
+            <a:effectRef idx="0">
+              <a:schemeClr val="accent1"/>
+            </a:effectRef>
+            <a:fontRef idx="minor">
+              <a:schemeClr val="lt1"/>
+            </a:fontRef>
+          </p:style>
+          <p:txBody>
+            <a:bodyPr rtlCol="0" anchor="ctr"/>
+            <a:lstStyle/>
+            <a:p>
+              <a:pPr algn="ctr"/>
+              <a:r>
+                <a:rPr lang="en-US" sz="1100" dirty="0"/>
+                <a:t>Model Prediction</a:t>
+              </a:r>
+            </a:p>
+          </p:txBody>
+        </p:sp>
+        <p:sp>
+          <p:nvSpPr>
+            <p:cNvPr id="9" name="Diamond 8">
+              <a:extLst>
+                <a:ext uri="{FF2B5EF4-FFF2-40B4-BE49-F238E27FC236}">
+                  <a16:creationId xmlns:a16="http://schemas.microsoft.com/office/drawing/2014/main" id="{5A4639D5-7779-41AB-9D5A-494C95E0EAC0}"/>
+                </a:ext>
+              </a:extLst>
+            </p:cNvPr>
+            <p:cNvSpPr/>
+            <p:nvPr/>
+          </p:nvSpPr>
+          <p:spPr>
+            <a:xfrm>
+              <a:off x="4670768" y="700897"/>
+              <a:ext cx="2245660" cy="616823"/>
+            </a:xfrm>
+            <a:prstGeom prst="diamond">
+              <a:avLst/>
+            </a:prstGeom>
+            <a:solidFill>
+              <a:srgbClr val="7030A0"/>
+            </a:solidFill>
+          </p:spPr>
+          <p:style>
+            <a:lnRef idx="2">
+              <a:schemeClr val="accent1">
+                <a:shade val="50000"/>
+              </a:schemeClr>
+            </a:lnRef>
+            <a:fillRef idx="1">
+              <a:schemeClr val="accent1"/>
+            </a:fillRef>
+            <a:effectRef idx="0">
+              <a:schemeClr val="accent1"/>
+            </a:effectRef>
+            <a:fontRef idx="minor">
+              <a:schemeClr val="lt1"/>
+            </a:fontRef>
+          </p:style>
+          <p:txBody>
+            <a:bodyPr rtlCol="0" anchor="ctr"/>
+            <a:lstStyle/>
+            <a:p>
+              <a:pPr algn="ctr"/>
+              <a:r>
+                <a:rPr lang="en-US" sz="1100" dirty="0"/>
+                <a:t>Model Training</a:t>
+              </a:r>
+            </a:p>
+          </p:txBody>
+        </p:sp>
+        <p:cxnSp>
+          <p:nvCxnSpPr>
+            <p:cNvPr id="10" name="Straight Arrow Connector 9">
+              <a:extLst>
+                <a:ext uri="{FF2B5EF4-FFF2-40B4-BE49-F238E27FC236}">
+                  <a16:creationId xmlns:a16="http://schemas.microsoft.com/office/drawing/2014/main" id="{377D8957-996F-4B00-80A3-852F1C88573A}"/>
+                </a:ext>
+              </a:extLst>
+            </p:cNvPr>
+            <p:cNvCxnSpPr>
+              <a:cxnSpLocks/>
+              <a:stCxn id="30" idx="2"/>
+              <a:endCxn id="9" idx="0"/>
+            </p:cNvCxnSpPr>
+            <p:nvPr/>
+          </p:nvCxnSpPr>
+          <p:spPr>
+            <a:xfrm>
+              <a:off x="3900804" y="424446"/>
+              <a:ext cx="1892794" cy="276451"/>
+            </a:xfrm>
+            <a:prstGeom prst="straightConnector1">
+              <a:avLst/>
+            </a:prstGeom>
+            <a:ln>
+              <a:tailEnd type="triangle"/>
+            </a:ln>
+          </p:spPr>
+          <p:style>
+            <a:lnRef idx="1">
+              <a:schemeClr val="accent1"/>
+            </a:lnRef>
+            <a:fillRef idx="0">
+              <a:schemeClr val="accent1"/>
+            </a:fillRef>
+            <a:effectRef idx="0">
+              <a:schemeClr val="accent1"/>
+            </a:effectRef>
+            <a:fontRef idx="minor">
+              <a:schemeClr val="tx1"/>
+            </a:fontRef>
+          </p:style>
+        </p:cxnSp>
+        <p:cxnSp>
+          <p:nvCxnSpPr>
+            <p:cNvPr id="18" name="Straight Arrow Connector 17">
+              <a:extLst>
+                <a:ext uri="{FF2B5EF4-FFF2-40B4-BE49-F238E27FC236}">
+                  <a16:creationId xmlns:a16="http://schemas.microsoft.com/office/drawing/2014/main" id="{E0911426-698C-4DF0-9F2C-A7AEBCB3E1B0}"/>
+                </a:ext>
+              </a:extLst>
+            </p:cNvPr>
+            <p:cNvCxnSpPr>
+              <a:cxnSpLocks/>
+              <a:stCxn id="7" idx="2"/>
+              <a:endCxn id="47" idx="0"/>
+            </p:cNvCxnSpPr>
+            <p:nvPr/>
+          </p:nvCxnSpPr>
+          <p:spPr>
+            <a:xfrm>
+              <a:off x="1906165" y="1401404"/>
+              <a:ext cx="0" cy="445174"/>
+            </a:xfrm>
+            <a:prstGeom prst="straightConnector1">
+              <a:avLst/>
+            </a:prstGeom>
+            <a:ln>
+              <a:tailEnd type="triangle"/>
+            </a:ln>
+          </p:spPr>
+          <p:style>
+            <a:lnRef idx="1">
+              <a:schemeClr val="accent1"/>
+            </a:lnRef>
+            <a:fillRef idx="0">
+              <a:schemeClr val="accent1"/>
+            </a:fillRef>
+            <a:effectRef idx="0">
+              <a:schemeClr val="accent1"/>
+            </a:effectRef>
+            <a:fontRef idx="minor">
+              <a:schemeClr val="tx1"/>
+            </a:fontRef>
+          </p:style>
+        </p:cxnSp>
+        <p:cxnSp>
+          <p:nvCxnSpPr>
+            <p:cNvPr id="20" name="Straight Arrow Connector 19">
+              <a:extLst>
+                <a:ext uri="{FF2B5EF4-FFF2-40B4-BE49-F238E27FC236}">
+                  <a16:creationId xmlns:a16="http://schemas.microsoft.com/office/drawing/2014/main" id="{5B58F919-3BF6-491F-829E-475E74658F2E}"/>
+                </a:ext>
+              </a:extLst>
+            </p:cNvPr>
+            <p:cNvCxnSpPr>
+              <a:cxnSpLocks/>
+              <a:stCxn id="47" idx="2"/>
+              <a:endCxn id="33" idx="0"/>
+            </p:cNvCxnSpPr>
+            <p:nvPr/>
+          </p:nvCxnSpPr>
+          <p:spPr>
+            <a:xfrm>
+              <a:off x="1906165" y="2410648"/>
+              <a:ext cx="10344" cy="612915"/>
+            </a:xfrm>
+            <a:prstGeom prst="straightConnector1">
+              <a:avLst/>
+            </a:prstGeom>
+            <a:ln>
+              <a:tailEnd type="triangle"/>
+            </a:ln>
+          </p:spPr>
+          <p:style>
+            <a:lnRef idx="1">
+              <a:schemeClr val="accent1"/>
+            </a:lnRef>
+            <a:fillRef idx="0">
+              <a:schemeClr val="accent1"/>
+            </a:fillRef>
+            <a:effectRef idx="0">
+              <a:schemeClr val="accent1"/>
+            </a:effectRef>
+            <a:fontRef idx="minor">
+              <a:schemeClr val="tx1"/>
+            </a:fontRef>
+          </p:style>
+        </p:cxnSp>
+        <p:sp>
+          <p:nvSpPr>
+            <p:cNvPr id="30" name="Rectangle: Rounded Corners 29">
+              <a:extLst>
+                <a:ext uri="{FF2B5EF4-FFF2-40B4-BE49-F238E27FC236}">
+                  <a16:creationId xmlns:a16="http://schemas.microsoft.com/office/drawing/2014/main" id="{4545FC18-9D67-4625-A8D1-60DF05905130}"/>
+                </a:ext>
+              </a:extLst>
+            </p:cNvPr>
+            <p:cNvSpPr/>
+            <p:nvPr/>
+          </p:nvSpPr>
+          <p:spPr>
+            <a:xfrm>
+              <a:off x="3294092" y="0"/>
+              <a:ext cx="1213423" cy="424446"/>
+            </a:xfrm>
+            <a:prstGeom prst="roundRect">
+              <a:avLst/>
+            </a:prstGeom>
+            <a:solidFill>
+              <a:schemeClr val="accent5"/>
+            </a:solidFill>
+          </p:spPr>
+          <p:style>
+            <a:lnRef idx="2">
+              <a:schemeClr val="accent1">
+                <a:shade val="50000"/>
+              </a:schemeClr>
+            </a:lnRef>
+            <a:fillRef idx="1">
+              <a:schemeClr val="accent1"/>
+            </a:fillRef>
+            <a:effectRef idx="0">
+              <a:schemeClr val="accent1"/>
+            </a:effectRef>
+            <a:fontRef idx="minor">
+              <a:schemeClr val="lt1"/>
+            </a:fontRef>
+          </p:style>
+          <p:txBody>
+            <a:bodyPr rtlCol="0" anchor="ctr"/>
+            <a:lstStyle/>
+            <a:p>
+              <a:pPr algn="ctr"/>
+              <a:r>
+                <a:rPr lang="en-US" sz="1100" dirty="0" err="1"/>
+                <a:t>iMedBot</a:t>
+              </a:r>
+              <a:endParaRPr lang="en-US" sz="1100" dirty="0"/>
+            </a:p>
+          </p:txBody>
+        </p:sp>
+        <p:sp>
+          <p:nvSpPr>
+            <p:cNvPr id="33" name="Rectangle 32">
+              <a:extLst>
+                <a:ext uri="{FF2B5EF4-FFF2-40B4-BE49-F238E27FC236}">
+                  <a16:creationId xmlns:a16="http://schemas.microsoft.com/office/drawing/2014/main" id="{AA7A95F5-92A3-4B27-8659-207B7F75DEE8}"/>
+                </a:ext>
+              </a:extLst>
+            </p:cNvPr>
+            <p:cNvSpPr/>
+            <p:nvPr/>
+          </p:nvSpPr>
+          <p:spPr>
+            <a:xfrm>
+              <a:off x="538926" y="3023562"/>
+              <a:ext cx="2755166" cy="470907"/>
+            </a:xfrm>
+            <a:prstGeom prst="rect">
+              <a:avLst/>
+            </a:prstGeom>
+          </p:spPr>
+          <p:style>
+            <a:lnRef idx="2">
+              <a:schemeClr val="accent1">
+                <a:shade val="50000"/>
+              </a:schemeClr>
+            </a:lnRef>
+            <a:fillRef idx="1">
+              <a:schemeClr val="accent1"/>
+            </a:fillRef>
+            <a:effectRef idx="0">
+              <a:schemeClr val="accent1"/>
+            </a:effectRef>
+            <a:fontRef idx="minor">
+              <a:schemeClr val="lt1"/>
+            </a:fontRef>
+          </p:style>
+          <p:txBody>
+            <a:bodyPr rtlCol="0" anchor="ctr"/>
+            <a:lstStyle/>
+            <a:p>
+              <a:pPr algn="ctr"/>
+              <a:r>
+                <a:rPr lang="en-US" sz="1100" dirty="0"/>
+                <a:t>Return patient recurrence prob: 0.605</a:t>
+              </a:r>
+            </a:p>
+          </p:txBody>
+        </p:sp>
+        <p:sp>
+          <p:nvSpPr>
+            <p:cNvPr id="40" name="Rectangle 39">
+              <a:extLst>
+                <a:ext uri="{FF2B5EF4-FFF2-40B4-BE49-F238E27FC236}">
+                  <a16:creationId xmlns:a16="http://schemas.microsoft.com/office/drawing/2014/main" id="{F6B2CECA-1F62-4768-86E2-9D89CD99EE45}"/>
+                </a:ext>
+              </a:extLst>
+            </p:cNvPr>
+            <p:cNvSpPr/>
+            <p:nvPr/>
+          </p:nvSpPr>
+          <p:spPr>
+            <a:xfrm>
+              <a:off x="538926" y="4107385"/>
+              <a:ext cx="2755166" cy="470907"/>
+            </a:xfrm>
+            <a:prstGeom prst="rect">
+              <a:avLst/>
+            </a:prstGeom>
+          </p:spPr>
+          <p:style>
+            <a:lnRef idx="2">
+              <a:schemeClr val="accent1">
+                <a:shade val="50000"/>
+              </a:schemeClr>
+            </a:lnRef>
+            <a:fillRef idx="1">
+              <a:schemeClr val="accent1"/>
+            </a:fillRef>
+            <a:effectRef idx="0">
+              <a:schemeClr val="accent1"/>
+            </a:effectRef>
+            <a:fontRef idx="minor">
+              <a:schemeClr val="lt1"/>
+            </a:fontRef>
+          </p:style>
+          <p:txBody>
+            <a:bodyPr rtlCol="0" anchor="ctr"/>
+            <a:lstStyle/>
+            <a:p>
+              <a:pPr algn="ctr"/>
+              <a:r>
+                <a:rPr lang="en-US" sz="1100" dirty="0"/>
+                <a:t>Collect feedback</a:t>
+              </a:r>
+            </a:p>
+          </p:txBody>
+        </p:sp>
+        <p:cxnSp>
+          <p:nvCxnSpPr>
+            <p:cNvPr id="41" name="Straight Arrow Connector 40">
+              <a:extLst>
+                <a:ext uri="{FF2B5EF4-FFF2-40B4-BE49-F238E27FC236}">
+                  <a16:creationId xmlns:a16="http://schemas.microsoft.com/office/drawing/2014/main" id="{7E576B65-B498-42E7-8F00-EBF9E5CC1E6E}"/>
+                </a:ext>
+              </a:extLst>
+            </p:cNvPr>
+            <p:cNvCxnSpPr>
+              <a:cxnSpLocks/>
+              <a:stCxn id="33" idx="2"/>
+              <a:endCxn id="40" idx="0"/>
+            </p:cNvCxnSpPr>
+            <p:nvPr/>
+          </p:nvCxnSpPr>
+          <p:spPr>
+            <a:xfrm>
+              <a:off x="1916509" y="3494471"/>
+              <a:ext cx="0" cy="612915"/>
+            </a:xfrm>
+            <a:prstGeom prst="straightConnector1">
+              <a:avLst/>
+            </a:prstGeom>
+            <a:ln>
+              <a:tailEnd type="triangle"/>
+            </a:ln>
+          </p:spPr>
+          <p:style>
+            <a:lnRef idx="1">
+              <a:schemeClr val="accent1"/>
+            </a:lnRef>
+            <a:fillRef idx="0">
+              <a:schemeClr val="accent1"/>
+            </a:fillRef>
+            <a:effectRef idx="0">
+              <a:schemeClr val="accent1"/>
+            </a:effectRef>
+            <a:fontRef idx="minor">
+              <a:schemeClr val="tx1"/>
+            </a:fontRef>
+          </p:style>
+        </p:cxnSp>
+        <p:sp>
+          <p:nvSpPr>
+            <p:cNvPr id="47" name="Rectangle 46">
+              <a:extLst>
+                <a:ext uri="{FF2B5EF4-FFF2-40B4-BE49-F238E27FC236}">
+                  <a16:creationId xmlns:a16="http://schemas.microsoft.com/office/drawing/2014/main" id="{E03FF038-69CD-478D-9D36-977D4171BFDA}"/>
+                </a:ext>
+              </a:extLst>
+            </p:cNvPr>
+            <p:cNvSpPr/>
+            <p:nvPr/>
+          </p:nvSpPr>
+          <p:spPr>
+            <a:xfrm>
+              <a:off x="257655" y="1846578"/>
+              <a:ext cx="3297020" cy="564069"/>
+            </a:xfrm>
+            <a:prstGeom prst="rect">
+              <a:avLst/>
+            </a:prstGeom>
+          </p:spPr>
+          <p:style>
+            <a:lnRef idx="2">
+              <a:schemeClr val="accent1">
+                <a:shade val="50000"/>
+              </a:schemeClr>
+            </a:lnRef>
+            <a:fillRef idx="1">
+              <a:schemeClr val="accent1"/>
+            </a:fillRef>
+            <a:effectRef idx="0">
+              <a:schemeClr val="accent1"/>
+            </a:effectRef>
+            <a:fontRef idx="minor">
+              <a:schemeClr val="lt1"/>
+            </a:fontRef>
+          </p:style>
+          <p:txBody>
+            <a:bodyPr rtlCol="0" anchor="ctr"/>
+            <a:lstStyle/>
+            <a:p>
+              <a:pPr algn="ctr"/>
+              <a:r>
+                <a:rPr lang="en-US" sz="1100" dirty="0"/>
+                <a:t>Acquire patient medical index:  </a:t>
+              </a:r>
+              <a:r>
+                <a:rPr lang="en-US" sz="1100" dirty="0" err="1"/>
+                <a:t>DCIS_Level</a:t>
+              </a:r>
+              <a:r>
+                <a:rPr lang="en-US" sz="1100" dirty="0"/>
+                <a:t>; </a:t>
+              </a:r>
+              <a:r>
+                <a:rPr lang="en-US" sz="1100" dirty="0" err="1"/>
+                <a:t>Tumor_Size</a:t>
+              </a:r>
+              <a:r>
+                <a:rPr lang="en-US" sz="1100" dirty="0"/>
+                <a:t>; Grade and so on</a:t>
+              </a:r>
+            </a:p>
+          </p:txBody>
+        </p:sp>
+        <p:cxnSp>
+          <p:nvCxnSpPr>
+            <p:cNvPr id="52" name="Straight Arrow Connector 51">
+              <a:extLst>
+                <a:ext uri="{FF2B5EF4-FFF2-40B4-BE49-F238E27FC236}">
+                  <a16:creationId xmlns:a16="http://schemas.microsoft.com/office/drawing/2014/main" id="{EA539C5A-9FBD-4D69-A9FE-AD31C7884915}"/>
+                </a:ext>
+              </a:extLst>
+            </p:cNvPr>
+            <p:cNvCxnSpPr>
+              <a:cxnSpLocks/>
+              <a:stCxn id="9" idx="2"/>
+              <a:endCxn id="61" idx="0"/>
+            </p:cNvCxnSpPr>
+            <p:nvPr/>
+          </p:nvCxnSpPr>
+          <p:spPr>
+            <a:xfrm>
+              <a:off x="5793598" y="1317722"/>
+              <a:ext cx="15442" cy="365156"/>
+            </a:xfrm>
+            <a:prstGeom prst="straightConnector1">
+              <a:avLst/>
+            </a:prstGeom>
+            <a:ln>
+              <a:tailEnd type="triangle"/>
+            </a:ln>
+          </p:spPr>
+          <p:style>
+            <a:lnRef idx="1">
+              <a:schemeClr val="accent1"/>
+            </a:lnRef>
+            <a:fillRef idx="0">
+              <a:schemeClr val="accent1"/>
+            </a:fillRef>
+            <a:effectRef idx="0">
+              <a:schemeClr val="accent1"/>
+            </a:effectRef>
+            <a:fontRef idx="minor">
+              <a:schemeClr val="tx1"/>
+            </a:fontRef>
+          </p:style>
+        </p:cxnSp>
+        <p:sp>
+          <p:nvSpPr>
+            <p:cNvPr id="61" name="Diamond 60">
+              <a:extLst>
+                <a:ext uri="{FF2B5EF4-FFF2-40B4-BE49-F238E27FC236}">
+                  <a16:creationId xmlns:a16="http://schemas.microsoft.com/office/drawing/2014/main" id="{53273604-D5DC-4796-8EDA-2D43A10461D6}"/>
+                </a:ext>
+              </a:extLst>
+            </p:cNvPr>
+            <p:cNvSpPr/>
+            <p:nvPr/>
+          </p:nvSpPr>
+          <p:spPr>
+            <a:xfrm>
+              <a:off x="4441070" y="1682878"/>
+              <a:ext cx="2735943" cy="703774"/>
+            </a:xfrm>
+            <a:prstGeom prst="diamond">
+              <a:avLst/>
+            </a:prstGeom>
+            <a:solidFill>
+              <a:srgbClr val="7030A0"/>
+            </a:solidFill>
+          </p:spPr>
+          <p:style>
+            <a:lnRef idx="2">
+              <a:schemeClr val="accent1">
+                <a:shade val="50000"/>
+              </a:schemeClr>
+            </a:lnRef>
+            <a:fillRef idx="1">
+              <a:schemeClr val="accent1"/>
+            </a:fillRef>
+            <a:effectRef idx="0">
+              <a:schemeClr val="accent1"/>
+            </a:effectRef>
+            <a:fontRef idx="minor">
+              <a:schemeClr val="lt1"/>
+            </a:fontRef>
+          </p:style>
+          <p:txBody>
+            <a:bodyPr rtlCol="0" anchor="ctr"/>
+            <a:lstStyle/>
+            <a:p>
+              <a:pPr algn="ctr"/>
+              <a:r>
+                <a:rPr lang="en-US" sz="1100" dirty="0"/>
+                <a:t>If use default dataset</a:t>
+              </a:r>
+            </a:p>
+          </p:txBody>
+        </p:sp>
+        <p:cxnSp>
+          <p:nvCxnSpPr>
+            <p:cNvPr id="109" name="Straight Arrow Connector 108">
+              <a:extLst>
+                <a:ext uri="{FF2B5EF4-FFF2-40B4-BE49-F238E27FC236}">
+                  <a16:creationId xmlns:a16="http://schemas.microsoft.com/office/drawing/2014/main" id="{5E34EBD8-EDE7-4CDE-B83C-9A893C2E2664}"/>
+                </a:ext>
+              </a:extLst>
+            </p:cNvPr>
+            <p:cNvCxnSpPr>
+              <a:cxnSpLocks/>
+              <a:stCxn id="61" idx="2"/>
+              <a:endCxn id="158" idx="0"/>
+            </p:cNvCxnSpPr>
+            <p:nvPr/>
+          </p:nvCxnSpPr>
+          <p:spPr>
+            <a:xfrm flipH="1">
+              <a:off x="5808320" y="2386652"/>
+              <a:ext cx="721" cy="580106"/>
+            </a:xfrm>
+            <a:prstGeom prst="straightConnector1">
+              <a:avLst/>
+            </a:prstGeom>
+            <a:ln>
+              <a:tailEnd type="triangle"/>
+            </a:ln>
+          </p:spPr>
+          <p:style>
+            <a:lnRef idx="1">
+              <a:schemeClr val="accent1"/>
+            </a:lnRef>
+            <a:fillRef idx="0">
+              <a:schemeClr val="accent1"/>
+            </a:fillRef>
+            <a:effectRef idx="0">
+              <a:schemeClr val="accent1"/>
+            </a:effectRef>
+            <a:fontRef idx="minor">
+              <a:schemeClr val="tx1"/>
+            </a:fontRef>
+          </p:style>
+        </p:cxnSp>
+        <p:cxnSp>
+          <p:nvCxnSpPr>
+            <p:cNvPr id="128" name="Connector: Elbow 127">
+              <a:extLst>
+                <a:ext uri="{FF2B5EF4-FFF2-40B4-BE49-F238E27FC236}">
+                  <a16:creationId xmlns:a16="http://schemas.microsoft.com/office/drawing/2014/main" id="{AE84D815-4A8B-4CB5-9256-652CEB6077AD}"/>
+                </a:ext>
+              </a:extLst>
+            </p:cNvPr>
+            <p:cNvCxnSpPr>
+              <a:cxnSpLocks/>
+              <a:stCxn id="61" idx="3"/>
+              <a:endCxn id="132" idx="0"/>
+            </p:cNvCxnSpPr>
+            <p:nvPr/>
+          </p:nvCxnSpPr>
+          <p:spPr>
+            <a:xfrm>
+              <a:off x="7177011" y="2034765"/>
+              <a:ext cx="1155472" cy="360850"/>
+            </a:xfrm>
+            <a:prstGeom prst="bentConnector2">
+              <a:avLst/>
+            </a:prstGeom>
+            <a:ln>
+              <a:tailEnd type="triangle"/>
+            </a:ln>
+          </p:spPr>
+          <p:style>
+            <a:lnRef idx="1">
+              <a:schemeClr val="accent1"/>
+            </a:lnRef>
+            <a:fillRef idx="0">
+              <a:schemeClr val="accent1"/>
+            </a:fillRef>
+            <a:effectRef idx="0">
+              <a:schemeClr val="accent1"/>
+            </a:effectRef>
+            <a:fontRef idx="minor">
+              <a:schemeClr val="tx1"/>
+            </a:fontRef>
+          </p:style>
+        </p:cxnSp>
+        <p:sp>
+          <p:nvSpPr>
+            <p:cNvPr id="132" name="Rectangle 131">
+              <a:extLst>
+                <a:ext uri="{FF2B5EF4-FFF2-40B4-BE49-F238E27FC236}">
+                  <a16:creationId xmlns:a16="http://schemas.microsoft.com/office/drawing/2014/main" id="{34D75B20-8584-4B6A-A7AF-8D8E4FC0FA4C}"/>
+                </a:ext>
+              </a:extLst>
+            </p:cNvPr>
+            <p:cNvSpPr/>
+            <p:nvPr/>
+          </p:nvSpPr>
+          <p:spPr>
+            <a:xfrm>
+              <a:off x="7510956" y="2395613"/>
+              <a:ext cx="1643054" cy="470907"/>
+            </a:xfrm>
+            <a:prstGeom prst="rect">
+              <a:avLst/>
+            </a:prstGeom>
+          </p:spPr>
+          <p:style>
+            <a:lnRef idx="2">
+              <a:schemeClr val="accent1">
+                <a:shade val="50000"/>
+              </a:schemeClr>
+            </a:lnRef>
+            <a:fillRef idx="1">
+              <a:schemeClr val="accent1"/>
+            </a:fillRef>
+            <a:effectRef idx="0">
+              <a:schemeClr val="accent1"/>
+            </a:effectRef>
+            <a:fontRef idx="minor">
+              <a:schemeClr val="lt1"/>
+            </a:fontRef>
+          </p:style>
+          <p:txBody>
+            <a:bodyPr rtlCol="0" anchor="ctr"/>
+            <a:lstStyle/>
+            <a:p>
+              <a:pPr algn="ctr"/>
+              <a:r>
+                <a:rPr lang="en-US" sz="1100" dirty="0"/>
+                <a:t>Upload your own dataset</a:t>
+              </a:r>
+            </a:p>
+          </p:txBody>
+        </p:sp>
+        <p:sp>
+          <p:nvSpPr>
+            <p:cNvPr id="158" name="Diamond 157">
+              <a:extLst>
+                <a:ext uri="{FF2B5EF4-FFF2-40B4-BE49-F238E27FC236}">
+                  <a16:creationId xmlns:a16="http://schemas.microsoft.com/office/drawing/2014/main" id="{2CDDBF94-6203-4B96-BFA3-6976E4FCFDF5}"/>
+                </a:ext>
+              </a:extLst>
+            </p:cNvPr>
+            <p:cNvSpPr/>
+            <p:nvPr/>
+          </p:nvSpPr>
+          <p:spPr>
+            <a:xfrm>
+              <a:off x="4105683" y="2966758"/>
+              <a:ext cx="3405275" cy="703774"/>
+            </a:xfrm>
+            <a:prstGeom prst="diamond">
+              <a:avLst/>
+            </a:prstGeom>
+            <a:solidFill>
+              <a:srgbClr val="7030A0"/>
+            </a:solidFill>
+          </p:spPr>
+          <p:style>
+            <a:lnRef idx="2">
+              <a:schemeClr val="accent1">
+                <a:shade val="50000"/>
+              </a:schemeClr>
+            </a:lnRef>
+            <a:fillRef idx="1">
+              <a:schemeClr val="accent1"/>
+            </a:fillRef>
+            <a:effectRef idx="0">
+              <a:schemeClr val="accent1"/>
+            </a:effectRef>
+            <a:fontRef idx="minor">
+              <a:schemeClr val="lt1"/>
+            </a:fontRef>
+          </p:style>
+          <p:txBody>
+            <a:bodyPr rtlCol="0" anchor="ctr"/>
+            <a:lstStyle/>
+            <a:p>
+              <a:pPr algn="ctr"/>
+              <a:r>
+                <a:rPr lang="en-US" sz="1100" dirty="0"/>
+                <a:t>If use default parameter setting</a:t>
+              </a:r>
+            </a:p>
+          </p:txBody>
+        </p:sp>
+        <p:sp>
+          <p:nvSpPr>
+            <p:cNvPr id="169" name="TextBox 168">
+              <a:extLst>
+                <a:ext uri="{FF2B5EF4-FFF2-40B4-BE49-F238E27FC236}">
+                  <a16:creationId xmlns:a16="http://schemas.microsoft.com/office/drawing/2014/main" id="{7D4F97F7-8DBA-46BF-8C86-C3BE78510AB1}"/>
+                </a:ext>
+              </a:extLst>
+            </p:cNvPr>
+            <p:cNvSpPr txBox="1"/>
+            <p:nvPr/>
+          </p:nvSpPr>
+          <p:spPr>
+            <a:xfrm>
+              <a:off x="7589071" y="1836856"/>
+              <a:ext cx="821528" cy="258068"/>
+            </a:xfrm>
+            <a:prstGeom prst="rect">
+              <a:avLst/>
+            </a:prstGeom>
+            <a:noFill/>
+          </p:spPr>
+          <p:txBody>
+            <a:bodyPr wrap="square" rtlCol="0">
+              <a:spAutoFit/>
+            </a:bodyPr>
+            <a:lstStyle/>
+            <a:p>
+              <a:r>
+                <a:rPr lang="en-US" sz="1100" dirty="0"/>
+                <a:t>NO</a:t>
+              </a:r>
+            </a:p>
+          </p:txBody>
+        </p:sp>
+        <p:cxnSp>
+          <p:nvCxnSpPr>
+            <p:cNvPr id="180" name="Connector: Elbow 179">
+              <a:extLst>
+                <a:ext uri="{FF2B5EF4-FFF2-40B4-BE49-F238E27FC236}">
+                  <a16:creationId xmlns:a16="http://schemas.microsoft.com/office/drawing/2014/main" id="{B55982FE-67D8-40B6-975E-A5A745E92C8F}"/>
+                </a:ext>
+              </a:extLst>
+            </p:cNvPr>
+            <p:cNvCxnSpPr>
+              <a:cxnSpLocks/>
+              <a:stCxn id="158" idx="3"/>
+              <a:endCxn id="181" idx="0"/>
+            </p:cNvCxnSpPr>
+            <p:nvPr/>
+          </p:nvCxnSpPr>
+          <p:spPr>
+            <a:xfrm>
+              <a:off x="7510958" y="3318644"/>
+              <a:ext cx="835043" cy="351887"/>
+            </a:xfrm>
+            <a:prstGeom prst="bentConnector2">
+              <a:avLst/>
+            </a:prstGeom>
+            <a:ln>
+              <a:tailEnd type="triangle"/>
+            </a:ln>
+          </p:spPr>
+          <p:style>
+            <a:lnRef idx="1">
+              <a:schemeClr val="accent1"/>
+            </a:lnRef>
+            <a:fillRef idx="0">
+              <a:schemeClr val="accent1"/>
+            </a:fillRef>
+            <a:effectRef idx="0">
+              <a:schemeClr val="accent1"/>
+            </a:effectRef>
+            <a:fontRef idx="minor">
+              <a:schemeClr val="tx1"/>
+            </a:fontRef>
+          </p:style>
+        </p:cxnSp>
+        <p:sp>
+          <p:nvSpPr>
+            <p:cNvPr id="181" name="Rectangle 180">
+              <a:extLst>
+                <a:ext uri="{FF2B5EF4-FFF2-40B4-BE49-F238E27FC236}">
+                  <a16:creationId xmlns:a16="http://schemas.microsoft.com/office/drawing/2014/main" id="{D073698D-68A9-4501-A219-A453EB8294DC}"/>
+                </a:ext>
+              </a:extLst>
+            </p:cNvPr>
+            <p:cNvSpPr/>
+            <p:nvPr/>
+          </p:nvSpPr>
+          <p:spPr>
+            <a:xfrm>
+              <a:off x="7524472" y="3670531"/>
+              <a:ext cx="1643054" cy="470907"/>
+            </a:xfrm>
+            <a:prstGeom prst="rect">
+              <a:avLst/>
+            </a:prstGeom>
+          </p:spPr>
+          <p:style>
+            <a:lnRef idx="2">
+              <a:schemeClr val="accent1">
+                <a:shade val="50000"/>
+              </a:schemeClr>
+            </a:lnRef>
+            <a:fillRef idx="1">
+              <a:schemeClr val="accent1"/>
+            </a:fillRef>
+            <a:effectRef idx="0">
+              <a:schemeClr val="accent1"/>
+            </a:effectRef>
+            <a:fontRef idx="minor">
+              <a:schemeClr val="lt1"/>
+            </a:fontRef>
+          </p:style>
+          <p:txBody>
+            <a:bodyPr rtlCol="0" anchor="ctr"/>
+            <a:lstStyle/>
+            <a:p>
+              <a:pPr algn="ctr"/>
+              <a:r>
+                <a:rPr lang="en-US" sz="1100" dirty="0"/>
+                <a:t>Set  your own parameter setting</a:t>
+              </a:r>
+            </a:p>
+          </p:txBody>
+        </p:sp>
+        <p:sp>
+          <p:nvSpPr>
+            <p:cNvPr id="182" name="TextBox 181">
+              <a:extLst>
+                <a:ext uri="{FF2B5EF4-FFF2-40B4-BE49-F238E27FC236}">
+                  <a16:creationId xmlns:a16="http://schemas.microsoft.com/office/drawing/2014/main" id="{7E8CF6A7-BAA4-4240-BD83-FE9887E70D42}"/>
+                </a:ext>
+              </a:extLst>
+            </p:cNvPr>
+            <p:cNvSpPr txBox="1"/>
+            <p:nvPr/>
+          </p:nvSpPr>
+          <p:spPr>
+            <a:xfrm>
+              <a:off x="7699191" y="3110309"/>
+              <a:ext cx="835043" cy="258068"/>
+            </a:xfrm>
+            <a:prstGeom prst="rect">
+              <a:avLst/>
+            </a:prstGeom>
+            <a:noFill/>
+          </p:spPr>
+          <p:txBody>
+            <a:bodyPr wrap="square" rtlCol="0">
+              <a:spAutoFit/>
+            </a:bodyPr>
+            <a:lstStyle/>
+            <a:p>
+              <a:r>
+                <a:rPr lang="en-US" sz="1100" dirty="0"/>
+                <a:t>NO</a:t>
+              </a:r>
+            </a:p>
+          </p:txBody>
+        </p:sp>
+        <p:cxnSp>
+          <p:nvCxnSpPr>
+            <p:cNvPr id="187" name="Straight Arrow Connector 186">
+              <a:extLst>
+                <a:ext uri="{FF2B5EF4-FFF2-40B4-BE49-F238E27FC236}">
+                  <a16:creationId xmlns:a16="http://schemas.microsoft.com/office/drawing/2014/main" id="{7F2985A2-35DC-47F0-9AF3-A97A41C43D1D}"/>
+                </a:ext>
+              </a:extLst>
+            </p:cNvPr>
+            <p:cNvCxnSpPr>
+              <a:cxnSpLocks/>
+              <a:stCxn id="132" idx="1"/>
+            </p:cNvCxnSpPr>
+            <p:nvPr/>
+          </p:nvCxnSpPr>
+          <p:spPr>
+            <a:xfrm flipH="1" flipV="1">
+              <a:off x="5808318" y="2622104"/>
+              <a:ext cx="1702638" cy="8963"/>
+            </a:xfrm>
+            <a:prstGeom prst="straightConnector1">
+              <a:avLst/>
+            </a:prstGeom>
+            <a:ln>
+              <a:tailEnd type="triangle"/>
+            </a:ln>
+          </p:spPr>
+          <p:style>
+            <a:lnRef idx="1">
+              <a:schemeClr val="accent1"/>
+            </a:lnRef>
+            <a:fillRef idx="0">
+              <a:schemeClr val="accent1"/>
+            </a:fillRef>
+            <a:effectRef idx="0">
+              <a:schemeClr val="accent1"/>
+            </a:effectRef>
+            <a:fontRef idx="minor">
+              <a:schemeClr val="tx1"/>
+            </a:fontRef>
+          </p:style>
+        </p:cxnSp>
+        <p:cxnSp>
+          <p:nvCxnSpPr>
+            <p:cNvPr id="190" name="Straight Arrow Connector 189">
+              <a:extLst>
+                <a:ext uri="{FF2B5EF4-FFF2-40B4-BE49-F238E27FC236}">
+                  <a16:creationId xmlns:a16="http://schemas.microsoft.com/office/drawing/2014/main" id="{AC6E3780-7DA2-4844-906B-E165EA1448A4}"/>
+                </a:ext>
+              </a:extLst>
+            </p:cNvPr>
+            <p:cNvCxnSpPr>
+              <a:cxnSpLocks/>
+              <a:stCxn id="158" idx="2"/>
+            </p:cNvCxnSpPr>
+            <p:nvPr/>
+          </p:nvCxnSpPr>
+          <p:spPr>
+            <a:xfrm>
+              <a:off x="5808319" y="3670531"/>
+              <a:ext cx="0" cy="492706"/>
+            </a:xfrm>
+            <a:prstGeom prst="straightConnector1">
+              <a:avLst/>
+            </a:prstGeom>
+            <a:ln>
+              <a:tailEnd type="triangle"/>
+            </a:ln>
+          </p:spPr>
+          <p:style>
+            <a:lnRef idx="1">
+              <a:schemeClr val="accent1"/>
+            </a:lnRef>
+            <a:fillRef idx="0">
+              <a:schemeClr val="accent1"/>
+            </a:fillRef>
+            <a:effectRef idx="0">
+              <a:schemeClr val="accent1"/>
+            </a:effectRef>
+            <a:fontRef idx="minor">
+              <a:schemeClr val="tx1"/>
+            </a:fontRef>
+          </p:style>
+        </p:cxnSp>
+        <p:cxnSp>
+          <p:nvCxnSpPr>
+            <p:cNvPr id="202" name="Straight Arrow Connector 201">
+              <a:extLst>
+                <a:ext uri="{FF2B5EF4-FFF2-40B4-BE49-F238E27FC236}">
+                  <a16:creationId xmlns:a16="http://schemas.microsoft.com/office/drawing/2014/main" id="{8943FC9D-5204-440B-8BFF-843694AA2090}"/>
+                </a:ext>
+              </a:extLst>
+            </p:cNvPr>
+            <p:cNvCxnSpPr>
+              <a:cxnSpLocks/>
+              <a:stCxn id="181" idx="1"/>
+              <a:endCxn id="204" idx="3"/>
+            </p:cNvCxnSpPr>
+            <p:nvPr/>
+          </p:nvCxnSpPr>
+          <p:spPr>
+            <a:xfrm flipH="1">
+              <a:off x="7144757" y="3905985"/>
+              <a:ext cx="379715" cy="492706"/>
+            </a:xfrm>
+            <a:prstGeom prst="straightConnector1">
+              <a:avLst/>
+            </a:prstGeom>
+            <a:ln>
+              <a:tailEnd type="triangle"/>
+            </a:ln>
+          </p:spPr>
+          <p:style>
+            <a:lnRef idx="1">
+              <a:schemeClr val="accent1"/>
+            </a:lnRef>
+            <a:fillRef idx="0">
+              <a:schemeClr val="accent1"/>
+            </a:fillRef>
+            <a:effectRef idx="0">
+              <a:schemeClr val="accent1"/>
+            </a:effectRef>
+            <a:fontRef idx="minor">
+              <a:schemeClr val="tx1"/>
+            </a:fontRef>
+          </p:style>
+        </p:cxnSp>
+        <p:sp>
+          <p:nvSpPr>
+            <p:cNvPr id="204" name="Rectangle 203">
+              <a:extLst>
+                <a:ext uri="{FF2B5EF4-FFF2-40B4-BE49-F238E27FC236}">
+                  <a16:creationId xmlns:a16="http://schemas.microsoft.com/office/drawing/2014/main" id="{CA5DE273-792E-49AA-81B6-0DAE1A6889FA}"/>
+                </a:ext>
+              </a:extLst>
+            </p:cNvPr>
+            <p:cNvSpPr/>
+            <p:nvPr/>
+          </p:nvSpPr>
+          <p:spPr>
+            <a:xfrm>
+              <a:off x="4389591" y="4163237"/>
+              <a:ext cx="2755166" cy="470907"/>
+            </a:xfrm>
+            <a:prstGeom prst="rect">
+              <a:avLst/>
+            </a:prstGeom>
+          </p:spPr>
+          <p:style>
+            <a:lnRef idx="2">
+              <a:schemeClr val="accent1">
+                <a:shade val="50000"/>
+              </a:schemeClr>
+            </a:lnRef>
+            <a:fillRef idx="1">
+              <a:schemeClr val="accent1"/>
+            </a:fillRef>
+            <a:effectRef idx="0">
+              <a:schemeClr val="accent1"/>
+            </a:effectRef>
+            <a:fontRef idx="minor">
+              <a:schemeClr val="lt1"/>
+            </a:fontRef>
+          </p:style>
+          <p:txBody>
+            <a:bodyPr rtlCol="0" anchor="ctr"/>
+            <a:lstStyle/>
+            <a:p>
+              <a:pPr algn="ctr"/>
+              <a:r>
+                <a:rPr lang="en-US" sz="1100" dirty="0"/>
+                <a:t>Return validation AUC and roc curve</a:t>
+              </a:r>
+            </a:p>
+          </p:txBody>
+        </p:sp>
+        <p:cxnSp>
+          <p:nvCxnSpPr>
+            <p:cNvPr id="206" name="Straight Arrow Connector 205">
+              <a:extLst>
+                <a:ext uri="{FF2B5EF4-FFF2-40B4-BE49-F238E27FC236}">
+                  <a16:creationId xmlns:a16="http://schemas.microsoft.com/office/drawing/2014/main" id="{C3AD51AB-8B3A-4866-95C1-E77110A6E4F3}"/>
+                </a:ext>
+              </a:extLst>
+            </p:cNvPr>
+            <p:cNvCxnSpPr>
+              <a:cxnSpLocks/>
+              <a:stCxn id="204" idx="2"/>
+              <a:endCxn id="214" idx="0"/>
+            </p:cNvCxnSpPr>
+            <p:nvPr/>
+          </p:nvCxnSpPr>
+          <p:spPr>
+            <a:xfrm flipH="1">
+              <a:off x="3751965" y="4634144"/>
+              <a:ext cx="2015209" cy="345302"/>
+            </a:xfrm>
+            <a:prstGeom prst="straightConnector1">
+              <a:avLst/>
+            </a:prstGeom>
+            <a:ln>
+              <a:tailEnd type="triangle"/>
+            </a:ln>
+          </p:spPr>
+          <p:style>
+            <a:lnRef idx="1">
+              <a:schemeClr val="accent1"/>
+            </a:lnRef>
+            <a:fillRef idx="0">
+              <a:schemeClr val="accent1"/>
+            </a:fillRef>
+            <a:effectRef idx="0">
+              <a:schemeClr val="accent1"/>
+            </a:effectRef>
+            <a:fontRef idx="minor">
+              <a:schemeClr val="tx1"/>
+            </a:fontRef>
+          </p:style>
+        </p:cxnSp>
+        <p:cxnSp>
+          <p:nvCxnSpPr>
+            <p:cNvPr id="208" name="Straight Arrow Connector 207">
+              <a:extLst>
+                <a:ext uri="{FF2B5EF4-FFF2-40B4-BE49-F238E27FC236}">
+                  <a16:creationId xmlns:a16="http://schemas.microsoft.com/office/drawing/2014/main" id="{F23D3A61-8886-4FB6-BFAB-7C5616CD4597}"/>
+                </a:ext>
+              </a:extLst>
+            </p:cNvPr>
+            <p:cNvCxnSpPr>
+              <a:cxnSpLocks/>
+              <a:stCxn id="204" idx="2"/>
+              <a:endCxn id="217" idx="0"/>
+            </p:cNvCxnSpPr>
+            <p:nvPr/>
+          </p:nvCxnSpPr>
+          <p:spPr>
+            <a:xfrm>
+              <a:off x="5767174" y="4634144"/>
+              <a:ext cx="2721617" cy="739397"/>
+            </a:xfrm>
+            <a:prstGeom prst="straightConnector1">
+              <a:avLst/>
+            </a:prstGeom>
+            <a:ln>
+              <a:tailEnd type="triangle"/>
+            </a:ln>
+          </p:spPr>
+          <p:style>
+            <a:lnRef idx="1">
+              <a:schemeClr val="accent1"/>
+            </a:lnRef>
+            <a:fillRef idx="0">
+              <a:schemeClr val="accent1"/>
+            </a:fillRef>
+            <a:effectRef idx="0">
+              <a:schemeClr val="accent1"/>
+            </a:effectRef>
+            <a:fontRef idx="minor">
+              <a:schemeClr val="tx1"/>
+            </a:fontRef>
+          </p:style>
+        </p:cxnSp>
+        <p:cxnSp>
+          <p:nvCxnSpPr>
+            <p:cNvPr id="210" name="Straight Arrow Connector 209">
+              <a:extLst>
+                <a:ext uri="{FF2B5EF4-FFF2-40B4-BE49-F238E27FC236}">
+                  <a16:creationId xmlns:a16="http://schemas.microsoft.com/office/drawing/2014/main" id="{FFF6ABC3-D5A4-436A-9D1E-83549728E376}"/>
+                </a:ext>
+              </a:extLst>
+            </p:cNvPr>
+            <p:cNvCxnSpPr>
+              <a:cxnSpLocks/>
+              <a:stCxn id="204" idx="2"/>
+              <a:endCxn id="269" idx="0"/>
+            </p:cNvCxnSpPr>
+            <p:nvPr/>
+          </p:nvCxnSpPr>
+          <p:spPr>
+            <a:xfrm flipH="1">
+              <a:off x="5763445" y="4634144"/>
+              <a:ext cx="3729" cy="737554"/>
+            </a:xfrm>
+            <a:prstGeom prst="straightConnector1">
+              <a:avLst/>
+            </a:prstGeom>
+            <a:ln>
+              <a:tailEnd type="triangle"/>
+            </a:ln>
+          </p:spPr>
+          <p:style>
+            <a:lnRef idx="1">
+              <a:schemeClr val="accent1"/>
+            </a:lnRef>
+            <a:fillRef idx="0">
+              <a:schemeClr val="accent1"/>
+            </a:fillRef>
+            <a:effectRef idx="0">
+              <a:schemeClr val="accent1"/>
+            </a:effectRef>
+            <a:fontRef idx="minor">
+              <a:schemeClr val="tx1"/>
+            </a:fontRef>
+          </p:style>
+        </p:cxnSp>
+        <p:sp>
+          <p:nvSpPr>
+            <p:cNvPr id="214" name="Rectangle 213">
+              <a:extLst>
+                <a:ext uri="{FF2B5EF4-FFF2-40B4-BE49-F238E27FC236}">
+                  <a16:creationId xmlns:a16="http://schemas.microsoft.com/office/drawing/2014/main" id="{9F7DA2BC-FAAD-441E-B9C8-14F9DADC1F1F}"/>
+                </a:ext>
+              </a:extLst>
+            </p:cNvPr>
+            <p:cNvSpPr/>
+            <p:nvPr/>
+          </p:nvSpPr>
+          <p:spPr>
+            <a:xfrm>
+              <a:off x="3074261" y="4979446"/>
+              <a:ext cx="1355408" cy="470907"/>
+            </a:xfrm>
+            <a:prstGeom prst="rect">
+              <a:avLst/>
+            </a:prstGeom>
+          </p:spPr>
+          <p:style>
+            <a:lnRef idx="2">
+              <a:schemeClr val="accent1">
+                <a:shade val="50000"/>
+              </a:schemeClr>
+            </a:lnRef>
+            <a:fillRef idx="1">
+              <a:schemeClr val="accent1"/>
+            </a:fillRef>
+            <a:effectRef idx="0">
+              <a:schemeClr val="accent1"/>
+            </a:effectRef>
+            <a:fontRef idx="minor">
+              <a:schemeClr val="lt1"/>
+            </a:fontRef>
+          </p:style>
+          <p:txBody>
+            <a:bodyPr rtlCol="0" anchor="ctr"/>
+            <a:lstStyle/>
+            <a:p>
+              <a:pPr algn="ctr"/>
+              <a:r>
+                <a:rPr lang="en-US" sz="1100" dirty="0"/>
+                <a:t>Retrain the model</a:t>
+              </a:r>
+            </a:p>
+          </p:txBody>
+        </p:sp>
+        <p:sp>
+          <p:nvSpPr>
+            <p:cNvPr id="217" name="Rectangle 216">
+              <a:extLst>
+                <a:ext uri="{FF2B5EF4-FFF2-40B4-BE49-F238E27FC236}">
+                  <a16:creationId xmlns:a16="http://schemas.microsoft.com/office/drawing/2014/main" id="{76497844-C94D-4633-8D80-BA8DEC650CAE}"/>
+                </a:ext>
+              </a:extLst>
+            </p:cNvPr>
+            <p:cNvSpPr/>
+            <p:nvPr/>
+          </p:nvSpPr>
+          <p:spPr>
+            <a:xfrm>
+              <a:off x="7754747" y="5373541"/>
+              <a:ext cx="1468088" cy="470907"/>
+            </a:xfrm>
+            <a:prstGeom prst="rect">
+              <a:avLst/>
+            </a:prstGeom>
+          </p:spPr>
+          <p:style>
+            <a:lnRef idx="2">
+              <a:schemeClr val="accent1">
+                <a:shade val="50000"/>
+              </a:schemeClr>
+            </a:lnRef>
+            <a:fillRef idx="1">
+              <a:schemeClr val="accent1"/>
+            </a:fillRef>
+            <a:effectRef idx="0">
+              <a:schemeClr val="accent1"/>
+            </a:effectRef>
+            <a:fontRef idx="minor">
+              <a:schemeClr val="lt1"/>
+            </a:fontRef>
+          </p:style>
+          <p:txBody>
+            <a:bodyPr rtlCol="0" anchor="ctr"/>
+            <a:lstStyle/>
+            <a:p>
+              <a:pPr algn="ctr"/>
+              <a:r>
+                <a:rPr lang="en-US" sz="1100" dirty="0"/>
+                <a:t>Upload new dataset</a:t>
+              </a:r>
+            </a:p>
+          </p:txBody>
+        </p:sp>
+        <p:cxnSp>
+          <p:nvCxnSpPr>
+            <p:cNvPr id="229" name="Straight Arrow Connector 228">
+              <a:extLst>
+                <a:ext uri="{FF2B5EF4-FFF2-40B4-BE49-F238E27FC236}">
+                  <a16:creationId xmlns:a16="http://schemas.microsoft.com/office/drawing/2014/main" id="{5821D136-13B7-4D41-913E-ACE388F917F3}"/>
+                </a:ext>
+              </a:extLst>
+            </p:cNvPr>
+            <p:cNvCxnSpPr>
+              <a:cxnSpLocks/>
+              <a:stCxn id="204" idx="2"/>
+              <a:endCxn id="232" idx="0"/>
+            </p:cNvCxnSpPr>
+            <p:nvPr/>
+          </p:nvCxnSpPr>
+          <p:spPr>
+            <a:xfrm flipH="1">
+              <a:off x="3755800" y="4634144"/>
+              <a:ext cx="2011374" cy="1315649"/>
+            </a:xfrm>
+            <a:prstGeom prst="straightConnector1">
+              <a:avLst/>
+            </a:prstGeom>
+            <a:ln>
+              <a:tailEnd type="triangle"/>
+            </a:ln>
+          </p:spPr>
+          <p:style>
+            <a:lnRef idx="1">
+              <a:schemeClr val="accent1"/>
+            </a:lnRef>
+            <a:fillRef idx="0">
+              <a:schemeClr val="accent1"/>
+            </a:fillRef>
+            <a:effectRef idx="0">
+              <a:schemeClr val="accent1"/>
+            </a:effectRef>
+            <a:fontRef idx="minor">
+              <a:schemeClr val="tx1"/>
+            </a:fontRef>
+          </p:style>
+        </p:cxnSp>
+        <p:sp>
+          <p:nvSpPr>
+            <p:cNvPr id="232" name="Rectangle 231">
+              <a:extLst>
+                <a:ext uri="{FF2B5EF4-FFF2-40B4-BE49-F238E27FC236}">
+                  <a16:creationId xmlns:a16="http://schemas.microsoft.com/office/drawing/2014/main" id="{4E8571BC-AA17-4BAD-A66E-EC59E8A7CA21}"/>
+                </a:ext>
+              </a:extLst>
+            </p:cNvPr>
+            <p:cNvSpPr/>
+            <p:nvPr/>
+          </p:nvSpPr>
+          <p:spPr>
+            <a:xfrm>
+              <a:off x="3070530" y="5949793"/>
+              <a:ext cx="1370540" cy="470907"/>
+            </a:xfrm>
+            <a:prstGeom prst="rect">
+              <a:avLst/>
+            </a:prstGeom>
+          </p:spPr>
+          <p:style>
+            <a:lnRef idx="2">
+              <a:schemeClr val="accent1">
+                <a:shade val="50000"/>
+              </a:schemeClr>
+            </a:lnRef>
+            <a:fillRef idx="1">
+              <a:schemeClr val="accent1"/>
+            </a:fillRef>
+            <a:effectRef idx="0">
+              <a:schemeClr val="accent1"/>
+            </a:effectRef>
+            <a:fontRef idx="minor">
+              <a:schemeClr val="lt1"/>
+            </a:fontRef>
+          </p:style>
+          <p:txBody>
+            <a:bodyPr rtlCol="0" anchor="ctr"/>
+            <a:lstStyle/>
+            <a:p>
+              <a:pPr algn="ctr"/>
+              <a:r>
+                <a:rPr lang="en-US" sz="1100" dirty="0"/>
+                <a:t>Test patient</a:t>
+              </a:r>
+            </a:p>
+          </p:txBody>
+        </p:sp>
+        <p:cxnSp>
+          <p:nvCxnSpPr>
+            <p:cNvPr id="246" name="Connector: Elbow 245">
+              <a:extLst>
+                <a:ext uri="{FF2B5EF4-FFF2-40B4-BE49-F238E27FC236}">
+                  <a16:creationId xmlns:a16="http://schemas.microsoft.com/office/drawing/2014/main" id="{5FD0A708-3AEA-44AD-BB1F-15DB9FDD5CB2}"/>
+                </a:ext>
+              </a:extLst>
+            </p:cNvPr>
+            <p:cNvCxnSpPr>
+              <a:stCxn id="217" idx="3"/>
+              <a:endCxn id="132" idx="3"/>
+            </p:cNvCxnSpPr>
+            <p:nvPr/>
+          </p:nvCxnSpPr>
+          <p:spPr>
+            <a:xfrm flipH="1" flipV="1">
+              <a:off x="9154010" y="2631067"/>
+              <a:ext cx="68825" cy="2977928"/>
+            </a:xfrm>
+            <a:prstGeom prst="bentConnector3">
+              <a:avLst>
+                <a:gd name="adj1" fmla="val -332147"/>
+              </a:avLst>
+            </a:prstGeom>
+            <a:ln>
+              <a:tailEnd type="triangle"/>
+            </a:ln>
+          </p:spPr>
+          <p:style>
+            <a:lnRef idx="1">
+              <a:schemeClr val="accent1"/>
+            </a:lnRef>
+            <a:fillRef idx="0">
+              <a:schemeClr val="accent1"/>
+            </a:fillRef>
+            <a:effectRef idx="0">
+              <a:schemeClr val="accent1"/>
+            </a:effectRef>
+            <a:fontRef idx="minor">
+              <a:schemeClr val="tx1"/>
+            </a:fontRef>
+          </p:style>
+        </p:cxnSp>
+        <p:cxnSp>
+          <p:nvCxnSpPr>
+            <p:cNvPr id="248" name="Connector: Elbow 247">
+              <a:extLst>
+                <a:ext uri="{FF2B5EF4-FFF2-40B4-BE49-F238E27FC236}">
+                  <a16:creationId xmlns:a16="http://schemas.microsoft.com/office/drawing/2014/main" id="{35ED26BB-33D6-4E52-8B02-0A4A22FC152A}"/>
+                </a:ext>
+              </a:extLst>
+            </p:cNvPr>
+            <p:cNvCxnSpPr>
+              <a:cxnSpLocks/>
+              <a:stCxn id="214" idx="0"/>
+              <a:endCxn id="204" idx="1"/>
+            </p:cNvCxnSpPr>
+            <p:nvPr/>
+          </p:nvCxnSpPr>
+          <p:spPr>
+            <a:xfrm rot="5400000" flipH="1" flipV="1">
+              <a:off x="3780401" y="4370256"/>
+              <a:ext cx="580755" cy="637626"/>
+            </a:xfrm>
+            <a:prstGeom prst="bentConnector2">
+              <a:avLst/>
+            </a:prstGeom>
+            <a:ln>
+              <a:tailEnd type="triangle"/>
+            </a:ln>
+          </p:spPr>
+          <p:style>
+            <a:lnRef idx="1">
+              <a:schemeClr val="accent1"/>
+            </a:lnRef>
+            <a:fillRef idx="0">
+              <a:schemeClr val="accent1"/>
+            </a:fillRef>
+            <a:effectRef idx="0">
+              <a:schemeClr val="accent1"/>
+            </a:effectRef>
+            <a:fontRef idx="minor">
+              <a:schemeClr val="tx1"/>
+            </a:fontRef>
+          </p:style>
+        </p:cxnSp>
+        <p:cxnSp>
+          <p:nvCxnSpPr>
+            <p:cNvPr id="250" name="Connector: Elbow 249">
+              <a:extLst>
+                <a:ext uri="{FF2B5EF4-FFF2-40B4-BE49-F238E27FC236}">
+                  <a16:creationId xmlns:a16="http://schemas.microsoft.com/office/drawing/2014/main" id="{E4229114-1731-4FCD-B329-8B7B39786FB3}"/>
+                </a:ext>
+              </a:extLst>
+            </p:cNvPr>
+            <p:cNvCxnSpPr>
+              <a:cxnSpLocks/>
+              <a:stCxn id="232" idx="1"/>
+              <a:endCxn id="47" idx="1"/>
+            </p:cNvCxnSpPr>
+            <p:nvPr/>
+          </p:nvCxnSpPr>
+          <p:spPr>
+            <a:xfrm rot="10800000">
+              <a:off x="257656" y="2128613"/>
+              <a:ext cx="2812875" cy="4056634"/>
+            </a:xfrm>
+            <a:prstGeom prst="bentConnector3">
+              <a:avLst>
+                <a:gd name="adj1" fmla="val 108127"/>
+              </a:avLst>
+            </a:prstGeom>
+            <a:ln>
+              <a:tailEnd type="triangle"/>
+            </a:ln>
+          </p:spPr>
+          <p:style>
+            <a:lnRef idx="1">
+              <a:schemeClr val="accent1"/>
+            </a:lnRef>
+            <a:fillRef idx="0">
+              <a:schemeClr val="accent1"/>
+            </a:fillRef>
+            <a:effectRef idx="0">
+              <a:schemeClr val="accent1"/>
+            </a:effectRef>
+            <a:fontRef idx="minor">
+              <a:schemeClr val="tx1"/>
+            </a:fontRef>
+          </p:style>
+        </p:cxnSp>
+        <p:sp>
+          <p:nvSpPr>
+            <p:cNvPr id="269" name="Rectangle: Rounded Corners 268">
+              <a:extLst>
+                <a:ext uri="{FF2B5EF4-FFF2-40B4-BE49-F238E27FC236}">
+                  <a16:creationId xmlns:a16="http://schemas.microsoft.com/office/drawing/2014/main" id="{CEADE0F7-06A0-416E-AEED-BD3068870C5E}"/>
+                </a:ext>
+              </a:extLst>
+            </p:cNvPr>
+            <p:cNvSpPr/>
+            <p:nvPr/>
+          </p:nvSpPr>
+          <p:spPr>
+            <a:xfrm>
+              <a:off x="5078176" y="5371698"/>
+              <a:ext cx="1370537" cy="470907"/>
+            </a:xfrm>
+            <a:prstGeom prst="roundRect">
+              <a:avLst/>
+            </a:prstGeom>
+            <a:solidFill>
+              <a:schemeClr val="accent5"/>
+            </a:solidFill>
+          </p:spPr>
+          <p:style>
+            <a:lnRef idx="2">
+              <a:schemeClr val="accent1">
+                <a:shade val="50000"/>
+              </a:schemeClr>
+            </a:lnRef>
+            <a:fillRef idx="1">
+              <a:schemeClr val="accent1"/>
+            </a:fillRef>
+            <a:effectRef idx="0">
+              <a:schemeClr val="accent1"/>
+            </a:effectRef>
+            <a:fontRef idx="minor">
+              <a:schemeClr val="lt1"/>
+            </a:fontRef>
+          </p:style>
+          <p:txBody>
+            <a:bodyPr rtlCol="0" anchor="ctr"/>
+            <a:lstStyle/>
+            <a:p>
+              <a:pPr algn="ctr"/>
+              <a:r>
+                <a:rPr lang="en-US" sz="1100" dirty="0"/>
+                <a:t>End Task</a:t>
+              </a:r>
+            </a:p>
+          </p:txBody>
+        </p:sp>
+        <p:sp>
+          <p:nvSpPr>
+            <p:cNvPr id="271" name="Rectangle: Rounded Corners 270">
+              <a:extLst>
+                <a:ext uri="{FF2B5EF4-FFF2-40B4-BE49-F238E27FC236}">
+                  <a16:creationId xmlns:a16="http://schemas.microsoft.com/office/drawing/2014/main" id="{12BDB91C-AE3C-485E-82F2-A93C70864D78}"/>
+                </a:ext>
+              </a:extLst>
+            </p:cNvPr>
+            <p:cNvSpPr/>
+            <p:nvPr/>
+          </p:nvSpPr>
+          <p:spPr>
+            <a:xfrm>
+              <a:off x="1220896" y="5056514"/>
+              <a:ext cx="1370537" cy="470907"/>
+            </a:xfrm>
+            <a:prstGeom prst="roundRect">
+              <a:avLst/>
+            </a:prstGeom>
+            <a:solidFill>
+              <a:schemeClr val="accent5"/>
+            </a:solidFill>
+          </p:spPr>
+          <p:style>
+            <a:lnRef idx="2">
+              <a:schemeClr val="accent1">
+                <a:shade val="50000"/>
+              </a:schemeClr>
+            </a:lnRef>
+            <a:fillRef idx="1">
+              <a:schemeClr val="accent1"/>
+            </a:fillRef>
+            <a:effectRef idx="0">
+              <a:schemeClr val="accent1"/>
+            </a:effectRef>
+            <a:fontRef idx="minor">
+              <a:schemeClr val="lt1"/>
+            </a:fontRef>
+          </p:style>
+          <p:txBody>
+            <a:bodyPr rtlCol="0" anchor="ctr"/>
+            <a:lstStyle/>
+            <a:p>
+              <a:pPr algn="ctr"/>
+              <a:r>
+                <a:rPr lang="en-US" sz="1100" dirty="0"/>
+                <a:t>End Task</a:t>
+              </a:r>
+            </a:p>
+          </p:txBody>
+        </p:sp>
+        <p:cxnSp>
+          <p:nvCxnSpPr>
+            <p:cNvPr id="272" name="Straight Arrow Connector 271">
+              <a:extLst>
+                <a:ext uri="{FF2B5EF4-FFF2-40B4-BE49-F238E27FC236}">
+                  <a16:creationId xmlns:a16="http://schemas.microsoft.com/office/drawing/2014/main" id="{F8296423-0F5E-493F-A80C-E8037E937562}"/>
+                </a:ext>
+              </a:extLst>
+            </p:cNvPr>
+            <p:cNvCxnSpPr>
+              <a:cxnSpLocks/>
+              <a:stCxn id="40" idx="2"/>
+              <a:endCxn id="271" idx="0"/>
+            </p:cNvCxnSpPr>
+            <p:nvPr/>
+          </p:nvCxnSpPr>
+          <p:spPr>
+            <a:xfrm flipH="1">
+              <a:off x="1906165" y="4578292"/>
+              <a:ext cx="10344" cy="478222"/>
+            </a:xfrm>
+            <a:prstGeom prst="straightConnector1">
+              <a:avLst/>
+            </a:prstGeom>
+            <a:ln>
+              <a:tailEnd type="triangle"/>
+            </a:ln>
+          </p:spPr>
+          <p:style>
+            <a:lnRef idx="1">
+              <a:schemeClr val="accent1"/>
+            </a:lnRef>
+            <a:fillRef idx="0">
+              <a:schemeClr val="accent1"/>
+            </a:fillRef>
+            <a:effectRef idx="0">
+              <a:schemeClr val="accent1"/>
+            </a:effectRef>
+            <a:fontRef idx="minor">
+              <a:schemeClr val="tx1"/>
+            </a:fontRef>
+          </p:style>
+        </p:cxnSp>
+      </p:grpSp>
+    </p:spTree>
+    <p:extLst>
+      <p:ext uri="{BB962C8B-B14F-4D97-AF65-F5344CB8AC3E}">
+        <p14:creationId xmlns:p14="http://schemas.microsoft.com/office/powerpoint/2010/main" val="3911550451"/>
       </p:ext>
     </p:extLst>
   </p:cSld>

</xml_diff>

<commit_message>
Upladed high resolution fig and change copy right to 2021 and modified structuregraph
</commit_message>
<xml_diff>
--- a/docs/Manuscript/Figures/iMedBotStructure.pptx
+++ b/docs/Manuscript/Figures/iMedBotStructure.pptx
@@ -5,13 +5,14 @@
     <p:sldMasterId id="2147483659" r:id="rId1"/>
   </p:sldMasterIdLst>
   <p:notesMasterIdLst>
-    <p:notesMasterId r:id="rId6"/>
+    <p:notesMasterId r:id="rId7"/>
   </p:notesMasterIdLst>
   <p:sldIdLst>
     <p:sldId id="1367" r:id="rId2"/>
     <p:sldId id="1370" r:id="rId3"/>
-    <p:sldId id="1368" r:id="rId4"/>
-    <p:sldId id="1369" r:id="rId5"/>
+    <p:sldId id="1372" r:id="rId4"/>
+    <p:sldId id="1368" r:id="rId5"/>
+    <p:sldId id="1369" r:id="rId6"/>
   </p:sldIdLst>
   <p:sldSz cx="9906000" cy="6858000" type="A4"/>
   <p:notesSz cx="6858000" cy="9144000"/>
@@ -1183,7 +1184,7 @@
           <a:p>
             <a:fld id="{D2CA1F8B-7CEF-3E43-B4EE-83E029EB6154}" type="datetimeFigureOut">
               <a:rPr lang="en-US" smtClean="0"/>
-              <a:t>9/1/2022</a:t>
+              <a:t>9/4/2022</a:t>
             </a:fld>
             <a:endParaRPr lang="en-US"/>
           </a:p>
@@ -6075,6 +6076,41 @@
           </p:spPr>
         </p:pic>
       </p:grpSp>
+      <p:sp>
+        <p:nvSpPr>
+          <p:cNvPr id="2" name="TextBox 1">
+            <a:extLst>
+              <a:ext uri="{FF2B5EF4-FFF2-40B4-BE49-F238E27FC236}">
+                <a16:creationId xmlns:a16="http://schemas.microsoft.com/office/drawing/2014/main" id="{9FBFE7BB-870B-4148-A4D3-22832A3ADDA3}"/>
+              </a:ext>
+            </a:extLst>
+          </p:cNvPr>
+          <p:cNvSpPr txBox="1"/>
+          <p:nvPr/>
+        </p:nvSpPr>
+        <p:spPr>
+          <a:xfrm>
+            <a:off x="1429304" y="683581"/>
+            <a:ext cx="1917577" cy="345159"/>
+          </a:xfrm>
+          <a:prstGeom prst="rect">
+            <a:avLst/>
+          </a:prstGeom>
+          <a:noFill/>
+        </p:spPr>
+        <p:txBody>
+          <a:bodyPr wrap="square" rtlCol="0">
+            <a:spAutoFit/>
+          </a:bodyPr>
+          <a:lstStyle/>
+          <a:p>
+            <a:r>
+              <a:rPr lang="en-US" dirty="0"/>
+              <a:t>Original one</a:t>
+            </a:r>
+          </a:p>
+        </p:txBody>
+      </p:sp>
     </p:spTree>
     <p:extLst>
       <p:ext uri="{BB962C8B-B14F-4D97-AF65-F5344CB8AC3E}">
@@ -6107,10 +6143,10 @@
       </p:grpSpPr>
       <p:grpSp>
         <p:nvGrpSpPr>
-          <p:cNvPr id="47" name="Group 46">
+          <p:cNvPr id="13" name="Group 12">
             <a:extLst>
               <a:ext uri="{FF2B5EF4-FFF2-40B4-BE49-F238E27FC236}">
-                <a16:creationId xmlns:a16="http://schemas.microsoft.com/office/drawing/2014/main" id="{1E93C992-4F21-4234-B3A4-902BF2AFE43B}"/>
+                <a16:creationId xmlns:a16="http://schemas.microsoft.com/office/drawing/2014/main" id="{AFA76FA3-7BDC-4CEE-A1DA-BC3BB20054FD}"/>
               </a:ext>
             </a:extLst>
           </p:cNvPr>
@@ -6119,10 +6155,10 @@
         </p:nvGrpSpPr>
         <p:grpSpPr>
           <a:xfrm>
-            <a:off x="528919" y="889734"/>
-            <a:ext cx="8792634" cy="4861112"/>
-            <a:chOff x="528919" y="889734"/>
-            <a:chExt cx="8792634" cy="4861112"/>
+            <a:off x="834501" y="1003177"/>
+            <a:ext cx="8165977" cy="4208015"/>
+            <a:chOff x="834501" y="1003177"/>
+            <a:chExt cx="8165977" cy="4208015"/>
           </a:xfrm>
         </p:grpSpPr>
         <p:sp>
@@ -6130,7 +6166,7 @@
             <p:cNvPr id="4" name="Rectangle 3">
               <a:extLst>
                 <a:ext uri="{FF2B5EF4-FFF2-40B4-BE49-F238E27FC236}">
-                  <a16:creationId xmlns:a16="http://schemas.microsoft.com/office/drawing/2014/main" id="{E2F87E50-0490-4E44-828B-C9AE39D91839}"/>
+                  <a16:creationId xmlns:a16="http://schemas.microsoft.com/office/drawing/2014/main" id="{EFB37B1F-40C5-4873-B46B-2FECD0CA36D0}"/>
                 </a:ext>
               </a:extLst>
             </p:cNvPr>
@@ -6139,76 +6175,18 @@
           </p:nvSpPr>
           <p:spPr>
             <a:xfrm>
-              <a:off x="528919" y="889734"/>
-              <a:ext cx="8792634" cy="4861112"/>
+              <a:off x="834501" y="1003177"/>
+              <a:ext cx="8165977" cy="4208015"/>
             </a:xfrm>
             <a:prstGeom prst="rect">
               <a:avLst/>
             </a:prstGeom>
+            <a:noFill/>
             <a:ln>
               <a:solidFill>
-                <a:schemeClr val="tx1"/>
+                <a:schemeClr val="bg1"/>
               </a:solidFill>
             </a:ln>
-          </p:spPr>
-          <p:style>
-            <a:lnRef idx="2">
-              <a:schemeClr val="accent1"/>
-            </a:lnRef>
-            <a:fillRef idx="1">
-              <a:schemeClr val="lt1"/>
-            </a:fillRef>
-            <a:effectRef idx="0">
-              <a:schemeClr val="accent1"/>
-            </a:effectRef>
-            <a:fontRef idx="minor">
-              <a:schemeClr val="dk1"/>
-            </a:fontRef>
-          </p:style>
-          <p:txBody>
-            <a:bodyPr rtlCol="0" anchor="ctr"/>
-            <a:lstStyle/>
-            <a:p>
-              <a:pPr algn="ctr"/>
-              <a:endParaRPr lang="en-US"/>
-            </a:p>
-          </p:txBody>
-        </p:sp>
-        <p:sp>
-          <p:nvSpPr>
-            <p:cNvPr id="5" name="Rectangle 4">
-              <a:extLst>
-                <a:ext uri="{FF2B5EF4-FFF2-40B4-BE49-F238E27FC236}">
-                  <a16:creationId xmlns:a16="http://schemas.microsoft.com/office/drawing/2014/main" id="{E8FD70E8-5199-4454-82E4-98C7361D7F04}"/>
-                </a:ext>
-              </a:extLst>
-            </p:cNvPr>
-            <p:cNvSpPr/>
-            <p:nvPr/>
-          </p:nvSpPr>
-          <p:spPr>
-            <a:xfrm>
-              <a:off x="1365531" y="3085358"/>
-              <a:ext cx="876300" cy="469900"/>
-            </a:xfrm>
-            <a:prstGeom prst="rect">
-              <a:avLst/>
-            </a:prstGeom>
-            <a:solidFill>
-              <a:schemeClr val="accent5"/>
-            </a:solidFill>
-            <a:ln>
-              <a:solidFill>
-                <a:schemeClr val="tx1"/>
-              </a:solidFill>
-            </a:ln>
-            <a:effectLst>
-              <a:innerShdw blurRad="63500" dist="50800" dir="5400000">
-                <a:prstClr val="black">
-                  <a:alpha val="50000"/>
-                </a:prstClr>
-              </a:innerShdw>
-            </a:effectLst>
           </p:spPr>
           <p:style>
             <a:lnRef idx="2">
@@ -6231,53 +6209,1177 @@
             <a:lstStyle/>
             <a:p>
               <a:pPr algn="ctr"/>
-              <a:r>
-                <a:rPr lang="en-US" dirty="0"/>
-                <a:t>Client</a:t>
-              </a:r>
+              <a:endParaRPr lang="en-US"/>
             </a:p>
           </p:txBody>
         </p:sp>
+        <p:pic>
+          <p:nvPicPr>
+            <p:cNvPr id="8" name="Picture 7">
+              <a:extLst>
+                <a:ext uri="{FF2B5EF4-FFF2-40B4-BE49-F238E27FC236}">
+                  <a16:creationId xmlns:a16="http://schemas.microsoft.com/office/drawing/2014/main" id="{328AA1BD-4DB6-45BA-B40A-AC7F8A7C7888}"/>
+                </a:ext>
+              </a:extLst>
+            </p:cNvPr>
+            <p:cNvPicPr>
+              <a:picLocks noChangeAspect="1"/>
+            </p:cNvPicPr>
+            <p:nvPr/>
+          </p:nvPicPr>
+          <p:blipFill>
+            <a:blip r:embed="rId2"/>
+            <a:stretch>
+              <a:fillRect/>
+            </a:stretch>
+          </p:blipFill>
+          <p:spPr>
+            <a:xfrm>
+              <a:off x="905522" y="1139923"/>
+              <a:ext cx="3949891" cy="3930601"/>
+            </a:xfrm>
+            <a:prstGeom prst="rect">
+              <a:avLst/>
+            </a:prstGeom>
+          </p:spPr>
+        </p:pic>
+        <p:pic>
+          <p:nvPicPr>
+            <p:cNvPr id="11" name="Picture 10">
+              <a:extLst>
+                <a:ext uri="{FF2B5EF4-FFF2-40B4-BE49-F238E27FC236}">
+                  <a16:creationId xmlns:a16="http://schemas.microsoft.com/office/drawing/2014/main" id="{27FEC893-B1D6-40BF-A4B9-F95E1A7B7D91}"/>
+                </a:ext>
+              </a:extLst>
+            </p:cNvPr>
+            <p:cNvPicPr>
+              <a:picLocks noChangeAspect="1"/>
+            </p:cNvPicPr>
+            <p:nvPr/>
+          </p:nvPicPr>
+          <p:blipFill>
+            <a:blip r:embed="rId3"/>
+            <a:stretch>
+              <a:fillRect/>
+            </a:stretch>
+          </p:blipFill>
+          <p:spPr>
+            <a:xfrm>
+              <a:off x="5050589" y="1139923"/>
+              <a:ext cx="3949889" cy="3930601"/>
+            </a:xfrm>
+            <a:prstGeom prst="rect">
+              <a:avLst/>
+            </a:prstGeom>
+          </p:spPr>
+        </p:pic>
+      </p:grpSp>
+      <p:sp>
+        <p:nvSpPr>
+          <p:cNvPr id="14" name="TextBox 13">
+            <a:extLst>
+              <a:ext uri="{FF2B5EF4-FFF2-40B4-BE49-F238E27FC236}">
+                <a16:creationId xmlns:a16="http://schemas.microsoft.com/office/drawing/2014/main" id="{0BEBB02F-0A0D-4184-A08F-A3A288285DB4}"/>
+              </a:ext>
+            </a:extLst>
+          </p:cNvPr>
+          <p:cNvSpPr txBox="1"/>
+          <p:nvPr/>
+        </p:nvSpPr>
+        <p:spPr>
+          <a:xfrm>
+            <a:off x="1429304" y="683581"/>
+            <a:ext cx="2991776" cy="345159"/>
+          </a:xfrm>
+          <a:prstGeom prst="rect">
+            <a:avLst/>
+          </a:prstGeom>
+          <a:noFill/>
+        </p:spPr>
+        <p:txBody>
+          <a:bodyPr wrap="square" rtlCol="0">
+            <a:spAutoFit/>
+          </a:bodyPr>
+          <a:lstStyle/>
+          <a:p>
+            <a:r>
+              <a:rPr lang="en-US" dirty="0"/>
+              <a:t>New one with high resolution</a:t>
+            </a:r>
+          </a:p>
+        </p:txBody>
+      </p:sp>
+    </p:spTree>
+    <p:extLst>
+      <p:ext uri="{BB962C8B-B14F-4D97-AF65-F5344CB8AC3E}">
+        <p14:creationId xmlns:p14="http://schemas.microsoft.com/office/powerpoint/2010/main" val="3236614120"/>
+      </p:ext>
+    </p:extLst>
+  </p:cSld>
+  <p:clrMapOvr>
+    <a:masterClrMapping/>
+  </p:clrMapOvr>
+</p:sld>
+</file>
+
+<file path=ppt/slides/slide4.xml><?xml version="1.0" encoding="utf-8"?>
+<p:sld xmlns:a="http://schemas.openxmlformats.org/drawingml/2006/main" xmlns:r="http://schemas.openxmlformats.org/officeDocument/2006/relationships" xmlns:p="http://schemas.openxmlformats.org/presentationml/2006/main">
+  <p:cSld>
+    <p:spTree>
+      <p:nvGrpSpPr>
+        <p:cNvPr id="1" name=""/>
+        <p:cNvGrpSpPr/>
+        <p:nvPr/>
+      </p:nvGrpSpPr>
+      <p:grpSpPr>
+        <a:xfrm>
+          <a:off x="0" y="0"/>
+          <a:ext cx="0" cy="0"/>
+          <a:chOff x="0" y="0"/>
+          <a:chExt cx="0" cy="0"/>
+        </a:xfrm>
+      </p:grpSpPr>
+      <p:grpSp>
+        <p:nvGrpSpPr>
+          <p:cNvPr id="19" name="Group 18">
+            <a:extLst>
+              <a:ext uri="{FF2B5EF4-FFF2-40B4-BE49-F238E27FC236}">
+                <a16:creationId xmlns:a16="http://schemas.microsoft.com/office/drawing/2014/main" id="{CADEB256-3717-453D-91E9-0EB204751AD0}"/>
+              </a:ext>
+            </a:extLst>
+          </p:cNvPr>
+          <p:cNvGrpSpPr/>
+          <p:nvPr/>
+        </p:nvGrpSpPr>
+        <p:grpSpPr>
+          <a:xfrm>
+            <a:off x="528919" y="889734"/>
+            <a:ext cx="8792634" cy="4861112"/>
+            <a:chOff x="528919" y="889734"/>
+            <a:chExt cx="8792634" cy="4861112"/>
+          </a:xfrm>
+        </p:grpSpPr>
+        <p:grpSp>
+          <p:nvGrpSpPr>
+            <p:cNvPr id="47" name="Group 46">
+              <a:extLst>
+                <a:ext uri="{FF2B5EF4-FFF2-40B4-BE49-F238E27FC236}">
+                  <a16:creationId xmlns:a16="http://schemas.microsoft.com/office/drawing/2014/main" id="{1E93C992-4F21-4234-B3A4-902BF2AFE43B}"/>
+                </a:ext>
+              </a:extLst>
+            </p:cNvPr>
+            <p:cNvGrpSpPr/>
+            <p:nvPr/>
+          </p:nvGrpSpPr>
+          <p:grpSpPr>
+            <a:xfrm>
+              <a:off x="528919" y="889734"/>
+              <a:ext cx="8792634" cy="4861112"/>
+              <a:chOff x="528919" y="889734"/>
+              <a:chExt cx="8792634" cy="4861112"/>
+            </a:xfrm>
+          </p:grpSpPr>
+          <p:sp>
+            <p:nvSpPr>
+              <p:cNvPr id="4" name="Rectangle 3">
+                <a:extLst>
+                  <a:ext uri="{FF2B5EF4-FFF2-40B4-BE49-F238E27FC236}">
+                    <a16:creationId xmlns:a16="http://schemas.microsoft.com/office/drawing/2014/main" id="{E2F87E50-0490-4E44-828B-C9AE39D91839}"/>
+                  </a:ext>
+                </a:extLst>
+              </p:cNvPr>
+              <p:cNvSpPr/>
+              <p:nvPr/>
+            </p:nvSpPr>
+            <p:spPr>
+              <a:xfrm>
+                <a:off x="528919" y="889734"/>
+                <a:ext cx="8792634" cy="4861112"/>
+              </a:xfrm>
+              <a:prstGeom prst="rect">
+                <a:avLst/>
+              </a:prstGeom>
+              <a:ln>
+                <a:solidFill>
+                  <a:schemeClr val="tx1"/>
+                </a:solidFill>
+              </a:ln>
+            </p:spPr>
+            <p:style>
+              <a:lnRef idx="2">
+                <a:schemeClr val="accent1"/>
+              </a:lnRef>
+              <a:fillRef idx="1">
+                <a:schemeClr val="lt1"/>
+              </a:fillRef>
+              <a:effectRef idx="0">
+                <a:schemeClr val="accent1"/>
+              </a:effectRef>
+              <a:fontRef idx="minor">
+                <a:schemeClr val="dk1"/>
+              </a:fontRef>
+            </p:style>
+            <p:txBody>
+              <a:bodyPr rtlCol="0" anchor="ctr"/>
+              <a:lstStyle/>
+              <a:p>
+                <a:pPr algn="ctr"/>
+                <a:endParaRPr lang="en-US"/>
+              </a:p>
+            </p:txBody>
+          </p:sp>
+          <p:sp>
+            <p:nvSpPr>
+              <p:cNvPr id="5" name="Rectangle 4">
+                <a:extLst>
+                  <a:ext uri="{FF2B5EF4-FFF2-40B4-BE49-F238E27FC236}">
+                    <a16:creationId xmlns:a16="http://schemas.microsoft.com/office/drawing/2014/main" id="{E8FD70E8-5199-4454-82E4-98C7361D7F04}"/>
+                  </a:ext>
+                </a:extLst>
+              </p:cNvPr>
+              <p:cNvSpPr/>
+              <p:nvPr/>
+            </p:nvSpPr>
+            <p:spPr>
+              <a:xfrm>
+                <a:off x="1365531" y="3085358"/>
+                <a:ext cx="876300" cy="469900"/>
+              </a:xfrm>
+              <a:prstGeom prst="rect">
+                <a:avLst/>
+              </a:prstGeom>
+              <a:solidFill>
+                <a:schemeClr val="accent5"/>
+              </a:solidFill>
+              <a:ln>
+                <a:solidFill>
+                  <a:schemeClr val="tx1"/>
+                </a:solidFill>
+              </a:ln>
+              <a:effectLst>
+                <a:innerShdw blurRad="63500" dist="50800" dir="5400000">
+                  <a:prstClr val="black">
+                    <a:alpha val="50000"/>
+                  </a:prstClr>
+                </a:innerShdw>
+              </a:effectLst>
+            </p:spPr>
+            <p:style>
+              <a:lnRef idx="2">
+                <a:schemeClr val="accent1">
+                  <a:shade val="50000"/>
+                </a:schemeClr>
+              </a:lnRef>
+              <a:fillRef idx="1">
+                <a:schemeClr val="accent1"/>
+              </a:fillRef>
+              <a:effectRef idx="0">
+                <a:schemeClr val="accent1"/>
+              </a:effectRef>
+              <a:fontRef idx="minor">
+                <a:schemeClr val="lt1"/>
+              </a:fontRef>
+            </p:style>
+            <p:txBody>
+              <a:bodyPr rtlCol="0" anchor="ctr"/>
+              <a:lstStyle/>
+              <a:p>
+                <a:pPr algn="ctr"/>
+                <a:r>
+                  <a:rPr lang="en-US" dirty="0"/>
+                  <a:t>Client</a:t>
+                </a:r>
+              </a:p>
+            </p:txBody>
+          </p:sp>
+          <p:cxnSp>
+            <p:nvCxnSpPr>
+              <p:cNvPr id="7" name="Straight Arrow Connector 6">
+                <a:extLst>
+                  <a:ext uri="{FF2B5EF4-FFF2-40B4-BE49-F238E27FC236}">
+                    <a16:creationId xmlns:a16="http://schemas.microsoft.com/office/drawing/2014/main" id="{0ECCB4E3-62B7-4416-8780-610CC5C028C5}"/>
+                  </a:ext>
+                </a:extLst>
+              </p:cNvPr>
+              <p:cNvCxnSpPr>
+                <a:cxnSpLocks/>
+                <a:stCxn id="5" idx="3"/>
+                <a:endCxn id="9" idx="1"/>
+              </p:cNvCxnSpPr>
+              <p:nvPr/>
+            </p:nvCxnSpPr>
+            <p:spPr>
+              <a:xfrm flipV="1">
+                <a:off x="2241831" y="3320290"/>
+                <a:ext cx="332161" cy="18"/>
+              </a:xfrm>
+              <a:prstGeom prst="straightConnector1">
+                <a:avLst/>
+              </a:prstGeom>
+              <a:ln w="28575">
+                <a:solidFill>
+                  <a:schemeClr val="accent3"/>
+                </a:solidFill>
+                <a:tailEnd type="triangle"/>
+              </a:ln>
+            </p:spPr>
+            <p:style>
+              <a:lnRef idx="1">
+                <a:schemeClr val="accent1"/>
+              </a:lnRef>
+              <a:fillRef idx="0">
+                <a:schemeClr val="accent1"/>
+              </a:fillRef>
+              <a:effectRef idx="0">
+                <a:schemeClr val="accent1"/>
+              </a:effectRef>
+              <a:fontRef idx="minor">
+                <a:schemeClr val="tx1"/>
+              </a:fontRef>
+            </p:style>
+          </p:cxnSp>
+          <p:sp>
+            <p:nvSpPr>
+              <p:cNvPr id="9" name="Rectangle 8">
+                <a:extLst>
+                  <a:ext uri="{FF2B5EF4-FFF2-40B4-BE49-F238E27FC236}">
+                    <a16:creationId xmlns:a16="http://schemas.microsoft.com/office/drawing/2014/main" id="{7313618B-AD65-407A-B001-BB64B6CF12E3}"/>
+                  </a:ext>
+                </a:extLst>
+              </p:cNvPr>
+              <p:cNvSpPr/>
+              <p:nvPr/>
+            </p:nvSpPr>
+            <p:spPr>
+              <a:xfrm>
+                <a:off x="2573992" y="2955463"/>
+                <a:ext cx="1403348" cy="729654"/>
+              </a:xfrm>
+              <a:prstGeom prst="rect">
+                <a:avLst/>
+              </a:prstGeom>
+              <a:solidFill>
+                <a:schemeClr val="accent6">
+                  <a:lumMod val="50000"/>
+                </a:schemeClr>
+              </a:solidFill>
+              <a:ln>
+                <a:solidFill>
+                  <a:schemeClr val="tx1"/>
+                </a:solidFill>
+              </a:ln>
+              <a:effectLst>
+                <a:innerShdw blurRad="63500" dist="50800" dir="5400000">
+                  <a:prstClr val="black">
+                    <a:alpha val="50000"/>
+                  </a:prstClr>
+                </a:innerShdw>
+              </a:effectLst>
+            </p:spPr>
+            <p:style>
+              <a:lnRef idx="2">
+                <a:schemeClr val="accent1">
+                  <a:shade val="50000"/>
+                </a:schemeClr>
+              </a:lnRef>
+              <a:fillRef idx="1">
+                <a:schemeClr val="accent1"/>
+              </a:fillRef>
+              <a:effectRef idx="0">
+                <a:schemeClr val="accent1"/>
+              </a:effectRef>
+              <a:fontRef idx="minor">
+                <a:schemeClr val="lt1"/>
+              </a:fontRef>
+            </p:style>
+            <p:txBody>
+              <a:bodyPr rtlCol="0" anchor="ctr"/>
+              <a:lstStyle/>
+              <a:p>
+                <a:pPr algn="ctr"/>
+                <a:r>
+                  <a:rPr lang="en-US" dirty="0"/>
+                  <a:t>Load Balancer</a:t>
+                </a:r>
+              </a:p>
+              <a:p>
+                <a:pPr algn="ctr"/>
+                <a:r>
+                  <a:rPr lang="en-US" dirty="0"/>
+                  <a:t>(AWS ELB)</a:t>
+                </a:r>
+              </a:p>
+            </p:txBody>
+          </p:sp>
+          <p:cxnSp>
+            <p:nvCxnSpPr>
+              <p:cNvPr id="11" name="Straight Arrow Connector 10">
+                <a:extLst>
+                  <a:ext uri="{FF2B5EF4-FFF2-40B4-BE49-F238E27FC236}">
+                    <a16:creationId xmlns:a16="http://schemas.microsoft.com/office/drawing/2014/main" id="{D1E34953-6D74-438E-B678-857C921FE545}"/>
+                  </a:ext>
+                </a:extLst>
+              </p:cNvPr>
+              <p:cNvCxnSpPr>
+                <a:cxnSpLocks/>
+                <a:stCxn id="5" idx="0"/>
+                <a:endCxn id="12" idx="2"/>
+              </p:cNvCxnSpPr>
+              <p:nvPr/>
+            </p:nvCxnSpPr>
+            <p:spPr>
+              <a:xfrm flipV="1">
+                <a:off x="1803681" y="2665317"/>
+                <a:ext cx="0" cy="420041"/>
+              </a:xfrm>
+              <a:prstGeom prst="straightConnector1">
+                <a:avLst/>
+              </a:prstGeom>
+              <a:ln w="28575">
+                <a:solidFill>
+                  <a:schemeClr val="accent3"/>
+                </a:solidFill>
+                <a:tailEnd type="triangle"/>
+              </a:ln>
+            </p:spPr>
+            <p:style>
+              <a:lnRef idx="1">
+                <a:schemeClr val="accent1"/>
+              </a:lnRef>
+              <a:fillRef idx="0">
+                <a:schemeClr val="accent1"/>
+              </a:fillRef>
+              <a:effectRef idx="0">
+                <a:schemeClr val="accent1"/>
+              </a:effectRef>
+              <a:fontRef idx="minor">
+                <a:schemeClr val="tx1"/>
+              </a:fontRef>
+            </p:style>
+          </p:cxnSp>
+          <p:sp>
+            <p:nvSpPr>
+              <p:cNvPr id="12" name="Rectangle 11">
+                <a:extLst>
+                  <a:ext uri="{FF2B5EF4-FFF2-40B4-BE49-F238E27FC236}">
+                    <a16:creationId xmlns:a16="http://schemas.microsoft.com/office/drawing/2014/main" id="{8CE8E64C-DFA3-4422-8658-A39F2E06FB6F}"/>
+                  </a:ext>
+                </a:extLst>
+              </p:cNvPr>
+              <p:cNvSpPr/>
+              <p:nvPr/>
+            </p:nvSpPr>
+            <p:spPr>
+              <a:xfrm>
+                <a:off x="1005281" y="1935663"/>
+                <a:ext cx="1596800" cy="729654"/>
+              </a:xfrm>
+              <a:prstGeom prst="rect">
+                <a:avLst/>
+              </a:prstGeom>
+              <a:solidFill>
+                <a:schemeClr val="accent4">
+                  <a:lumMod val="60000"/>
+                  <a:lumOff val="40000"/>
+                </a:schemeClr>
+              </a:solidFill>
+              <a:ln>
+                <a:solidFill>
+                  <a:schemeClr val="tx1"/>
+                </a:solidFill>
+              </a:ln>
+              <a:effectLst>
+                <a:innerShdw blurRad="63500" dist="50800" dir="5400000">
+                  <a:prstClr val="black">
+                    <a:alpha val="50000"/>
+                  </a:prstClr>
+                </a:innerShdw>
+              </a:effectLst>
+            </p:spPr>
+            <p:style>
+              <a:lnRef idx="2">
+                <a:schemeClr val="accent1">
+                  <a:shade val="50000"/>
+                </a:schemeClr>
+              </a:lnRef>
+              <a:fillRef idx="1">
+                <a:schemeClr val="accent1"/>
+              </a:fillRef>
+              <a:effectRef idx="0">
+                <a:schemeClr val="accent1"/>
+              </a:effectRef>
+              <a:fontRef idx="minor">
+                <a:schemeClr val="lt1"/>
+              </a:fontRef>
+            </p:style>
+            <p:txBody>
+              <a:bodyPr rtlCol="0" anchor="ctr"/>
+              <a:lstStyle/>
+              <a:p>
+                <a:pPr algn="ctr"/>
+                <a:r>
+                  <a:rPr lang="en-US" dirty="0"/>
+                  <a:t>DNS</a:t>
+                </a:r>
+              </a:p>
+              <a:p>
+                <a:pPr algn="ctr"/>
+                <a:r>
+                  <a:rPr lang="en-US" dirty="0"/>
+                  <a:t>(AWS route53)</a:t>
+                </a:r>
+              </a:p>
+            </p:txBody>
+          </p:sp>
+          <p:cxnSp>
+            <p:nvCxnSpPr>
+              <p:cNvPr id="14" name="Straight Arrow Connector 13">
+                <a:extLst>
+                  <a:ext uri="{FF2B5EF4-FFF2-40B4-BE49-F238E27FC236}">
+                    <a16:creationId xmlns:a16="http://schemas.microsoft.com/office/drawing/2014/main" id="{31830326-FAB2-4129-8F39-1CAE7ED44A9F}"/>
+                  </a:ext>
+                </a:extLst>
+              </p:cNvPr>
+              <p:cNvCxnSpPr>
+                <a:cxnSpLocks/>
+                <a:stCxn id="9" idx="3"/>
+                <a:endCxn id="16" idx="1"/>
+              </p:cNvCxnSpPr>
+              <p:nvPr/>
+            </p:nvCxnSpPr>
+            <p:spPr>
+              <a:xfrm>
+                <a:off x="3977340" y="3320290"/>
+                <a:ext cx="395777" cy="6966"/>
+              </a:xfrm>
+              <a:prstGeom prst="straightConnector1">
+                <a:avLst/>
+              </a:prstGeom>
+              <a:ln w="28575">
+                <a:solidFill>
+                  <a:schemeClr val="accent3"/>
+                </a:solidFill>
+                <a:tailEnd type="triangle"/>
+              </a:ln>
+            </p:spPr>
+            <p:style>
+              <a:lnRef idx="1">
+                <a:schemeClr val="accent1"/>
+              </a:lnRef>
+              <a:fillRef idx="0">
+                <a:schemeClr val="accent1"/>
+              </a:fillRef>
+              <a:effectRef idx="0">
+                <a:schemeClr val="accent1"/>
+              </a:effectRef>
+              <a:fontRef idx="minor">
+                <a:schemeClr val="tx1"/>
+              </a:fontRef>
+            </p:style>
+          </p:cxnSp>
+          <p:sp>
+            <p:nvSpPr>
+              <p:cNvPr id="16" name="Rectangle 15">
+                <a:extLst>
+                  <a:ext uri="{FF2B5EF4-FFF2-40B4-BE49-F238E27FC236}">
+                    <a16:creationId xmlns:a16="http://schemas.microsoft.com/office/drawing/2014/main" id="{856A4B2A-615B-4C27-B534-3640346628ED}"/>
+                  </a:ext>
+                </a:extLst>
+              </p:cNvPr>
+              <p:cNvSpPr/>
+              <p:nvPr/>
+            </p:nvSpPr>
+            <p:spPr>
+              <a:xfrm>
+                <a:off x="4373117" y="2962429"/>
+                <a:ext cx="1353091" cy="729654"/>
+              </a:xfrm>
+              <a:prstGeom prst="rect">
+                <a:avLst/>
+              </a:prstGeom>
+              <a:solidFill>
+                <a:schemeClr val="accent4">
+                  <a:lumMod val="50000"/>
+                </a:schemeClr>
+              </a:solidFill>
+              <a:ln>
+                <a:solidFill>
+                  <a:schemeClr val="tx1"/>
+                </a:solidFill>
+              </a:ln>
+              <a:effectLst>
+                <a:innerShdw blurRad="63500" dist="50800" dir="5400000">
+                  <a:prstClr val="black">
+                    <a:alpha val="50000"/>
+                  </a:prstClr>
+                </a:innerShdw>
+              </a:effectLst>
+            </p:spPr>
+            <p:style>
+              <a:lnRef idx="2">
+                <a:schemeClr val="accent1">
+                  <a:shade val="50000"/>
+                </a:schemeClr>
+              </a:lnRef>
+              <a:fillRef idx="1">
+                <a:schemeClr val="accent1"/>
+              </a:fillRef>
+              <a:effectRef idx="0">
+                <a:schemeClr val="accent1"/>
+              </a:effectRef>
+              <a:fontRef idx="minor">
+                <a:schemeClr val="lt1"/>
+              </a:fontRef>
+            </p:style>
+            <p:txBody>
+              <a:bodyPr rtlCol="0" anchor="ctr"/>
+              <a:lstStyle/>
+              <a:p>
+                <a:pPr algn="ctr"/>
+                <a:r>
+                  <a:rPr lang="en-US" dirty="0"/>
+                  <a:t>Web Server</a:t>
+                </a:r>
+              </a:p>
+              <a:p>
+                <a:pPr algn="ctr"/>
+                <a:r>
+                  <a:rPr lang="en-US" dirty="0"/>
+                  <a:t>(AWS EC2)</a:t>
+                </a:r>
+              </a:p>
+            </p:txBody>
+          </p:sp>
+          <p:cxnSp>
+            <p:nvCxnSpPr>
+              <p:cNvPr id="21" name="Straight Arrow Connector 20">
+                <a:extLst>
+                  <a:ext uri="{FF2B5EF4-FFF2-40B4-BE49-F238E27FC236}">
+                    <a16:creationId xmlns:a16="http://schemas.microsoft.com/office/drawing/2014/main" id="{408C694A-22CA-416A-8746-403B0456A852}"/>
+                  </a:ext>
+                </a:extLst>
+              </p:cNvPr>
+              <p:cNvCxnSpPr>
+                <a:cxnSpLocks/>
+                <a:stCxn id="16" idx="3"/>
+                <a:endCxn id="22" idx="1"/>
+              </p:cNvCxnSpPr>
+              <p:nvPr/>
+            </p:nvCxnSpPr>
+            <p:spPr>
+              <a:xfrm flipV="1">
+                <a:off x="5726208" y="2666613"/>
+                <a:ext cx="958100" cy="660643"/>
+              </a:xfrm>
+              <a:prstGeom prst="straightConnector1">
+                <a:avLst/>
+              </a:prstGeom>
+              <a:ln w="28575">
+                <a:solidFill>
+                  <a:schemeClr val="accent3"/>
+                </a:solidFill>
+                <a:tailEnd type="triangle"/>
+              </a:ln>
+            </p:spPr>
+            <p:style>
+              <a:lnRef idx="1">
+                <a:schemeClr val="accent1"/>
+              </a:lnRef>
+              <a:fillRef idx="0">
+                <a:schemeClr val="accent1"/>
+              </a:fillRef>
+              <a:effectRef idx="0">
+                <a:schemeClr val="accent1"/>
+              </a:effectRef>
+              <a:fontRef idx="minor">
+                <a:schemeClr val="tx1"/>
+              </a:fontRef>
+            </p:style>
+          </p:cxnSp>
+          <p:sp>
+            <p:nvSpPr>
+              <p:cNvPr id="22" name="Rectangle 21">
+                <a:extLst>
+                  <a:ext uri="{FF2B5EF4-FFF2-40B4-BE49-F238E27FC236}">
+                    <a16:creationId xmlns:a16="http://schemas.microsoft.com/office/drawing/2014/main" id="{5F792741-851A-4D50-A142-5A46EA2598C7}"/>
+                  </a:ext>
+                </a:extLst>
+              </p:cNvPr>
+              <p:cNvSpPr/>
+              <p:nvPr/>
+            </p:nvSpPr>
+            <p:spPr>
+              <a:xfrm>
+                <a:off x="6684308" y="2343136"/>
+                <a:ext cx="1842111" cy="646954"/>
+              </a:xfrm>
+              <a:prstGeom prst="rect">
+                <a:avLst/>
+              </a:prstGeom>
+              <a:ln>
+                <a:solidFill>
+                  <a:schemeClr val="tx1"/>
+                </a:solidFill>
+              </a:ln>
+              <a:effectLst>
+                <a:innerShdw blurRad="63500" dist="50800" dir="5400000">
+                  <a:prstClr val="black">
+                    <a:alpha val="50000"/>
+                  </a:prstClr>
+                </a:innerShdw>
+              </a:effectLst>
+            </p:spPr>
+            <p:style>
+              <a:lnRef idx="2">
+                <a:schemeClr val="accent1">
+                  <a:shade val="50000"/>
+                </a:schemeClr>
+              </a:lnRef>
+              <a:fillRef idx="1">
+                <a:schemeClr val="accent1"/>
+              </a:fillRef>
+              <a:effectRef idx="0">
+                <a:schemeClr val="accent1"/>
+              </a:effectRef>
+              <a:fontRef idx="minor">
+                <a:schemeClr val="lt1"/>
+              </a:fontRef>
+            </p:style>
+            <p:txBody>
+              <a:bodyPr rtlCol="0" anchor="ctr"/>
+              <a:lstStyle/>
+              <a:p>
+                <a:pPr algn="ctr"/>
+                <a:r>
+                  <a:rPr lang="en-US" dirty="0"/>
+                  <a:t>Model Training Service</a:t>
+                </a:r>
+              </a:p>
+            </p:txBody>
+          </p:sp>
+          <p:cxnSp>
+            <p:nvCxnSpPr>
+              <p:cNvPr id="26" name="Straight Arrow Connector 25">
+                <a:extLst>
+                  <a:ext uri="{FF2B5EF4-FFF2-40B4-BE49-F238E27FC236}">
+                    <a16:creationId xmlns:a16="http://schemas.microsoft.com/office/drawing/2014/main" id="{F3E2987F-FEF3-40E6-9F29-467550C8F144}"/>
+                  </a:ext>
+                </a:extLst>
+              </p:cNvPr>
+              <p:cNvCxnSpPr>
+                <a:cxnSpLocks/>
+                <a:stCxn id="16" idx="3"/>
+                <a:endCxn id="27" idx="1"/>
+              </p:cNvCxnSpPr>
+              <p:nvPr/>
+            </p:nvCxnSpPr>
+            <p:spPr>
+              <a:xfrm>
+                <a:off x="5726208" y="3327256"/>
+                <a:ext cx="963121" cy="608990"/>
+              </a:xfrm>
+              <a:prstGeom prst="straightConnector1">
+                <a:avLst/>
+              </a:prstGeom>
+              <a:ln w="28575">
+                <a:solidFill>
+                  <a:schemeClr val="accent3"/>
+                </a:solidFill>
+                <a:tailEnd type="triangle"/>
+              </a:ln>
+            </p:spPr>
+            <p:style>
+              <a:lnRef idx="1">
+                <a:schemeClr val="accent1"/>
+              </a:lnRef>
+              <a:fillRef idx="0">
+                <a:schemeClr val="accent1"/>
+              </a:fillRef>
+              <a:effectRef idx="0">
+                <a:schemeClr val="accent1"/>
+              </a:effectRef>
+              <a:fontRef idx="minor">
+                <a:schemeClr val="tx1"/>
+              </a:fontRef>
+            </p:style>
+          </p:cxnSp>
+          <p:sp>
+            <p:nvSpPr>
+              <p:cNvPr id="27" name="Rectangle 26">
+                <a:extLst>
+                  <a:ext uri="{FF2B5EF4-FFF2-40B4-BE49-F238E27FC236}">
+                    <a16:creationId xmlns:a16="http://schemas.microsoft.com/office/drawing/2014/main" id="{85693808-014C-41E5-9055-701F75E98E44}"/>
+                  </a:ext>
+                </a:extLst>
+              </p:cNvPr>
+              <p:cNvSpPr/>
+              <p:nvPr/>
+            </p:nvSpPr>
+            <p:spPr>
+              <a:xfrm>
+                <a:off x="6689329" y="3612769"/>
+                <a:ext cx="1842112" cy="646954"/>
+              </a:xfrm>
+              <a:prstGeom prst="rect">
+                <a:avLst/>
+              </a:prstGeom>
+              <a:ln>
+                <a:solidFill>
+                  <a:schemeClr val="tx1"/>
+                </a:solidFill>
+              </a:ln>
+              <a:effectLst>
+                <a:innerShdw blurRad="63500" dist="50800" dir="5400000">
+                  <a:prstClr val="black">
+                    <a:alpha val="50000"/>
+                  </a:prstClr>
+                </a:innerShdw>
+              </a:effectLst>
+            </p:spPr>
+            <p:style>
+              <a:lnRef idx="2">
+                <a:schemeClr val="accent1">
+                  <a:shade val="50000"/>
+                </a:schemeClr>
+              </a:lnRef>
+              <a:fillRef idx="1">
+                <a:schemeClr val="accent1"/>
+              </a:fillRef>
+              <a:effectRef idx="0">
+                <a:schemeClr val="accent1"/>
+              </a:effectRef>
+              <a:fontRef idx="minor">
+                <a:schemeClr val="lt1"/>
+              </a:fontRef>
+            </p:style>
+            <p:txBody>
+              <a:bodyPr rtlCol="0" anchor="ctr"/>
+              <a:lstStyle/>
+              <a:p>
+                <a:pPr algn="ctr"/>
+                <a:r>
+                  <a:rPr lang="en-US" dirty="0"/>
+                  <a:t>Model Prediction Service</a:t>
+                </a:r>
+              </a:p>
+            </p:txBody>
+          </p:sp>
+          <p:cxnSp>
+            <p:nvCxnSpPr>
+              <p:cNvPr id="31" name="Straight Arrow Connector 30">
+                <a:extLst>
+                  <a:ext uri="{FF2B5EF4-FFF2-40B4-BE49-F238E27FC236}">
+                    <a16:creationId xmlns:a16="http://schemas.microsoft.com/office/drawing/2014/main" id="{411A3AAB-D39B-4748-95C9-30318685561D}"/>
+                  </a:ext>
+                </a:extLst>
+              </p:cNvPr>
+              <p:cNvCxnSpPr>
+                <a:cxnSpLocks/>
+                <a:stCxn id="32" idx="1"/>
+                <a:endCxn id="27" idx="2"/>
+              </p:cNvCxnSpPr>
+              <p:nvPr/>
+            </p:nvCxnSpPr>
+            <p:spPr>
+              <a:xfrm flipV="1">
+                <a:off x="7610385" y="4259723"/>
+                <a:ext cx="0" cy="342508"/>
+              </a:xfrm>
+              <a:prstGeom prst="straightConnector1">
+                <a:avLst/>
+              </a:prstGeom>
+              <a:ln w="28575">
+                <a:solidFill>
+                  <a:schemeClr val="accent3"/>
+                </a:solidFill>
+                <a:tailEnd type="triangle"/>
+              </a:ln>
+            </p:spPr>
+            <p:style>
+              <a:lnRef idx="1">
+                <a:schemeClr val="accent1"/>
+              </a:lnRef>
+              <a:fillRef idx="0">
+                <a:schemeClr val="accent1"/>
+              </a:fillRef>
+              <a:effectRef idx="0">
+                <a:schemeClr val="accent1"/>
+              </a:effectRef>
+              <a:fontRef idx="minor">
+                <a:schemeClr val="tx1"/>
+              </a:fontRef>
+            </p:style>
+          </p:cxnSp>
+          <p:sp>
+            <p:nvSpPr>
+              <p:cNvPr id="32" name="Cylinder 31">
+                <a:extLst>
+                  <a:ext uri="{FF2B5EF4-FFF2-40B4-BE49-F238E27FC236}">
+                    <a16:creationId xmlns:a16="http://schemas.microsoft.com/office/drawing/2014/main" id="{50CC1A1E-251E-4F75-BBA3-74AD5332086F}"/>
+                  </a:ext>
+                </a:extLst>
+              </p:cNvPr>
+              <p:cNvSpPr/>
+              <p:nvPr/>
+            </p:nvSpPr>
+            <p:spPr>
+              <a:xfrm>
+                <a:off x="6305717" y="4602231"/>
+                <a:ext cx="2609335" cy="808260"/>
+              </a:xfrm>
+              <a:prstGeom prst="can">
+                <a:avLst/>
+              </a:prstGeom>
+              <a:solidFill>
+                <a:schemeClr val="accent5">
+                  <a:lumMod val="50000"/>
+                </a:schemeClr>
+              </a:solidFill>
+              <a:ln>
+                <a:solidFill>
+                  <a:schemeClr val="tx1"/>
+                </a:solidFill>
+              </a:ln>
+              <a:effectLst>
+                <a:innerShdw blurRad="63500" dist="50800" dir="5400000">
+                  <a:prstClr val="black">
+                    <a:alpha val="50000"/>
+                  </a:prstClr>
+                </a:innerShdw>
+              </a:effectLst>
+            </p:spPr>
+            <p:style>
+              <a:lnRef idx="2">
+                <a:schemeClr val="accent1">
+                  <a:shade val="50000"/>
+                </a:schemeClr>
+              </a:lnRef>
+              <a:fillRef idx="1">
+                <a:schemeClr val="accent1"/>
+              </a:fillRef>
+              <a:effectRef idx="0">
+                <a:schemeClr val="accent1"/>
+              </a:effectRef>
+              <a:fontRef idx="minor">
+                <a:schemeClr val="lt1"/>
+              </a:fontRef>
+            </p:style>
+            <p:txBody>
+              <a:bodyPr rtlCol="0" anchor="ctr"/>
+              <a:lstStyle/>
+              <a:p>
+                <a:pPr algn="ctr"/>
+                <a:r>
+                  <a:rPr lang="en-US" dirty="0"/>
+                  <a:t>KerasClassifier Module</a:t>
+                </a:r>
+              </a:p>
+              <a:p>
+                <a:pPr algn="ctr"/>
+                <a:r>
+                  <a:rPr lang="en-US" dirty="0"/>
+                  <a:t>(AWS S3)</a:t>
+                </a:r>
+              </a:p>
+            </p:txBody>
+          </p:sp>
+          <p:cxnSp>
+            <p:nvCxnSpPr>
+              <p:cNvPr id="65" name="Straight Arrow Connector 64">
+                <a:extLst>
+                  <a:ext uri="{FF2B5EF4-FFF2-40B4-BE49-F238E27FC236}">
+                    <a16:creationId xmlns:a16="http://schemas.microsoft.com/office/drawing/2014/main" id="{54EE9AC4-A741-44D9-A2C5-DB26068292F6}"/>
+                  </a:ext>
+                </a:extLst>
+              </p:cNvPr>
+              <p:cNvCxnSpPr>
+                <a:cxnSpLocks/>
+                <a:stCxn id="75" idx="3"/>
+                <a:endCxn id="22" idx="0"/>
+              </p:cNvCxnSpPr>
+              <p:nvPr/>
+            </p:nvCxnSpPr>
+            <p:spPr>
+              <a:xfrm>
+                <a:off x="7605364" y="1953600"/>
+                <a:ext cx="0" cy="389536"/>
+              </a:xfrm>
+              <a:prstGeom prst="straightConnector1">
+                <a:avLst/>
+              </a:prstGeom>
+              <a:ln w="28575">
+                <a:solidFill>
+                  <a:schemeClr val="accent3"/>
+                </a:solidFill>
+                <a:tailEnd type="triangle"/>
+              </a:ln>
+            </p:spPr>
+            <p:style>
+              <a:lnRef idx="1">
+                <a:schemeClr val="accent1"/>
+              </a:lnRef>
+              <a:fillRef idx="0">
+                <a:schemeClr val="accent1"/>
+              </a:fillRef>
+              <a:effectRef idx="0">
+                <a:schemeClr val="accent1"/>
+              </a:effectRef>
+              <a:fontRef idx="minor">
+                <a:schemeClr val="tx1"/>
+              </a:fontRef>
+            </p:style>
+          </p:cxnSp>
+          <p:sp>
+            <p:nvSpPr>
+              <p:cNvPr id="75" name="Cylinder 74">
+                <a:extLst>
+                  <a:ext uri="{FF2B5EF4-FFF2-40B4-BE49-F238E27FC236}">
+                    <a16:creationId xmlns:a16="http://schemas.microsoft.com/office/drawing/2014/main" id="{B8BD0C83-B9A0-4779-9A38-2CEC4D574977}"/>
+                  </a:ext>
+                </a:extLst>
+              </p:cNvPr>
+              <p:cNvSpPr/>
+              <p:nvPr/>
+            </p:nvSpPr>
+            <p:spPr>
+              <a:xfrm>
+                <a:off x="6300696" y="1116151"/>
+                <a:ext cx="2609335" cy="837449"/>
+              </a:xfrm>
+              <a:prstGeom prst="can">
+                <a:avLst/>
+              </a:prstGeom>
+              <a:solidFill>
+                <a:schemeClr val="accent5">
+                  <a:lumMod val="50000"/>
+                </a:schemeClr>
+              </a:solidFill>
+              <a:ln>
+                <a:solidFill>
+                  <a:schemeClr val="tx1"/>
+                </a:solidFill>
+              </a:ln>
+              <a:effectLst>
+                <a:innerShdw blurRad="63500" dist="50800" dir="5400000">
+                  <a:prstClr val="black">
+                    <a:alpha val="50000"/>
+                  </a:prstClr>
+                </a:innerShdw>
+              </a:effectLst>
+            </p:spPr>
+            <p:style>
+              <a:lnRef idx="2">
+                <a:schemeClr val="accent1">
+                  <a:shade val="50000"/>
+                </a:schemeClr>
+              </a:lnRef>
+              <a:fillRef idx="1">
+                <a:schemeClr val="accent1"/>
+              </a:fillRef>
+              <a:effectRef idx="0">
+                <a:schemeClr val="accent1"/>
+              </a:effectRef>
+              <a:fontRef idx="minor">
+                <a:schemeClr val="lt1"/>
+              </a:fontRef>
+            </p:style>
+            <p:txBody>
+              <a:bodyPr rtlCol="0" anchor="ctr"/>
+              <a:lstStyle/>
+              <a:p>
+                <a:pPr algn="ctr"/>
+                <a:r>
+                  <a:rPr lang="en-US" dirty="0"/>
+                  <a:t>Serialized Model Object (AWS S3)</a:t>
+                </a:r>
+              </a:p>
+            </p:txBody>
+          </p:sp>
+          <p:sp>
+            <p:nvSpPr>
+              <p:cNvPr id="78" name="TextBox 77">
+                <a:extLst>
+                  <a:ext uri="{FF2B5EF4-FFF2-40B4-BE49-F238E27FC236}">
+                    <a16:creationId xmlns:a16="http://schemas.microsoft.com/office/drawing/2014/main" id="{E1E3310B-4AF5-4C8B-9A32-622319C48F47}"/>
+                  </a:ext>
+                </a:extLst>
+              </p:cNvPr>
+              <p:cNvSpPr txBox="1"/>
+              <p:nvPr/>
+            </p:nvSpPr>
+            <p:spPr>
+              <a:xfrm>
+                <a:off x="840047" y="996130"/>
+                <a:ext cx="3369609" cy="345159"/>
+              </a:xfrm>
+              <a:prstGeom prst="rect">
+                <a:avLst/>
+              </a:prstGeom>
+              <a:noFill/>
+            </p:spPr>
+            <p:txBody>
+              <a:bodyPr wrap="square" rtlCol="0">
+                <a:spAutoFit/>
+              </a:bodyPr>
+              <a:lstStyle/>
+              <a:p>
+                <a:r>
+                  <a:rPr lang="en-US" b="1" dirty="0">
+                    <a:latin typeface="Times New Roman" panose="02020603050405020304" pitchFamily="18" charset="0"/>
+                    <a:cs typeface="Times New Roman" panose="02020603050405020304" pitchFamily="18" charset="0"/>
+                  </a:rPr>
+                  <a:t>The System Structure of iMedBot</a:t>
+                </a:r>
+                <a:endParaRPr lang="en-US" b="1" dirty="0"/>
+              </a:p>
+            </p:txBody>
+          </p:sp>
+        </p:grpSp>
         <p:cxnSp>
           <p:nvCxnSpPr>
-            <p:cNvPr id="7" name="Straight Arrow Connector 6">
+            <p:cNvPr id="3" name="Straight Connector 2">
               <a:extLst>
                 <a:ext uri="{FF2B5EF4-FFF2-40B4-BE49-F238E27FC236}">
-                  <a16:creationId xmlns:a16="http://schemas.microsoft.com/office/drawing/2014/main" id="{0ECCB4E3-62B7-4416-8780-610CC5C028C5}"/>
+                  <a16:creationId xmlns:a16="http://schemas.microsoft.com/office/drawing/2014/main" id="{B58EB0B4-82C9-454D-9D20-F464EDF52D92}"/>
                 </a:ext>
               </a:extLst>
             </p:cNvPr>
             <p:cNvCxnSpPr>
               <a:cxnSpLocks/>
-              <a:stCxn id="5" idx="3"/>
-              <a:endCxn id="9" idx="1"/>
             </p:cNvCxnSpPr>
             <p:nvPr/>
           </p:nvCxnSpPr>
           <p:spPr>
-            <a:xfrm flipV="1">
-              <a:off x="2241831" y="3320290"/>
-              <a:ext cx="332161" cy="18"/>
+            <a:xfrm>
+              <a:off x="4154749" y="1464816"/>
+              <a:ext cx="0" cy="4199137"/>
             </a:xfrm>
-            <a:prstGeom prst="straightConnector1">
+            <a:prstGeom prst="line">
               <a:avLst/>
             </a:prstGeom>
-            <a:ln w="28575">
+            <a:ln>
               <a:solidFill>
-                <a:schemeClr val="accent3"/>
+                <a:schemeClr val="bg1"/>
               </a:solidFill>
-              <a:tailEnd type="triangle"/>
             </a:ln>
+            <a:effectLst>
+              <a:glow rad="63500">
+                <a:schemeClr val="accent3">
+                  <a:satMod val="175000"/>
+                  <a:alpha val="40000"/>
+                </a:schemeClr>
+              </a:glow>
+            </a:effectLst>
           </p:spPr>
           <p:style>
             <a:lnRef idx="1">
-              <a:schemeClr val="accent1"/>
+              <a:schemeClr val="accent2"/>
             </a:lnRef>
             <a:fillRef idx="0">
-              <a:schemeClr val="accent1"/>
+              <a:schemeClr val="accent2"/>
             </a:fillRef>
             <a:effectRef idx="0">
-              <a:schemeClr val="accent1"/>
+              <a:schemeClr val="accent2"/>
             </a:effectRef>
             <a:fontRef idx="minor">
               <a:schemeClr val="tx1"/>
@@ -6286,767 +7388,10 @@
         </p:cxnSp>
         <p:sp>
           <p:nvSpPr>
-            <p:cNvPr id="9" name="Rectangle 8">
+            <p:cNvPr id="8" name="TextBox 7">
               <a:extLst>
                 <a:ext uri="{FF2B5EF4-FFF2-40B4-BE49-F238E27FC236}">
-                  <a16:creationId xmlns:a16="http://schemas.microsoft.com/office/drawing/2014/main" id="{7313618B-AD65-407A-B001-BB64B6CF12E3}"/>
-                </a:ext>
-              </a:extLst>
-            </p:cNvPr>
-            <p:cNvSpPr/>
-            <p:nvPr/>
-          </p:nvSpPr>
-          <p:spPr>
-            <a:xfrm>
-              <a:off x="2573992" y="2955463"/>
-              <a:ext cx="1403348" cy="729654"/>
-            </a:xfrm>
-            <a:prstGeom prst="rect">
-              <a:avLst/>
-            </a:prstGeom>
-            <a:solidFill>
-              <a:schemeClr val="accent6">
-                <a:lumMod val="50000"/>
-              </a:schemeClr>
-            </a:solidFill>
-            <a:ln>
-              <a:solidFill>
-                <a:schemeClr val="tx1"/>
-              </a:solidFill>
-            </a:ln>
-            <a:effectLst>
-              <a:innerShdw blurRad="63500" dist="50800" dir="5400000">
-                <a:prstClr val="black">
-                  <a:alpha val="50000"/>
-                </a:prstClr>
-              </a:innerShdw>
-            </a:effectLst>
-          </p:spPr>
-          <p:style>
-            <a:lnRef idx="2">
-              <a:schemeClr val="accent1">
-                <a:shade val="50000"/>
-              </a:schemeClr>
-            </a:lnRef>
-            <a:fillRef idx="1">
-              <a:schemeClr val="accent1"/>
-            </a:fillRef>
-            <a:effectRef idx="0">
-              <a:schemeClr val="accent1"/>
-            </a:effectRef>
-            <a:fontRef idx="minor">
-              <a:schemeClr val="lt1"/>
-            </a:fontRef>
-          </p:style>
-          <p:txBody>
-            <a:bodyPr rtlCol="0" anchor="ctr"/>
-            <a:lstStyle/>
-            <a:p>
-              <a:pPr algn="ctr"/>
-              <a:r>
-                <a:rPr lang="en-US" dirty="0"/>
-                <a:t>Load Balancer</a:t>
-              </a:r>
-            </a:p>
-            <a:p>
-              <a:pPr algn="ctr"/>
-              <a:r>
-                <a:rPr lang="en-US" dirty="0"/>
-                <a:t>(AWS ELB)</a:t>
-              </a:r>
-            </a:p>
-          </p:txBody>
-        </p:sp>
-        <p:cxnSp>
-          <p:nvCxnSpPr>
-            <p:cNvPr id="11" name="Straight Arrow Connector 10">
-              <a:extLst>
-                <a:ext uri="{FF2B5EF4-FFF2-40B4-BE49-F238E27FC236}">
-                  <a16:creationId xmlns:a16="http://schemas.microsoft.com/office/drawing/2014/main" id="{D1E34953-6D74-438E-B678-857C921FE545}"/>
-                </a:ext>
-              </a:extLst>
-            </p:cNvPr>
-            <p:cNvCxnSpPr>
-              <a:cxnSpLocks/>
-              <a:stCxn id="5" idx="0"/>
-              <a:endCxn id="12" idx="2"/>
-            </p:cNvCxnSpPr>
-            <p:nvPr/>
-          </p:nvCxnSpPr>
-          <p:spPr>
-            <a:xfrm flipV="1">
-              <a:off x="1803681" y="2665317"/>
-              <a:ext cx="0" cy="420041"/>
-            </a:xfrm>
-            <a:prstGeom prst="straightConnector1">
-              <a:avLst/>
-            </a:prstGeom>
-            <a:ln w="28575">
-              <a:solidFill>
-                <a:schemeClr val="accent3"/>
-              </a:solidFill>
-              <a:tailEnd type="triangle"/>
-            </a:ln>
-          </p:spPr>
-          <p:style>
-            <a:lnRef idx="1">
-              <a:schemeClr val="accent1"/>
-            </a:lnRef>
-            <a:fillRef idx="0">
-              <a:schemeClr val="accent1"/>
-            </a:fillRef>
-            <a:effectRef idx="0">
-              <a:schemeClr val="accent1"/>
-            </a:effectRef>
-            <a:fontRef idx="minor">
-              <a:schemeClr val="tx1"/>
-            </a:fontRef>
-          </p:style>
-        </p:cxnSp>
-        <p:sp>
-          <p:nvSpPr>
-            <p:cNvPr id="12" name="Rectangle 11">
-              <a:extLst>
-                <a:ext uri="{FF2B5EF4-FFF2-40B4-BE49-F238E27FC236}">
-                  <a16:creationId xmlns:a16="http://schemas.microsoft.com/office/drawing/2014/main" id="{8CE8E64C-DFA3-4422-8658-A39F2E06FB6F}"/>
-                </a:ext>
-              </a:extLst>
-            </p:cNvPr>
-            <p:cNvSpPr/>
-            <p:nvPr/>
-          </p:nvSpPr>
-          <p:spPr>
-            <a:xfrm>
-              <a:off x="1005281" y="1935663"/>
-              <a:ext cx="1596800" cy="729654"/>
-            </a:xfrm>
-            <a:prstGeom prst="rect">
-              <a:avLst/>
-            </a:prstGeom>
-            <a:solidFill>
-              <a:schemeClr val="accent4">
-                <a:lumMod val="60000"/>
-                <a:lumOff val="40000"/>
-              </a:schemeClr>
-            </a:solidFill>
-            <a:ln>
-              <a:solidFill>
-                <a:schemeClr val="tx1"/>
-              </a:solidFill>
-            </a:ln>
-            <a:effectLst>
-              <a:innerShdw blurRad="63500" dist="50800" dir="5400000">
-                <a:prstClr val="black">
-                  <a:alpha val="50000"/>
-                </a:prstClr>
-              </a:innerShdw>
-            </a:effectLst>
-          </p:spPr>
-          <p:style>
-            <a:lnRef idx="2">
-              <a:schemeClr val="accent1">
-                <a:shade val="50000"/>
-              </a:schemeClr>
-            </a:lnRef>
-            <a:fillRef idx="1">
-              <a:schemeClr val="accent1"/>
-            </a:fillRef>
-            <a:effectRef idx="0">
-              <a:schemeClr val="accent1"/>
-            </a:effectRef>
-            <a:fontRef idx="minor">
-              <a:schemeClr val="lt1"/>
-            </a:fontRef>
-          </p:style>
-          <p:txBody>
-            <a:bodyPr rtlCol="0" anchor="ctr"/>
-            <a:lstStyle/>
-            <a:p>
-              <a:pPr algn="ctr"/>
-              <a:r>
-                <a:rPr lang="en-US" dirty="0"/>
-                <a:t>DNS</a:t>
-              </a:r>
-            </a:p>
-            <a:p>
-              <a:pPr algn="ctr"/>
-              <a:r>
-                <a:rPr lang="en-US" dirty="0"/>
-                <a:t>(AWS route53)</a:t>
-              </a:r>
-            </a:p>
-          </p:txBody>
-        </p:sp>
-        <p:cxnSp>
-          <p:nvCxnSpPr>
-            <p:cNvPr id="14" name="Straight Arrow Connector 13">
-              <a:extLst>
-                <a:ext uri="{FF2B5EF4-FFF2-40B4-BE49-F238E27FC236}">
-                  <a16:creationId xmlns:a16="http://schemas.microsoft.com/office/drawing/2014/main" id="{31830326-FAB2-4129-8F39-1CAE7ED44A9F}"/>
-                </a:ext>
-              </a:extLst>
-            </p:cNvPr>
-            <p:cNvCxnSpPr>
-              <a:cxnSpLocks/>
-              <a:stCxn id="9" idx="3"/>
-              <a:endCxn id="16" idx="1"/>
-            </p:cNvCxnSpPr>
-            <p:nvPr/>
-          </p:nvCxnSpPr>
-          <p:spPr>
-            <a:xfrm>
-              <a:off x="3977340" y="3320290"/>
-              <a:ext cx="395777" cy="6966"/>
-            </a:xfrm>
-            <a:prstGeom prst="straightConnector1">
-              <a:avLst/>
-            </a:prstGeom>
-            <a:ln w="28575">
-              <a:solidFill>
-                <a:schemeClr val="accent3"/>
-              </a:solidFill>
-              <a:tailEnd type="triangle"/>
-            </a:ln>
-          </p:spPr>
-          <p:style>
-            <a:lnRef idx="1">
-              <a:schemeClr val="accent1"/>
-            </a:lnRef>
-            <a:fillRef idx="0">
-              <a:schemeClr val="accent1"/>
-            </a:fillRef>
-            <a:effectRef idx="0">
-              <a:schemeClr val="accent1"/>
-            </a:effectRef>
-            <a:fontRef idx="minor">
-              <a:schemeClr val="tx1"/>
-            </a:fontRef>
-          </p:style>
-        </p:cxnSp>
-        <p:sp>
-          <p:nvSpPr>
-            <p:cNvPr id="16" name="Rectangle 15">
-              <a:extLst>
-                <a:ext uri="{FF2B5EF4-FFF2-40B4-BE49-F238E27FC236}">
-                  <a16:creationId xmlns:a16="http://schemas.microsoft.com/office/drawing/2014/main" id="{856A4B2A-615B-4C27-B534-3640346628ED}"/>
-                </a:ext>
-              </a:extLst>
-            </p:cNvPr>
-            <p:cNvSpPr/>
-            <p:nvPr/>
-          </p:nvSpPr>
-          <p:spPr>
-            <a:xfrm>
-              <a:off x="4373117" y="2962429"/>
-              <a:ext cx="1353091" cy="729654"/>
-            </a:xfrm>
-            <a:prstGeom prst="rect">
-              <a:avLst/>
-            </a:prstGeom>
-            <a:solidFill>
-              <a:schemeClr val="accent4">
-                <a:lumMod val="50000"/>
-              </a:schemeClr>
-            </a:solidFill>
-            <a:ln>
-              <a:solidFill>
-                <a:schemeClr val="tx1"/>
-              </a:solidFill>
-            </a:ln>
-            <a:effectLst>
-              <a:innerShdw blurRad="63500" dist="50800" dir="5400000">
-                <a:prstClr val="black">
-                  <a:alpha val="50000"/>
-                </a:prstClr>
-              </a:innerShdw>
-            </a:effectLst>
-          </p:spPr>
-          <p:style>
-            <a:lnRef idx="2">
-              <a:schemeClr val="accent1">
-                <a:shade val="50000"/>
-              </a:schemeClr>
-            </a:lnRef>
-            <a:fillRef idx="1">
-              <a:schemeClr val="accent1"/>
-            </a:fillRef>
-            <a:effectRef idx="0">
-              <a:schemeClr val="accent1"/>
-            </a:effectRef>
-            <a:fontRef idx="minor">
-              <a:schemeClr val="lt1"/>
-            </a:fontRef>
-          </p:style>
-          <p:txBody>
-            <a:bodyPr rtlCol="0" anchor="ctr"/>
-            <a:lstStyle/>
-            <a:p>
-              <a:pPr algn="ctr"/>
-              <a:r>
-                <a:rPr lang="en-US" dirty="0"/>
-                <a:t>Web Server</a:t>
-              </a:r>
-            </a:p>
-            <a:p>
-              <a:pPr algn="ctr"/>
-              <a:r>
-                <a:rPr lang="en-US" dirty="0"/>
-                <a:t>(AWS EC2)</a:t>
-              </a:r>
-            </a:p>
-          </p:txBody>
-        </p:sp>
-        <p:cxnSp>
-          <p:nvCxnSpPr>
-            <p:cNvPr id="21" name="Straight Arrow Connector 20">
-              <a:extLst>
-                <a:ext uri="{FF2B5EF4-FFF2-40B4-BE49-F238E27FC236}">
-                  <a16:creationId xmlns:a16="http://schemas.microsoft.com/office/drawing/2014/main" id="{408C694A-22CA-416A-8746-403B0456A852}"/>
-                </a:ext>
-              </a:extLst>
-            </p:cNvPr>
-            <p:cNvCxnSpPr>
-              <a:cxnSpLocks/>
-              <a:stCxn id="16" idx="3"/>
-              <a:endCxn id="22" idx="1"/>
-            </p:cNvCxnSpPr>
-            <p:nvPr/>
-          </p:nvCxnSpPr>
-          <p:spPr>
-            <a:xfrm flipV="1">
-              <a:off x="5726208" y="2666613"/>
-              <a:ext cx="958100" cy="660643"/>
-            </a:xfrm>
-            <a:prstGeom prst="straightConnector1">
-              <a:avLst/>
-            </a:prstGeom>
-            <a:ln w="28575">
-              <a:solidFill>
-                <a:schemeClr val="accent3"/>
-              </a:solidFill>
-              <a:tailEnd type="triangle"/>
-            </a:ln>
-          </p:spPr>
-          <p:style>
-            <a:lnRef idx="1">
-              <a:schemeClr val="accent1"/>
-            </a:lnRef>
-            <a:fillRef idx="0">
-              <a:schemeClr val="accent1"/>
-            </a:fillRef>
-            <a:effectRef idx="0">
-              <a:schemeClr val="accent1"/>
-            </a:effectRef>
-            <a:fontRef idx="minor">
-              <a:schemeClr val="tx1"/>
-            </a:fontRef>
-          </p:style>
-        </p:cxnSp>
-        <p:sp>
-          <p:nvSpPr>
-            <p:cNvPr id="22" name="Rectangle 21">
-              <a:extLst>
-                <a:ext uri="{FF2B5EF4-FFF2-40B4-BE49-F238E27FC236}">
-                  <a16:creationId xmlns:a16="http://schemas.microsoft.com/office/drawing/2014/main" id="{5F792741-851A-4D50-A142-5A46EA2598C7}"/>
-                </a:ext>
-              </a:extLst>
-            </p:cNvPr>
-            <p:cNvSpPr/>
-            <p:nvPr/>
-          </p:nvSpPr>
-          <p:spPr>
-            <a:xfrm>
-              <a:off x="6684308" y="2343136"/>
-              <a:ext cx="1842111" cy="646954"/>
-            </a:xfrm>
-            <a:prstGeom prst="rect">
-              <a:avLst/>
-            </a:prstGeom>
-            <a:ln>
-              <a:solidFill>
-                <a:schemeClr val="tx1"/>
-              </a:solidFill>
-            </a:ln>
-            <a:effectLst>
-              <a:innerShdw blurRad="63500" dist="50800" dir="5400000">
-                <a:prstClr val="black">
-                  <a:alpha val="50000"/>
-                </a:prstClr>
-              </a:innerShdw>
-            </a:effectLst>
-          </p:spPr>
-          <p:style>
-            <a:lnRef idx="2">
-              <a:schemeClr val="accent1">
-                <a:shade val="50000"/>
-              </a:schemeClr>
-            </a:lnRef>
-            <a:fillRef idx="1">
-              <a:schemeClr val="accent1"/>
-            </a:fillRef>
-            <a:effectRef idx="0">
-              <a:schemeClr val="accent1"/>
-            </a:effectRef>
-            <a:fontRef idx="minor">
-              <a:schemeClr val="lt1"/>
-            </a:fontRef>
-          </p:style>
-          <p:txBody>
-            <a:bodyPr rtlCol="0" anchor="ctr"/>
-            <a:lstStyle/>
-            <a:p>
-              <a:pPr algn="ctr"/>
-              <a:r>
-                <a:rPr lang="en-US" dirty="0"/>
-                <a:t>Model Training Service</a:t>
-              </a:r>
-            </a:p>
-          </p:txBody>
-        </p:sp>
-        <p:cxnSp>
-          <p:nvCxnSpPr>
-            <p:cNvPr id="26" name="Straight Arrow Connector 25">
-              <a:extLst>
-                <a:ext uri="{FF2B5EF4-FFF2-40B4-BE49-F238E27FC236}">
-                  <a16:creationId xmlns:a16="http://schemas.microsoft.com/office/drawing/2014/main" id="{F3E2987F-FEF3-40E6-9F29-467550C8F144}"/>
-                </a:ext>
-              </a:extLst>
-            </p:cNvPr>
-            <p:cNvCxnSpPr>
-              <a:cxnSpLocks/>
-              <a:stCxn id="16" idx="3"/>
-              <a:endCxn id="27" idx="1"/>
-            </p:cNvCxnSpPr>
-            <p:nvPr/>
-          </p:nvCxnSpPr>
-          <p:spPr>
-            <a:xfrm>
-              <a:off x="5726208" y="3327256"/>
-              <a:ext cx="963121" cy="608990"/>
-            </a:xfrm>
-            <a:prstGeom prst="straightConnector1">
-              <a:avLst/>
-            </a:prstGeom>
-            <a:ln w="28575">
-              <a:solidFill>
-                <a:schemeClr val="accent3"/>
-              </a:solidFill>
-              <a:tailEnd type="triangle"/>
-            </a:ln>
-          </p:spPr>
-          <p:style>
-            <a:lnRef idx="1">
-              <a:schemeClr val="accent1"/>
-            </a:lnRef>
-            <a:fillRef idx="0">
-              <a:schemeClr val="accent1"/>
-            </a:fillRef>
-            <a:effectRef idx="0">
-              <a:schemeClr val="accent1"/>
-            </a:effectRef>
-            <a:fontRef idx="minor">
-              <a:schemeClr val="tx1"/>
-            </a:fontRef>
-          </p:style>
-        </p:cxnSp>
-        <p:sp>
-          <p:nvSpPr>
-            <p:cNvPr id="27" name="Rectangle 26">
-              <a:extLst>
-                <a:ext uri="{FF2B5EF4-FFF2-40B4-BE49-F238E27FC236}">
-                  <a16:creationId xmlns:a16="http://schemas.microsoft.com/office/drawing/2014/main" id="{85693808-014C-41E5-9055-701F75E98E44}"/>
-                </a:ext>
-              </a:extLst>
-            </p:cNvPr>
-            <p:cNvSpPr/>
-            <p:nvPr/>
-          </p:nvSpPr>
-          <p:spPr>
-            <a:xfrm>
-              <a:off x="6689329" y="3612769"/>
-              <a:ext cx="1842112" cy="646954"/>
-            </a:xfrm>
-            <a:prstGeom prst="rect">
-              <a:avLst/>
-            </a:prstGeom>
-            <a:ln>
-              <a:solidFill>
-                <a:schemeClr val="tx1"/>
-              </a:solidFill>
-            </a:ln>
-            <a:effectLst>
-              <a:innerShdw blurRad="63500" dist="50800" dir="5400000">
-                <a:prstClr val="black">
-                  <a:alpha val="50000"/>
-                </a:prstClr>
-              </a:innerShdw>
-            </a:effectLst>
-          </p:spPr>
-          <p:style>
-            <a:lnRef idx="2">
-              <a:schemeClr val="accent1">
-                <a:shade val="50000"/>
-              </a:schemeClr>
-            </a:lnRef>
-            <a:fillRef idx="1">
-              <a:schemeClr val="accent1"/>
-            </a:fillRef>
-            <a:effectRef idx="0">
-              <a:schemeClr val="accent1"/>
-            </a:effectRef>
-            <a:fontRef idx="minor">
-              <a:schemeClr val="lt1"/>
-            </a:fontRef>
-          </p:style>
-          <p:txBody>
-            <a:bodyPr rtlCol="0" anchor="ctr"/>
-            <a:lstStyle/>
-            <a:p>
-              <a:pPr algn="ctr"/>
-              <a:r>
-                <a:rPr lang="en-US" dirty="0"/>
-                <a:t>Model Prediction Service</a:t>
-              </a:r>
-            </a:p>
-          </p:txBody>
-        </p:sp>
-        <p:cxnSp>
-          <p:nvCxnSpPr>
-            <p:cNvPr id="31" name="Straight Arrow Connector 30">
-              <a:extLst>
-                <a:ext uri="{FF2B5EF4-FFF2-40B4-BE49-F238E27FC236}">
-                  <a16:creationId xmlns:a16="http://schemas.microsoft.com/office/drawing/2014/main" id="{411A3AAB-D39B-4748-95C9-30318685561D}"/>
-                </a:ext>
-              </a:extLst>
-            </p:cNvPr>
-            <p:cNvCxnSpPr>
-              <a:cxnSpLocks/>
-              <a:stCxn id="32" idx="1"/>
-              <a:endCxn id="27" idx="2"/>
-            </p:cNvCxnSpPr>
-            <p:nvPr/>
-          </p:nvCxnSpPr>
-          <p:spPr>
-            <a:xfrm flipV="1">
-              <a:off x="7610385" y="4259723"/>
-              <a:ext cx="0" cy="342508"/>
-            </a:xfrm>
-            <a:prstGeom prst="straightConnector1">
-              <a:avLst/>
-            </a:prstGeom>
-            <a:ln w="28575">
-              <a:solidFill>
-                <a:schemeClr val="accent3"/>
-              </a:solidFill>
-              <a:tailEnd type="triangle"/>
-            </a:ln>
-          </p:spPr>
-          <p:style>
-            <a:lnRef idx="1">
-              <a:schemeClr val="accent1"/>
-            </a:lnRef>
-            <a:fillRef idx="0">
-              <a:schemeClr val="accent1"/>
-            </a:fillRef>
-            <a:effectRef idx="0">
-              <a:schemeClr val="accent1"/>
-            </a:effectRef>
-            <a:fontRef idx="minor">
-              <a:schemeClr val="tx1"/>
-            </a:fontRef>
-          </p:style>
-        </p:cxnSp>
-        <p:sp>
-          <p:nvSpPr>
-            <p:cNvPr id="32" name="Cylinder 31">
-              <a:extLst>
-                <a:ext uri="{FF2B5EF4-FFF2-40B4-BE49-F238E27FC236}">
-                  <a16:creationId xmlns:a16="http://schemas.microsoft.com/office/drawing/2014/main" id="{50CC1A1E-251E-4F75-BBA3-74AD5332086F}"/>
-                </a:ext>
-              </a:extLst>
-            </p:cNvPr>
-            <p:cNvSpPr/>
-            <p:nvPr/>
-          </p:nvSpPr>
-          <p:spPr>
-            <a:xfrm>
-              <a:off x="6305717" y="4602231"/>
-              <a:ext cx="2609335" cy="808260"/>
-            </a:xfrm>
-            <a:prstGeom prst="can">
-              <a:avLst/>
-            </a:prstGeom>
-            <a:solidFill>
-              <a:schemeClr val="accent5">
-                <a:lumMod val="50000"/>
-              </a:schemeClr>
-            </a:solidFill>
-            <a:ln>
-              <a:solidFill>
-                <a:schemeClr val="tx1"/>
-              </a:solidFill>
-            </a:ln>
-            <a:effectLst>
-              <a:innerShdw blurRad="63500" dist="50800" dir="5400000">
-                <a:prstClr val="black">
-                  <a:alpha val="50000"/>
-                </a:prstClr>
-              </a:innerShdw>
-            </a:effectLst>
-          </p:spPr>
-          <p:style>
-            <a:lnRef idx="2">
-              <a:schemeClr val="accent1">
-                <a:shade val="50000"/>
-              </a:schemeClr>
-            </a:lnRef>
-            <a:fillRef idx="1">
-              <a:schemeClr val="accent1"/>
-            </a:fillRef>
-            <a:effectRef idx="0">
-              <a:schemeClr val="accent1"/>
-            </a:effectRef>
-            <a:fontRef idx="minor">
-              <a:schemeClr val="lt1"/>
-            </a:fontRef>
-          </p:style>
-          <p:txBody>
-            <a:bodyPr rtlCol="0" anchor="ctr"/>
-            <a:lstStyle/>
-            <a:p>
-              <a:pPr algn="ctr"/>
-              <a:r>
-                <a:rPr lang="en-US" dirty="0"/>
-                <a:t>KerasClassifier Module</a:t>
-              </a:r>
-            </a:p>
-            <a:p>
-              <a:pPr algn="ctr"/>
-              <a:r>
-                <a:rPr lang="en-US" dirty="0"/>
-                <a:t>(AWS S3)</a:t>
-              </a:r>
-            </a:p>
-          </p:txBody>
-        </p:sp>
-        <p:cxnSp>
-          <p:nvCxnSpPr>
-            <p:cNvPr id="65" name="Straight Arrow Connector 64">
-              <a:extLst>
-                <a:ext uri="{FF2B5EF4-FFF2-40B4-BE49-F238E27FC236}">
-                  <a16:creationId xmlns:a16="http://schemas.microsoft.com/office/drawing/2014/main" id="{54EE9AC4-A741-44D9-A2C5-DB26068292F6}"/>
-                </a:ext>
-              </a:extLst>
-            </p:cNvPr>
-            <p:cNvCxnSpPr>
-              <a:cxnSpLocks/>
-              <a:stCxn id="75" idx="3"/>
-              <a:endCxn id="22" idx="0"/>
-            </p:cNvCxnSpPr>
-            <p:nvPr/>
-          </p:nvCxnSpPr>
-          <p:spPr>
-            <a:xfrm>
-              <a:off x="7605364" y="1953600"/>
-              <a:ext cx="0" cy="389536"/>
-            </a:xfrm>
-            <a:prstGeom prst="straightConnector1">
-              <a:avLst/>
-            </a:prstGeom>
-            <a:ln w="28575">
-              <a:solidFill>
-                <a:schemeClr val="accent3"/>
-              </a:solidFill>
-              <a:tailEnd type="triangle"/>
-            </a:ln>
-          </p:spPr>
-          <p:style>
-            <a:lnRef idx="1">
-              <a:schemeClr val="accent1"/>
-            </a:lnRef>
-            <a:fillRef idx="0">
-              <a:schemeClr val="accent1"/>
-            </a:fillRef>
-            <a:effectRef idx="0">
-              <a:schemeClr val="accent1"/>
-            </a:effectRef>
-            <a:fontRef idx="minor">
-              <a:schemeClr val="tx1"/>
-            </a:fontRef>
-          </p:style>
-        </p:cxnSp>
-        <p:sp>
-          <p:nvSpPr>
-            <p:cNvPr id="75" name="Cylinder 74">
-              <a:extLst>
-                <a:ext uri="{FF2B5EF4-FFF2-40B4-BE49-F238E27FC236}">
-                  <a16:creationId xmlns:a16="http://schemas.microsoft.com/office/drawing/2014/main" id="{B8BD0C83-B9A0-4779-9A38-2CEC4D574977}"/>
-                </a:ext>
-              </a:extLst>
-            </p:cNvPr>
-            <p:cNvSpPr/>
-            <p:nvPr/>
-          </p:nvSpPr>
-          <p:spPr>
-            <a:xfrm>
-              <a:off x="6300696" y="1116151"/>
-              <a:ext cx="2609335" cy="837449"/>
-            </a:xfrm>
-            <a:prstGeom prst="can">
-              <a:avLst/>
-            </a:prstGeom>
-            <a:solidFill>
-              <a:schemeClr val="accent5">
-                <a:lumMod val="50000"/>
-              </a:schemeClr>
-            </a:solidFill>
-            <a:ln>
-              <a:solidFill>
-                <a:schemeClr val="tx1"/>
-              </a:solidFill>
-            </a:ln>
-            <a:effectLst>
-              <a:innerShdw blurRad="63500" dist="50800" dir="5400000">
-                <a:prstClr val="black">
-                  <a:alpha val="50000"/>
-                </a:prstClr>
-              </a:innerShdw>
-            </a:effectLst>
-          </p:spPr>
-          <p:style>
-            <a:lnRef idx="2">
-              <a:schemeClr val="accent1">
-                <a:shade val="50000"/>
-              </a:schemeClr>
-            </a:lnRef>
-            <a:fillRef idx="1">
-              <a:schemeClr val="accent1"/>
-            </a:fillRef>
-            <a:effectRef idx="0">
-              <a:schemeClr val="accent1"/>
-            </a:effectRef>
-            <a:fontRef idx="minor">
-              <a:schemeClr val="lt1"/>
-            </a:fontRef>
-          </p:style>
-          <p:txBody>
-            <a:bodyPr rtlCol="0" anchor="ctr"/>
-            <a:lstStyle/>
-            <a:p>
-              <a:pPr algn="ctr"/>
-              <a:r>
-                <a:rPr lang="en-US" dirty="0"/>
-                <a:t>Serialized Model Object (AWS S3)</a:t>
-              </a:r>
-            </a:p>
-          </p:txBody>
-        </p:sp>
-        <p:sp>
-          <p:nvSpPr>
-            <p:cNvPr id="78" name="TextBox 77">
-              <a:extLst>
-                <a:ext uri="{FF2B5EF4-FFF2-40B4-BE49-F238E27FC236}">
-                  <a16:creationId xmlns:a16="http://schemas.microsoft.com/office/drawing/2014/main" id="{E1E3310B-4AF5-4C8B-9A32-622319C48F47}"/>
+                  <a16:creationId xmlns:a16="http://schemas.microsoft.com/office/drawing/2014/main" id="{FEFAADE2-30DF-475E-9A67-91EEBCABA0B3}"/>
                 </a:ext>
               </a:extLst>
             </p:cNvPr>
@@ -7055,8 +7400,8 @@
           </p:nvSpPr>
           <p:spPr>
             <a:xfrm>
-              <a:off x="1506072" y="1210627"/>
-              <a:ext cx="3369609" cy="345159"/>
+              <a:off x="2777628" y="1721273"/>
+              <a:ext cx="1491017" cy="345159"/>
             </a:xfrm>
             <a:prstGeom prst="rect">
               <a:avLst/>
@@ -7070,16 +7415,105 @@
             <a:lstStyle/>
             <a:p>
               <a:r>
-                <a:rPr lang="en-US" b="1" dirty="0">
+                <a:rPr lang="en-US" dirty="0">
                   <a:latin typeface="Times New Roman" panose="02020603050405020304" pitchFamily="18" charset="0"/>
                   <a:cs typeface="Times New Roman" panose="02020603050405020304" pitchFamily="18" charset="0"/>
                 </a:rPr>
-                <a:t>The System Structure of iMedBot</a:t>
+                <a:t>F</a:t>
               </a:r>
-              <a:endParaRPr lang="en-US" b="1" dirty="0"/>
+              <a:r>
+                <a:rPr lang="en-US" altLang="zh-CN" dirty="0">
+                  <a:latin typeface="Times New Roman" panose="02020603050405020304" pitchFamily="18" charset="0"/>
+                  <a:cs typeface="Times New Roman" panose="02020603050405020304" pitchFamily="18" charset="0"/>
+                </a:rPr>
+                <a:t>rontEnd</a:t>
+              </a:r>
+              <a:endParaRPr lang="en-US" dirty="0">
+                <a:latin typeface="Times New Roman" panose="02020603050405020304" pitchFamily="18" charset="0"/>
+                <a:cs typeface="Times New Roman" panose="02020603050405020304" pitchFamily="18" charset="0"/>
+              </a:endParaRPr>
             </a:p>
           </p:txBody>
         </p:sp>
+        <p:sp>
+          <p:nvSpPr>
+            <p:cNvPr id="24" name="TextBox 23">
+              <a:extLst>
+                <a:ext uri="{FF2B5EF4-FFF2-40B4-BE49-F238E27FC236}">
+                  <a16:creationId xmlns:a16="http://schemas.microsoft.com/office/drawing/2014/main" id="{718183A1-49CB-4BE9-85DC-AB0A1AE5C5F7}"/>
+                </a:ext>
+              </a:extLst>
+            </p:cNvPr>
+            <p:cNvSpPr txBox="1"/>
+            <p:nvPr/>
+          </p:nvSpPr>
+          <p:spPr>
+            <a:xfrm>
+              <a:off x="4736894" y="1721274"/>
+              <a:ext cx="1491017" cy="345159"/>
+            </a:xfrm>
+            <a:prstGeom prst="rect">
+              <a:avLst/>
+            </a:prstGeom>
+            <a:noFill/>
+          </p:spPr>
+          <p:txBody>
+            <a:bodyPr wrap="square" rtlCol="0">
+              <a:spAutoFit/>
+            </a:bodyPr>
+            <a:lstStyle/>
+            <a:p>
+              <a:r>
+                <a:rPr lang="en-US" dirty="0">
+                  <a:latin typeface="Times New Roman" panose="02020603050405020304" pitchFamily="18" charset="0"/>
+                  <a:cs typeface="Times New Roman" panose="02020603050405020304" pitchFamily="18" charset="0"/>
+                </a:rPr>
+                <a:t>B</a:t>
+              </a:r>
+              <a:r>
+                <a:rPr lang="en-US" altLang="zh-CN" dirty="0">
+                  <a:latin typeface="Times New Roman" panose="02020603050405020304" pitchFamily="18" charset="0"/>
+                  <a:cs typeface="Times New Roman" panose="02020603050405020304" pitchFamily="18" charset="0"/>
+                </a:rPr>
+                <a:t>ackEnd</a:t>
+              </a:r>
+              <a:endParaRPr lang="en-US" dirty="0">
+                <a:latin typeface="Times New Roman" panose="02020603050405020304" pitchFamily="18" charset="0"/>
+                <a:cs typeface="Times New Roman" panose="02020603050405020304" pitchFamily="18" charset="0"/>
+              </a:endParaRPr>
+            </a:p>
+          </p:txBody>
+        </p:sp>
+        <p:pic>
+          <p:nvPicPr>
+            <p:cNvPr id="13" name="Picture 12" descr="Logo&#10;&#10;Description automatically generated">
+              <a:extLst>
+                <a:ext uri="{FF2B5EF4-FFF2-40B4-BE49-F238E27FC236}">
+                  <a16:creationId xmlns:a16="http://schemas.microsoft.com/office/drawing/2014/main" id="{9D65AB01-B27E-4C22-8150-5647F085F130}"/>
+                </a:ext>
+              </a:extLst>
+            </p:cNvPr>
+            <p:cNvPicPr>
+              <a:picLocks noChangeAspect="1"/>
+            </p:cNvPicPr>
+            <p:nvPr/>
+          </p:nvPicPr>
+          <p:blipFill>
+            <a:blip r:embed="rId2"/>
+            <a:stretch>
+              <a:fillRect/>
+            </a:stretch>
+          </p:blipFill>
+          <p:spPr>
+            <a:xfrm>
+              <a:off x="1271676" y="4147121"/>
+              <a:ext cx="2047875" cy="1304925"/>
+            </a:xfrm>
+            <a:prstGeom prst="rect">
+              <a:avLst/>
+            </a:prstGeom>
+          </p:spPr>
+        </p:pic>
       </p:grpSp>
     </p:spTree>
     <p:extLst>
@@ -7094,7 +7528,7 @@
 </p:sld>
 </file>
 
-<file path=ppt/slides/slide4.xml><?xml version="1.0" encoding="utf-8"?>
+<file path=ppt/slides/slide5.xml><?xml version="1.0" encoding="utf-8"?>
 <p:sld xmlns:a="http://schemas.openxmlformats.org/drawingml/2006/main" xmlns:r="http://schemas.openxmlformats.org/officeDocument/2006/relationships" xmlns:p="http://schemas.openxmlformats.org/presentationml/2006/main">
   <p:cSld>
     <p:spTree>

</xml_diff>

<commit_message>
Wrote a new first paragraph about the significance of iMedbot, backend components, and future plans
</commit_message>
<xml_diff>
--- a/docs/Manuscript/Figures/iMedBotStructure.pptx
+++ b/docs/Manuscript/Figures/iMedBotStructure.pptx
@@ -1047,7 +1047,7 @@
               <a:pPr/>
               <a:t>‹#›</a:t>
             </a:fld>
-            <a:endParaRPr lang="en"/>
+            <a:endParaRPr lang="en" dirty="0"/>
           </a:p>
         </p:txBody>
       </p:sp>
@@ -1184,9 +1184,9 @@
           <a:p>
             <a:fld id="{D2CA1F8B-7CEF-3E43-B4EE-83E029EB6154}" type="datetimeFigureOut">
               <a:rPr lang="en-US" smtClean="0"/>
-              <a:t>9/4/2022</a:t>
+              <a:t>9/6/22</a:t>
             </a:fld>
-            <a:endParaRPr lang="en-US"/>
+            <a:endParaRPr lang="en-US" dirty="0"/>
           </a:p>
         </p:txBody>
       </p:sp>
@@ -1211,7 +1211,7 @@
           <a:bodyPr/>
           <a:lstStyle/>
           <a:p>
-            <a:endParaRPr lang="en-US"/>
+            <a:endParaRPr lang="en-US" dirty="0"/>
           </a:p>
         </p:txBody>
       </p:sp>
@@ -1240,7 +1240,7 @@
               <a:rPr lang="en-US" smtClean="0"/>
               <a:t>‹#›</a:t>
             </a:fld>
-            <a:endParaRPr lang="en-US"/>
+            <a:endParaRPr lang="en-US" dirty="0"/>
           </a:p>
         </p:txBody>
       </p:sp>
@@ -1728,7 +1728,7 @@
               <a:pPr/>
               <a:t>‹#›</a:t>
             </a:fld>
-            <a:endParaRPr lang="en"/>
+            <a:endParaRPr lang="en" dirty="0"/>
           </a:p>
         </p:txBody>
       </p:sp>
@@ -1953,7 +1953,7 @@
               <a:pPr/>
               <a:t>‹#›</a:t>
             </a:fld>
-            <a:endParaRPr lang="en"/>
+            <a:endParaRPr lang="en" dirty="0"/>
           </a:p>
         </p:txBody>
       </p:sp>
@@ -2307,7 +2307,7 @@
               <a:pPr/>
               <a:t>‹#›</a:t>
             </a:fld>
-            <a:endParaRPr lang="en"/>
+            <a:endParaRPr lang="en" dirty="0"/>
           </a:p>
         </p:txBody>
       </p:sp>
@@ -2532,7 +2532,7 @@
               <a:pPr/>
               <a:t>‹#›</a:t>
             </a:fld>
-            <a:endParaRPr lang="en"/>
+            <a:endParaRPr lang="en" dirty="0"/>
           </a:p>
         </p:txBody>
       </p:sp>
@@ -2597,7 +2597,7 @@
               </a:spcAft>
               <a:buNone/>
             </a:pPr>
-            <a:endParaRPr sz="1400"/>
+            <a:endParaRPr sz="1400" dirty="0"/>
           </a:p>
         </p:txBody>
       </p:sp>
@@ -3082,7 +3082,7 @@
               <a:pPr/>
               <a:t>‹#›</a:t>
             </a:fld>
-            <a:endParaRPr lang="en"/>
+            <a:endParaRPr lang="en" dirty="0"/>
           </a:p>
         </p:txBody>
       </p:sp>
@@ -3222,7 +3222,7 @@
               <a:pPr/>
               <a:t>‹#›</a:t>
             </a:fld>
-            <a:endParaRPr lang="en"/>
+            <a:endParaRPr lang="en" dirty="0"/>
           </a:p>
         </p:txBody>
       </p:sp>
@@ -3578,7 +3578,7 @@
               <a:pPr/>
               <a:t>‹#›</a:t>
             </a:fld>
-            <a:endParaRPr lang="en"/>
+            <a:endParaRPr lang="en" dirty="0"/>
           </a:p>
         </p:txBody>
       </p:sp>
@@ -3674,7 +3674,7 @@
               <a:pPr/>
               <a:t>‹#›</a:t>
             </a:fld>
-            <a:endParaRPr lang="en"/>
+            <a:endParaRPr lang="en" dirty="0"/>
           </a:p>
         </p:txBody>
       </p:sp>
@@ -4237,7 +4237,7 @@
               <a:pPr/>
               <a:t>‹#›</a:t>
             </a:fld>
-            <a:endParaRPr lang="en"/>
+            <a:endParaRPr lang="en" dirty="0"/>
           </a:p>
         </p:txBody>
       </p:sp>
@@ -5016,8 +5016,19 @@
                 <a:latin typeface="Times New Roman" panose="02020603050405020304" pitchFamily="18" charset="0"/>
                 <a:cs typeface="Times New Roman" panose="02020603050405020304" pitchFamily="18" charset="0"/>
               </a:rPr>
-              <a:t> of iMedBot</a:t>
+              <a:t> of </a:t>
             </a:r>
+            <a:r>
+              <a:rPr lang="en-US" sz="3000" dirty="0" err="1">
+                <a:latin typeface="Times New Roman" panose="02020603050405020304" pitchFamily="18" charset="0"/>
+                <a:cs typeface="Times New Roman" panose="02020603050405020304" pitchFamily="18" charset="0"/>
+              </a:rPr>
+              <a:t>iMedBot</a:t>
+            </a:r>
+            <a:endParaRPr lang="en-US" sz="3000" dirty="0">
+              <a:latin typeface="Times New Roman" panose="02020603050405020304" pitchFamily="18" charset="0"/>
+              <a:cs typeface="Times New Roman" panose="02020603050405020304" pitchFamily="18" charset="0"/>
+            </a:endParaRPr>
           </a:p>
         </p:txBody>
       </p:sp>
@@ -5068,10 +5079,10 @@
           <a:p>
             <a:pPr algn="ctr"/>
             <a:r>
-              <a:rPr lang="en-US" sz="1499" dirty="0"/>
+              <a:rPr lang="en-US" sz="1499"/>
               <a:t>iMedBot</a:t>
             </a:r>
-            <a:endParaRPr lang="el-GR" sz="1499" dirty="0"/>
+            <a:endParaRPr lang="el-GR" sz="1499"/>
           </a:p>
         </p:txBody>
       </p:sp>
@@ -5178,7 +5189,7 @@
             <a:bodyPr rtlCol="0" anchor="ctr"/>
             <a:lstStyle/>
             <a:p>
-              <a:endParaRPr lang="el-GR" sz="1499" dirty="0"/>
+              <a:endParaRPr lang="el-GR" sz="1499"/>
             </a:p>
           </p:txBody>
         </p:sp>
@@ -5226,10 +5237,10 @@
             <a:p>
               <a:pPr algn="ctr"/>
               <a:r>
-                <a:rPr lang="en-US" sz="1499" dirty="0"/>
+                <a:rPr lang="en-US" sz="1499"/>
                 <a:t>Knowledge-base (questions and answers)</a:t>
               </a:r>
-              <a:endParaRPr lang="el-GR" sz="1499" dirty="0"/>
+              <a:endParaRPr lang="el-GR" sz="1499"/>
             </a:p>
           </p:txBody>
         </p:sp>
@@ -5277,10 +5288,10 @@
             <a:p>
               <a:pPr algn="ctr"/>
               <a:r>
-                <a:rPr lang="en-US" sz="1499" dirty="0"/>
+                <a:rPr lang="en-US" sz="1499"/>
                 <a:t>Deep Feedforward Neural Network Model</a:t>
               </a:r>
-              <a:endParaRPr lang="el-GR" sz="1499" dirty="0"/>
+              <a:endParaRPr lang="el-GR" sz="1499"/>
             </a:p>
           </p:txBody>
         </p:sp>
@@ -5347,7 +5358,7 @@
             <a:bodyPr rtlCol="0" anchor="ctr"/>
             <a:lstStyle/>
             <a:p>
-              <a:endParaRPr lang="el-GR" sz="1499" dirty="0"/>
+              <a:endParaRPr lang="el-GR" sz="1499"/>
             </a:p>
           </p:txBody>
         </p:sp>
@@ -5395,10 +5406,10 @@
             <a:p>
               <a:pPr algn="ctr"/>
               <a:r>
-                <a:rPr lang="en-US" sz="1499" dirty="0"/>
+                <a:rPr lang="en-US" sz="1499"/>
                 <a:t>Window 2</a:t>
               </a:r>
-              <a:endParaRPr lang="el-GR" sz="1499" dirty="0"/>
+              <a:endParaRPr lang="el-GR" sz="1499"/>
             </a:p>
           </p:txBody>
         </p:sp>
@@ -5446,10 +5457,10 @@
             <a:p>
               <a:pPr algn="ctr"/>
               <a:r>
-                <a:rPr lang="en-US" sz="1499" dirty="0"/>
+                <a:rPr lang="en-US" sz="1499"/>
                 <a:t>Window 1</a:t>
               </a:r>
-              <a:endParaRPr lang="el-GR" sz="1499" dirty="0"/>
+              <a:endParaRPr lang="el-GR" sz="1499"/>
             </a:p>
           </p:txBody>
         </p:sp>
@@ -5496,7 +5507,7 @@
           <a:bodyPr rtlCol="0" anchor="ctr"/>
           <a:lstStyle/>
           <a:p>
-            <a:endParaRPr lang="el-GR" sz="1499" dirty="0"/>
+            <a:endParaRPr lang="el-GR" sz="1499"/>
           </a:p>
         </p:txBody>
       </p:sp>
@@ -5553,7 +5564,7 @@
           <a:p>
             <a:pPr algn="ctr"/>
             <a:r>
-              <a:rPr lang="en-US" dirty="0"/>
+              <a:rPr lang="en-US"/>
               <a:t>Prediction</a:t>
             </a:r>
           </a:p>
@@ -5612,7 +5623,7 @@
           <a:p>
             <a:pPr algn="ctr"/>
             <a:r>
-              <a:rPr lang="en-US" dirty="0"/>
+              <a:rPr lang="en-US"/>
               <a:t>Model Training</a:t>
             </a:r>
           </a:p>
@@ -5732,7 +5743,7 @@
           <a:lstStyle/>
           <a:p>
             <a:r>
-              <a:rPr lang="en-US" dirty="0"/>
+              <a:rPr lang="en-US"/>
               <a:t>…</a:t>
             </a:r>
           </a:p>
@@ -5767,7 +5778,7 @@
           <a:lstStyle/>
           <a:p>
             <a:r>
-              <a:rPr lang="en-US" dirty="0"/>
+              <a:rPr lang="en-US"/>
               <a:t>…</a:t>
             </a:r>
           </a:p>
@@ -5802,7 +5813,7 @@
           <a:lstStyle/>
           <a:p>
             <a:r>
-              <a:rPr lang="en-US" dirty="0"/>
+              <a:rPr lang="en-US"/>
               <a:t>…</a:t>
             </a:r>
           </a:p>
@@ -5837,7 +5848,7 @@
           <a:lstStyle/>
           <a:p>
             <a:r>
-              <a:rPr lang="en-US" dirty="0"/>
+              <a:rPr lang="en-US"/>
               <a:t>Backend</a:t>
             </a:r>
           </a:p>
@@ -5872,7 +5883,7 @@
           <a:lstStyle/>
           <a:p>
             <a:r>
-              <a:rPr lang="en-US" dirty="0"/>
+              <a:rPr lang="en-US"/>
               <a:t>Front end</a:t>
             </a:r>
           </a:p>
@@ -5907,7 +5918,7 @@
           <a:lstStyle/>
           <a:p>
             <a:r>
-              <a:rPr lang="en-US" dirty="0"/>
+              <a:rPr lang="en-US"/>
               <a:t>Functions</a:t>
             </a:r>
           </a:p>
@@ -6105,7 +6116,7 @@
           <a:lstStyle/>
           <a:p>
             <a:r>
-              <a:rPr lang="en-US" dirty="0"/>
+              <a:rPr lang="en-US"/>
               <a:t>Original one</a:t>
             </a:r>
           </a:p>
@@ -6303,7 +6314,7 @@
           <a:lstStyle/>
           <a:p>
             <a:r>
-              <a:rPr lang="en-US" dirty="0"/>
+              <a:rPr lang="en-US"/>
               <a:t>New one with high resolution</a:t>
             </a:r>
           </a:p>
@@ -6486,7 +6497,7 @@
               <a:p>
                 <a:pPr algn="ctr"/>
                 <a:r>
-                  <a:rPr lang="en-US" dirty="0"/>
+                  <a:rPr lang="en-US"/>
                   <a:t>Client</a:t>
                 </a:r>
               </a:p>
@@ -6598,14 +6609,14 @@
               <a:p>
                 <a:pPr algn="ctr"/>
                 <a:r>
-                  <a:rPr lang="en-US" dirty="0"/>
+                  <a:rPr lang="en-US"/>
                   <a:t>Load Balancer</a:t>
                 </a:r>
               </a:p>
               <a:p>
                 <a:pPr algn="ctr"/>
                 <a:r>
-                  <a:rPr lang="en-US" dirty="0"/>
+                  <a:rPr lang="en-US"/>
                   <a:t>(AWS ELB)</a:t>
                 </a:r>
               </a:p>
@@ -6718,14 +6729,14 @@
               <a:p>
                 <a:pPr algn="ctr"/>
                 <a:r>
-                  <a:rPr lang="en-US" dirty="0"/>
+                  <a:rPr lang="en-US"/>
                   <a:t>DNS</a:t>
                 </a:r>
               </a:p>
               <a:p>
                 <a:pPr algn="ctr"/>
                 <a:r>
-                  <a:rPr lang="en-US" dirty="0"/>
+                  <a:rPr lang="en-US"/>
                   <a:t>(AWS route53)</a:t>
                 </a:r>
               </a:p>
@@ -6837,14 +6848,14 @@
               <a:p>
                 <a:pPr algn="ctr"/>
                 <a:r>
-                  <a:rPr lang="en-US" dirty="0"/>
+                  <a:rPr lang="en-US"/>
                   <a:t>Web Server</a:t>
                 </a:r>
               </a:p>
               <a:p>
                 <a:pPr algn="ctr"/>
                 <a:r>
-                  <a:rPr lang="en-US" dirty="0"/>
+                  <a:rPr lang="en-US"/>
                   <a:t>(AWS EC2)</a:t>
                 </a:r>
               </a:p>
@@ -6951,7 +6962,7 @@
               <a:p>
                 <a:pPr algn="ctr"/>
                 <a:r>
-                  <a:rPr lang="en-US" dirty="0"/>
+                  <a:rPr lang="en-US"/>
                   <a:t>Model Training Service</a:t>
                 </a:r>
               </a:p>
@@ -7058,7 +7069,7 @@
               <a:p>
                 <a:pPr algn="ctr"/>
                 <a:r>
-                  <a:rPr lang="en-US" dirty="0"/>
+                  <a:rPr lang="en-US"/>
                   <a:t>Model Prediction Service</a:t>
                 </a:r>
               </a:p>
@@ -7170,14 +7181,14 @@
               <a:p>
                 <a:pPr algn="ctr"/>
                 <a:r>
-                  <a:rPr lang="en-US" dirty="0"/>
+                  <a:rPr lang="en-US"/>
                   <a:t>KerasClassifier Module</a:t>
                 </a:r>
               </a:p>
               <a:p>
                 <a:pPr algn="ctr"/>
                 <a:r>
-                  <a:rPr lang="en-US" dirty="0"/>
+                  <a:rPr lang="en-US"/>
                   <a:t>(AWS S3)</a:t>
                 </a:r>
               </a:p>
@@ -7289,7 +7300,7 @@
               <a:p>
                 <a:pPr algn="ctr"/>
                 <a:r>
-                  <a:rPr lang="en-US" dirty="0"/>
+                  <a:rPr lang="en-US"/>
                   <a:t>Serialized Model Object (AWS S3)</a:t>
                 </a:r>
               </a:p>
@@ -7324,13 +7335,13 @@
               <a:lstStyle/>
               <a:p>
                 <a:r>
-                  <a:rPr lang="en-US" b="1" dirty="0">
+                  <a:rPr lang="en-US" b="1">
                     <a:latin typeface="Times New Roman" panose="02020603050405020304" pitchFamily="18" charset="0"/>
                     <a:cs typeface="Times New Roman" panose="02020603050405020304" pitchFamily="18" charset="0"/>
                   </a:rPr>
                   <a:t>The System Structure of iMedBot</a:t>
                 </a:r>
-                <a:endParaRPr lang="en-US" b="1" dirty="0"/>
+                <a:endParaRPr lang="en-US" b="1"/>
               </a:p>
             </p:txBody>
           </p:sp>
@@ -7415,20 +7426,20 @@
             <a:lstStyle/>
             <a:p>
               <a:r>
-                <a:rPr lang="en-US" dirty="0">
+                <a:rPr lang="en-US">
                   <a:latin typeface="Times New Roman" panose="02020603050405020304" pitchFamily="18" charset="0"/>
                   <a:cs typeface="Times New Roman" panose="02020603050405020304" pitchFamily="18" charset="0"/>
                 </a:rPr>
                 <a:t>F</a:t>
               </a:r>
               <a:r>
-                <a:rPr lang="en-US" altLang="zh-CN" dirty="0">
+                <a:rPr lang="en-US" altLang="zh-CN">
                   <a:latin typeface="Times New Roman" panose="02020603050405020304" pitchFamily="18" charset="0"/>
                   <a:cs typeface="Times New Roman" panose="02020603050405020304" pitchFamily="18" charset="0"/>
                 </a:rPr>
                 <a:t>rontEnd</a:t>
               </a:r>
-              <a:endParaRPr lang="en-US" dirty="0">
+              <a:endParaRPr lang="en-US">
                 <a:latin typeface="Times New Roman" panose="02020603050405020304" pitchFamily="18" charset="0"/>
                 <a:cs typeface="Times New Roman" panose="02020603050405020304" pitchFamily="18" charset="0"/>
               </a:endParaRPr>
@@ -7464,20 +7475,20 @@
             <a:lstStyle/>
             <a:p>
               <a:r>
-                <a:rPr lang="en-US" dirty="0">
+                <a:rPr lang="en-US">
                   <a:latin typeface="Times New Roman" panose="02020603050405020304" pitchFamily="18" charset="0"/>
                   <a:cs typeface="Times New Roman" panose="02020603050405020304" pitchFamily="18" charset="0"/>
                 </a:rPr>
                 <a:t>B</a:t>
               </a:r>
               <a:r>
-                <a:rPr lang="en-US" altLang="zh-CN" dirty="0">
+                <a:rPr lang="en-US" altLang="zh-CN">
                   <a:latin typeface="Times New Roman" panose="02020603050405020304" pitchFamily="18" charset="0"/>
                   <a:cs typeface="Times New Roman" panose="02020603050405020304" pitchFamily="18" charset="0"/>
                 </a:rPr>
                 <a:t>ackEnd</a:t>
               </a:r>
-              <a:endParaRPr lang="en-US" dirty="0">
+              <a:endParaRPr lang="en-US">
                 <a:latin typeface="Times New Roman" panose="02020603050405020304" pitchFamily="18" charset="0"/>
                 <a:cs typeface="Times New Roman" panose="02020603050405020304" pitchFamily="18" charset="0"/>
               </a:endParaRPr>
@@ -7684,7 +7695,7 @@
               <a:p>
                 <a:pPr algn="ctr"/>
                 <a:r>
-                  <a:rPr lang="en-US" sz="1100" dirty="0"/>
+                  <a:rPr lang="en-US" sz="1100"/>
                   <a:t>Model Prediction</a:t>
                 </a:r>
               </a:p>
@@ -7743,7 +7754,7 @@
               <a:p>
                 <a:pPr algn="ctr"/>
                 <a:r>
-                  <a:rPr lang="en-US" sz="1100" dirty="0"/>
+                  <a:rPr lang="en-US" sz="1100"/>
                   <a:t>Model Training</a:t>
                 </a:r>
               </a:p>
@@ -7938,7 +7949,7 @@
               <a:p>
                 <a:pPr algn="ctr"/>
                 <a:r>
-                  <a:rPr lang="en-US" sz="1100" dirty="0"/>
+                  <a:rPr lang="en-US" sz="1100"/>
                   <a:t>iMedBot</a:t>
                 </a:r>
               </a:p>
@@ -7992,7 +8003,7 @@
               <a:p>
                 <a:pPr algn="ctr"/>
                 <a:r>
-                  <a:rPr lang="en-US" sz="1100" dirty="0"/>
+                  <a:rPr lang="en-US" sz="1100"/>
                   <a:t>Return patient recurrence probability</a:t>
                 </a:r>
               </a:p>
@@ -8046,7 +8057,7 @@
               <a:p>
                 <a:pPr algn="ctr"/>
                 <a:r>
-                  <a:rPr lang="en-US" sz="1100" dirty="0"/>
+                  <a:rPr lang="en-US" sz="1100"/>
                   <a:t>Collect feedback</a:t>
                 </a:r>
               </a:p>
@@ -8147,15 +8158,7 @@
                 <a:pPr algn="ctr"/>
                 <a:r>
                   <a:rPr lang="en-US" sz="1100" dirty="0"/>
-                  <a:t>Acquire patient medical index:  DCIS_Level; </a:t>
-                </a:r>
-                <a:r>
-                  <a:rPr lang="en-US" sz="1100" dirty="0" err="1"/>
-                  <a:t>Tumor_Size</a:t>
-                </a:r>
-                <a:r>
-                  <a:rPr lang="en-US" sz="1100" dirty="0"/>
-                  <a:t>; Grade and so on</a:t>
+                  <a:t>Acquire patient medical index:  DCIS_Level; Tumor_Size; Grade and so on</a:t>
                 </a:r>
               </a:p>
             </p:txBody>
@@ -9536,7 +9539,7 @@
             <a:lstStyle/>
             <a:p>
               <a:pPr algn="ctr"/>
-              <a:endParaRPr lang="en-US"/>
+              <a:endParaRPr lang="en-US" dirty="0"/>
             </a:p>
           </p:txBody>
         </p:sp>

</xml_diff>